<commit_message>
Start writing Shell service controller manual
</commit_message>
<xml_diff>
--- a/Development/DocSources/en/ShellIntegrationGuide/_images/images.pptx
+++ b/Development/DocSources/en/ShellIntegrationGuide/_images/images.pptx
@@ -7,6 +7,7 @@
   <p:sldIdLst>
     <p:sldId id="256" r:id="rId2"/>
     <p:sldId id="257" r:id="rId3"/>
+    <p:sldId id="258" r:id="rId4"/>
   </p:sldIdLst>
   <p:sldSz cx="6858000" cy="9144000" type="screen4x3"/>
   <p:notesSz cx="6858000" cy="9144000"/>
@@ -305,7 +306,7 @@
           <a:p>
             <a:fld id="{DDD501E0-58CF-4A9F-A444-8A0230425944}" type="datetimeFigureOut">
               <a:rPr lang="de-DE" smtClean="0"/>
-              <a:t>26.10.2018</a:t>
+              <a:t>04.12.2018</a:t>
             </a:fld>
             <a:endParaRPr lang="de-DE"/>
           </a:p>
@@ -475,7 +476,7 @@
           <a:p>
             <a:fld id="{DDD501E0-58CF-4A9F-A444-8A0230425944}" type="datetimeFigureOut">
               <a:rPr lang="de-DE" smtClean="0"/>
-              <a:t>26.10.2018</a:t>
+              <a:t>04.12.2018</a:t>
             </a:fld>
             <a:endParaRPr lang="de-DE"/>
           </a:p>
@@ -655,7 +656,7 @@
           <a:p>
             <a:fld id="{DDD501E0-58CF-4A9F-A444-8A0230425944}" type="datetimeFigureOut">
               <a:rPr lang="de-DE" smtClean="0"/>
-              <a:t>26.10.2018</a:t>
+              <a:t>04.12.2018</a:t>
             </a:fld>
             <a:endParaRPr lang="de-DE"/>
           </a:p>
@@ -825,7 +826,7 @@
           <a:p>
             <a:fld id="{DDD501E0-58CF-4A9F-A444-8A0230425944}" type="datetimeFigureOut">
               <a:rPr lang="de-DE" smtClean="0"/>
-              <a:t>26.10.2018</a:t>
+              <a:t>04.12.2018</a:t>
             </a:fld>
             <a:endParaRPr lang="de-DE"/>
           </a:p>
@@ -1071,7 +1072,7 @@
           <a:p>
             <a:fld id="{DDD501E0-58CF-4A9F-A444-8A0230425944}" type="datetimeFigureOut">
               <a:rPr lang="de-DE" smtClean="0"/>
-              <a:t>26.10.2018</a:t>
+              <a:t>04.12.2018</a:t>
             </a:fld>
             <a:endParaRPr lang="de-DE"/>
           </a:p>
@@ -1359,7 +1360,7 @@
           <a:p>
             <a:fld id="{DDD501E0-58CF-4A9F-A444-8A0230425944}" type="datetimeFigureOut">
               <a:rPr lang="de-DE" smtClean="0"/>
-              <a:t>26.10.2018</a:t>
+              <a:t>04.12.2018</a:t>
             </a:fld>
             <a:endParaRPr lang="de-DE"/>
           </a:p>
@@ -1781,7 +1782,7 @@
           <a:p>
             <a:fld id="{DDD501E0-58CF-4A9F-A444-8A0230425944}" type="datetimeFigureOut">
               <a:rPr lang="de-DE" smtClean="0"/>
-              <a:t>26.10.2018</a:t>
+              <a:t>04.12.2018</a:t>
             </a:fld>
             <a:endParaRPr lang="de-DE"/>
           </a:p>
@@ -1899,7 +1900,7 @@
           <a:p>
             <a:fld id="{DDD501E0-58CF-4A9F-A444-8A0230425944}" type="datetimeFigureOut">
               <a:rPr lang="de-DE" smtClean="0"/>
-              <a:t>26.10.2018</a:t>
+              <a:t>04.12.2018</a:t>
             </a:fld>
             <a:endParaRPr lang="de-DE"/>
           </a:p>
@@ -1994,7 +1995,7 @@
           <a:p>
             <a:fld id="{DDD501E0-58CF-4A9F-A444-8A0230425944}" type="datetimeFigureOut">
               <a:rPr lang="de-DE" smtClean="0"/>
-              <a:t>26.10.2018</a:t>
+              <a:t>04.12.2018</a:t>
             </a:fld>
             <a:endParaRPr lang="de-DE"/>
           </a:p>
@@ -2271,7 +2272,7 @@
           <a:p>
             <a:fld id="{DDD501E0-58CF-4A9F-A444-8A0230425944}" type="datetimeFigureOut">
               <a:rPr lang="de-DE" smtClean="0"/>
-              <a:t>26.10.2018</a:t>
+              <a:t>04.12.2018</a:t>
             </a:fld>
             <a:endParaRPr lang="de-DE"/>
           </a:p>
@@ -2524,7 +2525,7 @@
           <a:p>
             <a:fld id="{DDD501E0-58CF-4A9F-A444-8A0230425944}" type="datetimeFigureOut">
               <a:rPr lang="de-DE" smtClean="0"/>
-              <a:t>26.10.2018</a:t>
+              <a:t>04.12.2018</a:t>
             </a:fld>
             <a:endParaRPr lang="de-DE"/>
           </a:p>
@@ -2737,7 +2738,7 @@
           <a:p>
             <a:fld id="{DDD501E0-58CF-4A9F-A444-8A0230425944}" type="datetimeFigureOut">
               <a:rPr lang="de-DE" smtClean="0"/>
-              <a:t>26.10.2018</a:t>
+              <a:t>04.12.2018</a:t>
             </a:fld>
             <a:endParaRPr lang="de-DE"/>
           </a:p>
@@ -3990,7 +3991,7 @@
           <p:spPr>
             <a:xfrm>
               <a:off x="3926111" y="694601"/>
-              <a:ext cx="553357" cy="276999"/>
+              <a:ext cx="1117614" cy="276999"/>
             </a:xfrm>
             <a:prstGeom prst="rect">
               <a:avLst/>
@@ -4102,7 +4103,7 @@
                   <a:latin typeface="Arial" panose="020B0604020202020204" pitchFamily="34" charset="0"/>
                   <a:cs typeface="Arial" panose="020B0604020202020204" pitchFamily="34" charset="0"/>
                 </a:rPr>
-                <a:t>Shell</a:t>
+                <a:t>Shell Scripts</a:t>
               </a:r>
               <a:endParaRPr lang="de-DE" sz="1200" b="1" dirty="0">
                 <a:latin typeface="Arial" panose="020B0604020202020204" pitchFamily="34" charset="0"/>
@@ -4259,13 +4260,6 @@
                 </a:rPr>
                 <a:t>Shell</a:t>
               </a:r>
-              <a:endParaRPr lang="de-DE" sz="1000" b="1" dirty="0" smtClean="0">
-                <a:solidFill>
-                  <a:schemeClr val="tx1"/>
-                </a:solidFill>
-                <a:latin typeface="Arial" panose="020B0604020202020204" pitchFamily="34" charset="0"/>
-                <a:cs typeface="Arial" panose="020B0604020202020204" pitchFamily="34" charset="0"/>
-              </a:endParaRPr>
             </a:p>
             <a:p>
               <a:pPr algn="ctr"/>
@@ -4737,14 +4731,14 @@
       </p:grpSp>
       <p:sp>
         <p:nvSpPr>
-          <p:cNvPr id="30" name="Rounded Rectangle 29"/>
+          <p:cNvPr id="31" name="Rounded Rectangle 30"/>
           <p:cNvSpPr/>
           <p:nvPr/>
         </p:nvSpPr>
         <p:spPr>
           <a:xfrm>
-            <a:off x="4005064" y="2487960"/>
-            <a:ext cx="1890340" cy="211832"/>
+            <a:off x="4005064" y="1043608"/>
+            <a:ext cx="1890340" cy="1718196"/>
           </a:xfrm>
           <a:prstGeom prst="roundRect">
             <a:avLst/>
@@ -4778,26 +4772,6 @@
           <a:lstStyle/>
           <a:p>
             <a:pPr algn="ctr"/>
-            <a:r>
-              <a:rPr lang="de-DE" sz="1000" b="1" dirty="0" err="1" smtClean="0">
-                <a:solidFill>
-                  <a:schemeClr val="tx1"/>
-                </a:solidFill>
-                <a:latin typeface="Arial" panose="020B0604020202020204" pitchFamily="34" charset="0"/>
-                <a:cs typeface="Arial" panose="020B0604020202020204" pitchFamily="34" charset="0"/>
-              </a:rPr>
-              <a:t>Deassign</a:t>
-            </a:r>
-            <a:r>
-              <a:rPr lang="de-DE" sz="1000" b="1" dirty="0" smtClean="0">
-                <a:solidFill>
-                  <a:schemeClr val="tx1"/>
-                </a:solidFill>
-                <a:latin typeface="Arial" panose="020B0604020202020204" pitchFamily="34" charset="0"/>
-                <a:cs typeface="Arial" panose="020B0604020202020204" pitchFamily="34" charset="0"/>
-              </a:rPr>
-              <a:t> User Script</a:t>
-            </a:r>
             <a:endParaRPr lang="de-DE" sz="1000" b="1" dirty="0">
               <a:solidFill>
                 <a:schemeClr val="tx1"/>
@@ -4810,290 +4784,155 @@
       </p:sp>
       <p:sp>
         <p:nvSpPr>
-          <p:cNvPr id="31" name="Rounded Rectangle 30"/>
-          <p:cNvSpPr/>
+          <p:cNvPr id="3" name="TextBox 2"/>
+          <p:cNvSpPr txBox="1"/>
           <p:nvPr/>
         </p:nvSpPr>
         <p:spPr>
           <a:xfrm>
-            <a:off x="4005064" y="1043608"/>
-            <a:ext cx="1890340" cy="211832"/>
+            <a:off x="4178349" y="1148396"/>
+            <a:ext cx="1484702" cy="1569660"/>
           </a:xfrm>
-          <a:prstGeom prst="roundRect">
+          <a:prstGeom prst="rect">
             <a:avLst/>
           </a:prstGeom>
-          <a:solidFill>
-            <a:schemeClr val="tx2">
-              <a:lumMod val="20000"/>
-              <a:lumOff val="80000"/>
-            </a:schemeClr>
-          </a:solidFill>
-          <a:ln w="31750"/>
+          <a:noFill/>
         </p:spPr>
-        <p:style>
-          <a:lnRef idx="2">
-            <a:schemeClr val="accent1">
-              <a:shade val="50000"/>
-            </a:schemeClr>
-          </a:lnRef>
-          <a:fillRef idx="1">
-            <a:schemeClr val="accent1"/>
-          </a:fillRef>
-          <a:effectRef idx="0">
-            <a:schemeClr val="accent1"/>
-          </a:effectRef>
-          <a:fontRef idx="minor">
-            <a:schemeClr val="lt1"/>
-          </a:fontRef>
-        </p:style>
         <p:txBody>
-          <a:bodyPr rtlCol="0" anchor="ctr"/>
+          <a:bodyPr wrap="none" rtlCol="0">
+            <a:spAutoFit/>
+          </a:bodyPr>
           <a:lstStyle/>
           <a:p>
-            <a:pPr algn="ctr"/>
-            <a:r>
-              <a:rPr lang="de-DE" sz="1000" b="1" dirty="0" err="1" smtClean="0">
-                <a:solidFill>
-                  <a:schemeClr val="tx1"/>
-                </a:solidFill>
+            <a:pPr marL="285750" indent="-285750">
+              <a:buFont typeface="Arial" panose="020B0604020202020204" pitchFamily="34" charset="0"/>
+              <a:buChar char="•"/>
+            </a:pPr>
+            <a:r>
+              <a:rPr lang="de-DE" sz="1200" dirty="0" err="1" smtClean="0">
                 <a:latin typeface="Arial" panose="020B0604020202020204" pitchFamily="34" charset="0"/>
                 <a:cs typeface="Arial" panose="020B0604020202020204" pitchFamily="34" charset="0"/>
               </a:rPr>
               <a:t>Provisioning</a:t>
             </a:r>
-            <a:r>
-              <a:rPr lang="de-DE" sz="1000" b="1" dirty="0" smtClean="0">
-                <a:solidFill>
-                  <a:schemeClr val="tx1"/>
-                </a:solidFill>
+            <a:endParaRPr lang="de-DE" sz="1200" dirty="0" smtClean="0">
+              <a:latin typeface="Arial" panose="020B0604020202020204" pitchFamily="34" charset="0"/>
+              <a:cs typeface="Arial" panose="020B0604020202020204" pitchFamily="34" charset="0"/>
+            </a:endParaRPr>
+          </a:p>
+          <a:p>
+            <a:pPr marL="285750" indent="-285750">
+              <a:buFont typeface="Arial" panose="020B0604020202020204" pitchFamily="34" charset="0"/>
+              <a:buChar char="•"/>
+            </a:pPr>
+            <a:r>
+              <a:rPr lang="de-DE" sz="1200" dirty="0" err="1" smtClean="0">
                 <a:latin typeface="Arial" panose="020B0604020202020204" pitchFamily="34" charset="0"/>
                 <a:cs typeface="Arial" panose="020B0604020202020204" pitchFamily="34" charset="0"/>
               </a:rPr>
-              <a:t> Script</a:t>
-            </a:r>
-            <a:endParaRPr lang="de-DE" sz="1000" b="1" dirty="0">
-              <a:solidFill>
-                <a:schemeClr val="tx1"/>
-              </a:solidFill>
+              <a:t>Deprovisioning</a:t>
+            </a:r>
+            <a:endParaRPr lang="de-DE" sz="1200" dirty="0" smtClean="0">
               <a:latin typeface="Arial" panose="020B0604020202020204" pitchFamily="34" charset="0"/>
               <a:cs typeface="Arial" panose="020B0604020202020204" pitchFamily="34" charset="0"/>
             </a:endParaRPr>
           </a:p>
-        </p:txBody>
-      </p:sp>
-      <p:sp>
-        <p:nvSpPr>
-          <p:cNvPr id="32" name="Rounded Rectangle 31"/>
-          <p:cNvSpPr/>
-          <p:nvPr/>
-        </p:nvSpPr>
-        <p:spPr>
-          <a:xfrm>
-            <a:off x="4005064" y="1407840"/>
-            <a:ext cx="1890340" cy="211832"/>
-          </a:xfrm>
-          <a:prstGeom prst="roundRect">
-            <a:avLst/>
-          </a:prstGeom>
-          <a:solidFill>
-            <a:schemeClr val="tx2">
-              <a:lumMod val="20000"/>
-              <a:lumOff val="80000"/>
-            </a:schemeClr>
-          </a:solidFill>
-          <a:ln w="31750"/>
-        </p:spPr>
-        <p:style>
-          <a:lnRef idx="2">
-            <a:schemeClr val="accent1">
-              <a:shade val="50000"/>
-            </a:schemeClr>
-          </a:lnRef>
-          <a:fillRef idx="1">
-            <a:schemeClr val="accent1"/>
-          </a:fillRef>
-          <a:effectRef idx="0">
-            <a:schemeClr val="accent1"/>
-          </a:effectRef>
-          <a:fontRef idx="minor">
-            <a:schemeClr val="lt1"/>
-          </a:fontRef>
-        </p:style>
-        <p:txBody>
-          <a:bodyPr rtlCol="0" anchor="ctr"/>
-          <a:lstStyle/>
-          <a:p>
-            <a:pPr algn="ctr"/>
-            <a:r>
-              <a:rPr lang="de-DE" sz="1000" b="1" dirty="0" err="1" smtClean="0">
-                <a:solidFill>
-                  <a:schemeClr val="tx1"/>
-                </a:solidFill>
+          <a:p>
+            <a:pPr marL="285750" indent="-285750">
+              <a:buFont typeface="Arial" panose="020B0604020202020204" pitchFamily="34" charset="0"/>
+              <a:buChar char="•"/>
+            </a:pPr>
+            <a:r>
+              <a:rPr lang="de-DE" sz="1200" dirty="0" err="1" smtClean="0">
+                <a:latin typeface="Arial" panose="020B0604020202020204" pitchFamily="34" charset="0"/>
+                <a:cs typeface="Arial" panose="020B0604020202020204" pitchFamily="34" charset="0"/>
+              </a:rPr>
+              <a:t>Assign</a:t>
+            </a:r>
+            <a:r>
+              <a:rPr lang="de-DE" sz="1200" dirty="0" smtClean="0">
+                <a:latin typeface="Arial" panose="020B0604020202020204" pitchFamily="34" charset="0"/>
+                <a:cs typeface="Arial" panose="020B0604020202020204" pitchFamily="34" charset="0"/>
+              </a:rPr>
+              <a:t> User</a:t>
+            </a:r>
+          </a:p>
+          <a:p>
+            <a:pPr marL="285750" indent="-285750">
+              <a:buFont typeface="Arial" panose="020B0604020202020204" pitchFamily="34" charset="0"/>
+              <a:buChar char="•"/>
+            </a:pPr>
+            <a:r>
+              <a:rPr lang="de-DE" sz="1200" dirty="0" err="1" smtClean="0">
+                <a:latin typeface="Arial" panose="020B0604020202020204" pitchFamily="34" charset="0"/>
+                <a:cs typeface="Arial" panose="020B0604020202020204" pitchFamily="34" charset="0"/>
+              </a:rPr>
+              <a:t>Deassign</a:t>
+            </a:r>
+            <a:r>
+              <a:rPr lang="de-DE" sz="1200" dirty="0" smtClean="0">
+                <a:latin typeface="Arial" panose="020B0604020202020204" pitchFamily="34" charset="0"/>
+                <a:cs typeface="Arial" panose="020B0604020202020204" pitchFamily="34" charset="0"/>
+              </a:rPr>
+              <a:t> User</a:t>
+            </a:r>
+          </a:p>
+          <a:p>
+            <a:pPr marL="285750" indent="-285750">
+              <a:buFont typeface="Arial" panose="020B0604020202020204" pitchFamily="34" charset="0"/>
+              <a:buChar char="•"/>
+            </a:pPr>
+            <a:r>
+              <a:rPr lang="de-DE" sz="1200" dirty="0" err="1" smtClean="0">
                 <a:latin typeface="Arial" panose="020B0604020202020204" pitchFamily="34" charset="0"/>
                 <a:cs typeface="Arial" panose="020B0604020202020204" pitchFamily="34" charset="0"/>
               </a:rPr>
               <a:t>Modification</a:t>
             </a:r>
-            <a:r>
-              <a:rPr lang="de-DE" sz="1000" b="1" dirty="0" smtClean="0">
-                <a:solidFill>
-                  <a:schemeClr val="tx1"/>
-                </a:solidFill>
+            <a:endParaRPr lang="de-DE" sz="1200" dirty="0" smtClean="0">
+              <a:latin typeface="Arial" panose="020B0604020202020204" pitchFamily="34" charset="0"/>
+              <a:cs typeface="Arial" panose="020B0604020202020204" pitchFamily="34" charset="0"/>
+            </a:endParaRPr>
+          </a:p>
+          <a:p>
+            <a:pPr marL="285750" indent="-285750">
+              <a:buFont typeface="Arial" panose="020B0604020202020204" pitchFamily="34" charset="0"/>
+              <a:buChar char="•"/>
+            </a:pPr>
+            <a:r>
+              <a:rPr lang="de-DE" sz="1200" dirty="0" smtClean="0">
                 <a:latin typeface="Arial" panose="020B0604020202020204" pitchFamily="34" charset="0"/>
                 <a:cs typeface="Arial" panose="020B0604020202020204" pitchFamily="34" charset="0"/>
               </a:rPr>
-              <a:t> Script</a:t>
-            </a:r>
-            <a:endParaRPr lang="de-DE" sz="1000" b="1" dirty="0">
-              <a:solidFill>
-                <a:schemeClr val="tx1"/>
-              </a:solidFill>
-              <a:latin typeface="Arial" panose="020B0604020202020204" pitchFamily="34" charset="0"/>
-              <a:cs typeface="Arial" panose="020B0604020202020204" pitchFamily="34" charset="0"/>
-            </a:endParaRPr>
-          </a:p>
-        </p:txBody>
-      </p:sp>
-      <p:sp>
-        <p:nvSpPr>
-          <p:cNvPr id="33" name="Rounded Rectangle 32"/>
-          <p:cNvSpPr/>
-          <p:nvPr/>
-        </p:nvSpPr>
-        <p:spPr>
-          <a:xfrm>
-            <a:off x="4005064" y="1767880"/>
-            <a:ext cx="1890340" cy="211832"/>
-          </a:xfrm>
-          <a:prstGeom prst="roundRect">
-            <a:avLst/>
-          </a:prstGeom>
-          <a:solidFill>
-            <a:schemeClr val="tx2">
-              <a:lumMod val="20000"/>
-              <a:lumOff val="80000"/>
-            </a:schemeClr>
-          </a:solidFill>
-          <a:ln w="31750"/>
-        </p:spPr>
-        <p:style>
-          <a:lnRef idx="2">
-            <a:schemeClr val="accent1">
-              <a:shade val="50000"/>
-            </a:schemeClr>
-          </a:lnRef>
-          <a:fillRef idx="1">
-            <a:schemeClr val="accent1"/>
-          </a:fillRef>
-          <a:effectRef idx="0">
-            <a:schemeClr val="accent1"/>
-          </a:effectRef>
-          <a:fontRef idx="minor">
-            <a:schemeClr val="lt1"/>
-          </a:fontRef>
-        </p:style>
-        <p:txBody>
-          <a:bodyPr rtlCol="0" anchor="ctr"/>
-          <a:lstStyle/>
-          <a:p>
-            <a:pPr algn="ctr"/>
-            <a:r>
-              <a:rPr lang="de-DE" sz="1000" b="1" dirty="0" err="1" smtClean="0">
-                <a:solidFill>
-                  <a:schemeClr val="tx1"/>
-                </a:solidFill>
+              <a:t>Operation</a:t>
+            </a:r>
+          </a:p>
+          <a:p>
+            <a:pPr marL="285750" indent="-285750">
+              <a:buFont typeface="Arial" panose="020B0604020202020204" pitchFamily="34" charset="0"/>
+              <a:buChar char="•"/>
+            </a:pPr>
+            <a:r>
+              <a:rPr lang="de-DE" sz="1200" dirty="0" smtClean="0">
                 <a:latin typeface="Arial" panose="020B0604020202020204" pitchFamily="34" charset="0"/>
                 <a:cs typeface="Arial" panose="020B0604020202020204" pitchFamily="34" charset="0"/>
               </a:rPr>
-              <a:t>Deprovisioning</a:t>
-            </a:r>
-            <a:r>
-              <a:rPr lang="de-DE" sz="1000" b="1" dirty="0" smtClean="0">
-                <a:solidFill>
-                  <a:schemeClr val="tx1"/>
-                </a:solidFill>
+              <a:t>Check Status</a:t>
+            </a:r>
+          </a:p>
+          <a:p>
+            <a:pPr marL="285750" indent="-285750">
+              <a:buFont typeface="Arial" panose="020B0604020202020204" pitchFamily="34" charset="0"/>
+              <a:buChar char="•"/>
+            </a:pPr>
+            <a:r>
+              <a:rPr lang="de-DE" sz="1200" dirty="0" err="1" smtClean="0">
                 <a:latin typeface="Arial" panose="020B0604020202020204" pitchFamily="34" charset="0"/>
                 <a:cs typeface="Arial" panose="020B0604020202020204" pitchFamily="34" charset="0"/>
               </a:rPr>
-              <a:t> Script</a:t>
-            </a:r>
-            <a:endParaRPr lang="de-DE" sz="1000" b="1" dirty="0">
-              <a:solidFill>
-                <a:schemeClr val="tx1"/>
-              </a:solidFill>
-              <a:latin typeface="Arial" panose="020B0604020202020204" pitchFamily="34" charset="0"/>
-              <a:cs typeface="Arial" panose="020B0604020202020204" pitchFamily="34" charset="0"/>
-            </a:endParaRPr>
-          </a:p>
-        </p:txBody>
-      </p:sp>
-      <p:sp>
-        <p:nvSpPr>
-          <p:cNvPr id="41" name="Rounded Rectangle 40"/>
-          <p:cNvSpPr/>
-          <p:nvPr/>
-        </p:nvSpPr>
-        <p:spPr>
-          <a:xfrm>
-            <a:off x="4005064" y="2127920"/>
-            <a:ext cx="1890340" cy="211832"/>
-          </a:xfrm>
-          <a:prstGeom prst="roundRect">
-            <a:avLst/>
-          </a:prstGeom>
-          <a:solidFill>
-            <a:schemeClr val="tx2">
-              <a:lumMod val="20000"/>
-              <a:lumOff val="80000"/>
-            </a:schemeClr>
-          </a:solidFill>
-          <a:ln w="31750"/>
-        </p:spPr>
-        <p:style>
-          <a:lnRef idx="2">
-            <a:schemeClr val="accent1">
-              <a:shade val="50000"/>
-            </a:schemeClr>
-          </a:lnRef>
-          <a:fillRef idx="1">
-            <a:schemeClr val="accent1"/>
-          </a:fillRef>
-          <a:effectRef idx="0">
-            <a:schemeClr val="accent1"/>
-          </a:effectRef>
-          <a:fontRef idx="minor">
-            <a:schemeClr val="lt1"/>
-          </a:fontRef>
-        </p:style>
-        <p:txBody>
-          <a:bodyPr rtlCol="0" anchor="ctr"/>
-          <a:lstStyle/>
-          <a:p>
-            <a:pPr algn="ctr"/>
-            <a:r>
-              <a:rPr lang="de-DE" sz="1000" b="1" dirty="0" err="1" smtClean="0">
-                <a:solidFill>
-                  <a:schemeClr val="tx1"/>
-                </a:solidFill>
-                <a:latin typeface="Arial" panose="020B0604020202020204" pitchFamily="34" charset="0"/>
-                <a:cs typeface="Arial" panose="020B0604020202020204" pitchFamily="34" charset="0"/>
-              </a:rPr>
-              <a:t>Assign</a:t>
-            </a:r>
-            <a:r>
-              <a:rPr lang="de-DE" sz="1000" b="1" dirty="0" smtClean="0">
-                <a:solidFill>
-                  <a:schemeClr val="tx1"/>
-                </a:solidFill>
-                <a:latin typeface="Arial" panose="020B0604020202020204" pitchFamily="34" charset="0"/>
-                <a:cs typeface="Arial" panose="020B0604020202020204" pitchFamily="34" charset="0"/>
-              </a:rPr>
-              <a:t> User Script</a:t>
-            </a:r>
-            <a:endParaRPr lang="de-DE" sz="1000" b="1" dirty="0">
-              <a:solidFill>
-                <a:schemeClr val="tx1"/>
-              </a:solidFill>
+              <a:t>Verification</a:t>
+            </a:r>
+            <a:endParaRPr lang="de-DE" sz="1200" dirty="0">
               <a:latin typeface="Arial" panose="020B0604020202020204" pitchFamily="34" charset="0"/>
               <a:cs typeface="Arial" panose="020B0604020202020204" pitchFamily="34" charset="0"/>
             </a:endParaRPr>
@@ -5139,7 +4978,7 @@
       </p:grpSpPr>
       <p:grpSp>
         <p:nvGrpSpPr>
-          <p:cNvPr id="23" name="Group 22"/>
+          <p:cNvPr id="2" name="Group 1"/>
           <p:cNvGrpSpPr/>
           <p:nvPr/>
         </p:nvGrpSpPr>
@@ -5153,7 +4992,7 @@
         </p:grpSpPr>
         <p:sp>
           <p:nvSpPr>
-            <p:cNvPr id="26" name="Rounded Rectangle 25"/>
+            <p:cNvPr id="18" name="Rounded Rectangle 17"/>
             <p:cNvSpPr/>
             <p:nvPr/>
           </p:nvSpPr>
@@ -5294,7 +5133,7 @@
         </p:sp>
         <p:sp>
           <p:nvSpPr>
-            <p:cNvPr id="29" name="Rounded Rectangle 28"/>
+            <p:cNvPr id="19" name="Rounded Rectangle 18"/>
             <p:cNvSpPr/>
             <p:nvPr/>
           </p:nvSpPr>
@@ -5430,7 +5269,7 @@
         </p:sp>
         <p:sp>
           <p:nvSpPr>
-            <p:cNvPr id="30" name="Rounded Rectangle 29"/>
+            <p:cNvPr id="22" name="Rounded Rectangle 21"/>
             <p:cNvSpPr/>
             <p:nvPr/>
           </p:nvSpPr>
@@ -5575,7 +5414,7 @@
         </p:sp>
         <p:sp>
           <p:nvSpPr>
-            <p:cNvPr id="31" name="Rounded Rectangle 30"/>
+            <p:cNvPr id="24" name="Rounded Rectangle 23"/>
             <p:cNvSpPr/>
             <p:nvPr/>
           </p:nvSpPr>
@@ -5720,7 +5559,7 @@
         </p:sp>
         <p:sp>
           <p:nvSpPr>
-            <p:cNvPr id="32" name="Rounded Rectangle 31"/>
+            <p:cNvPr id="25" name="Rounded Rectangle 24"/>
             <p:cNvSpPr/>
             <p:nvPr/>
           </p:nvSpPr>
@@ -5878,7 +5717,7 @@
         </p:sp>
         <p:sp>
           <p:nvSpPr>
-            <p:cNvPr id="33" name="TextBox 11"/>
+            <p:cNvPr id="27" name="TextBox 11"/>
             <p:cNvSpPr txBox="1"/>
             <p:nvPr/>
           </p:nvSpPr>
@@ -6015,14 +5854,14 @@
         </p:sp>
         <p:sp>
           <p:nvSpPr>
-            <p:cNvPr id="41" name="TextBox 12"/>
+            <p:cNvPr id="28" name="TextBox 12"/>
             <p:cNvSpPr txBox="1"/>
             <p:nvPr/>
           </p:nvSpPr>
           <p:spPr>
             <a:xfrm>
               <a:off x="3926111" y="694601"/>
-              <a:ext cx="553357" cy="276999"/>
+              <a:ext cx="1117614" cy="276999"/>
             </a:xfrm>
             <a:prstGeom prst="rect">
               <a:avLst/>
@@ -6134,7 +5973,7 @@
                   <a:latin typeface="Arial" panose="020B0604020202020204" pitchFamily="34" charset="0"/>
                   <a:cs typeface="Arial" panose="020B0604020202020204" pitchFamily="34" charset="0"/>
                 </a:rPr>
-                <a:t>Shell</a:t>
+                <a:t>Shell Scripts</a:t>
               </a:r>
               <a:endParaRPr lang="de-DE" sz="1200" b="1" dirty="0">
                 <a:latin typeface="Arial" panose="020B0604020202020204" pitchFamily="34" charset="0"/>
@@ -6145,7 +5984,7 @@
         </p:sp>
         <p:sp>
           <p:nvSpPr>
-            <p:cNvPr id="42" name="Rounded Rectangle 41"/>
+            <p:cNvPr id="34" name="Rounded Rectangle 33"/>
             <p:cNvSpPr/>
             <p:nvPr/>
           </p:nvSpPr>
@@ -6291,13 +6130,6 @@
                 </a:rPr>
                 <a:t>Shell</a:t>
               </a:r>
-              <a:endParaRPr lang="de-DE" sz="1000" b="1" dirty="0" smtClean="0">
-                <a:solidFill>
-                  <a:schemeClr val="tx1"/>
-                </a:solidFill>
-                <a:latin typeface="Arial" panose="020B0604020202020204" pitchFamily="34" charset="0"/>
-                <a:cs typeface="Arial" panose="020B0604020202020204" pitchFamily="34" charset="0"/>
-              </a:endParaRPr>
             </a:p>
             <a:p>
               <a:pPr algn="ctr"/>
@@ -6336,7 +6168,7 @@
         </p:sp>
         <p:sp>
           <p:nvSpPr>
-            <p:cNvPr id="43" name="TextBox 19"/>
+            <p:cNvPr id="35" name="TextBox 19"/>
             <p:cNvSpPr txBox="1"/>
             <p:nvPr/>
           </p:nvSpPr>
@@ -6466,7 +6298,7 @@
         </p:sp>
         <p:sp>
           <p:nvSpPr>
-            <p:cNvPr id="44" name="TextBox 20"/>
+            <p:cNvPr id="36" name="TextBox 20"/>
             <p:cNvSpPr txBox="1"/>
             <p:nvPr/>
           </p:nvSpPr>
@@ -6617,10 +6449,10 @@
         </p:sp>
         <p:cxnSp>
           <p:nvCxnSpPr>
-            <p:cNvPr id="45" name="Straight Arrow Connector 44"/>
+            <p:cNvPr id="37" name="Straight Arrow Connector 36"/>
             <p:cNvCxnSpPr>
-              <a:stCxn id="32" idx="3"/>
-              <a:endCxn id="42" idx="1"/>
+              <a:stCxn id="25" idx="3"/>
+              <a:endCxn id="34" idx="1"/>
             </p:cNvCxnSpPr>
             <p:nvPr/>
           </p:nvCxnSpPr>
@@ -6656,7 +6488,7 @@
         </p:cxnSp>
         <p:cxnSp>
           <p:nvCxnSpPr>
-            <p:cNvPr id="46" name="Straight Arrow Connector 45"/>
+            <p:cNvPr id="38" name="Straight Arrow Connector 37"/>
             <p:cNvCxnSpPr/>
             <p:nvPr/>
           </p:nvCxnSpPr>
@@ -6692,9 +6524,9 @@
         </p:cxnSp>
         <p:cxnSp>
           <p:nvCxnSpPr>
-            <p:cNvPr id="47" name="Straight Arrow Connector 46"/>
+            <p:cNvPr id="39" name="Straight Arrow Connector 38"/>
             <p:cNvCxnSpPr>
-              <a:stCxn id="42" idx="3"/>
+              <a:stCxn id="34" idx="3"/>
             </p:cNvCxnSpPr>
             <p:nvPr/>
           </p:nvCxnSpPr>
@@ -6730,9 +6562,9 @@
         </p:cxnSp>
         <p:cxnSp>
           <p:nvCxnSpPr>
-            <p:cNvPr id="48" name="Straight Arrow Connector 47"/>
+            <p:cNvPr id="40" name="Straight Arrow Connector 39"/>
             <p:cNvCxnSpPr>
-              <a:stCxn id="29" idx="1"/>
+              <a:stCxn id="19" idx="1"/>
             </p:cNvCxnSpPr>
             <p:nvPr/>
           </p:nvCxnSpPr>
@@ -6769,14 +6601,14 @@
       </p:grpSp>
       <p:sp>
         <p:nvSpPr>
-          <p:cNvPr id="49" name="Rounded Rectangle 48"/>
+          <p:cNvPr id="31" name="Rounded Rectangle 30"/>
           <p:cNvSpPr/>
           <p:nvPr/>
         </p:nvSpPr>
         <p:spPr>
           <a:xfrm>
-            <a:off x="4005064" y="2487960"/>
-            <a:ext cx="1890340" cy="211832"/>
+            <a:off x="4005064" y="1043608"/>
+            <a:ext cx="1890340" cy="1718196"/>
           </a:xfrm>
           <a:prstGeom prst="roundRect">
             <a:avLst/>
@@ -6810,30 +6642,525 @@
           <a:lstStyle/>
           <a:p>
             <a:pPr algn="ctr"/>
-            <a:r>
-              <a:rPr lang="de-DE" sz="1000" b="1" dirty="0" err="1" smtClean="0">
-                <a:solidFill>
-                  <a:schemeClr val="tx1"/>
-                </a:solidFill>
+            <a:endParaRPr lang="de-DE" sz="1000" b="1" dirty="0">
+              <a:solidFill>
+                <a:schemeClr val="tx1"/>
+              </a:solidFill>
+              <a:latin typeface="Arial" panose="020B0604020202020204" pitchFamily="34" charset="0"/>
+              <a:cs typeface="Arial" panose="020B0604020202020204" pitchFamily="34" charset="0"/>
+            </a:endParaRPr>
+          </a:p>
+        </p:txBody>
+      </p:sp>
+      <p:sp>
+        <p:nvSpPr>
+          <p:cNvPr id="3" name="TextBox 2"/>
+          <p:cNvSpPr txBox="1"/>
+          <p:nvPr/>
+        </p:nvSpPr>
+        <p:spPr>
+          <a:xfrm>
+            <a:off x="4178349" y="1148396"/>
+            <a:ext cx="1484702" cy="1569660"/>
+          </a:xfrm>
+          <a:prstGeom prst="rect">
+            <a:avLst/>
+          </a:prstGeom>
+          <a:noFill/>
+        </p:spPr>
+        <p:txBody>
+          <a:bodyPr wrap="none" rtlCol="0">
+            <a:spAutoFit/>
+          </a:bodyPr>
+          <a:lstStyle/>
+          <a:p>
+            <a:pPr marL="285750" indent="-285750">
+              <a:buFont typeface="Arial" panose="020B0604020202020204" pitchFamily="34" charset="0"/>
+              <a:buChar char="•"/>
+            </a:pPr>
+            <a:r>
+              <a:rPr lang="de-DE" sz="1200" dirty="0" err="1" smtClean="0">
+                <a:latin typeface="Arial" panose="020B0604020202020204" pitchFamily="34" charset="0"/>
+                <a:cs typeface="Arial" panose="020B0604020202020204" pitchFamily="34" charset="0"/>
+              </a:rPr>
+              <a:t>Provisioning</a:t>
+            </a:r>
+            <a:endParaRPr lang="de-DE" sz="1200" dirty="0" smtClean="0">
+              <a:latin typeface="Arial" panose="020B0604020202020204" pitchFamily="34" charset="0"/>
+              <a:cs typeface="Arial" panose="020B0604020202020204" pitchFamily="34" charset="0"/>
+            </a:endParaRPr>
+          </a:p>
+          <a:p>
+            <a:pPr marL="285750" indent="-285750">
+              <a:buFont typeface="Arial" panose="020B0604020202020204" pitchFamily="34" charset="0"/>
+              <a:buChar char="•"/>
+            </a:pPr>
+            <a:r>
+              <a:rPr lang="de-DE" sz="1200" dirty="0" err="1" smtClean="0">
+                <a:latin typeface="Arial" panose="020B0604020202020204" pitchFamily="34" charset="0"/>
+                <a:cs typeface="Arial" panose="020B0604020202020204" pitchFamily="34" charset="0"/>
+              </a:rPr>
+              <a:t>Deprovisioning</a:t>
+            </a:r>
+            <a:endParaRPr lang="de-DE" sz="1200" dirty="0" smtClean="0">
+              <a:latin typeface="Arial" panose="020B0604020202020204" pitchFamily="34" charset="0"/>
+              <a:cs typeface="Arial" panose="020B0604020202020204" pitchFamily="34" charset="0"/>
+            </a:endParaRPr>
+          </a:p>
+          <a:p>
+            <a:pPr marL="285750" indent="-285750">
+              <a:buFont typeface="Arial" panose="020B0604020202020204" pitchFamily="34" charset="0"/>
+              <a:buChar char="•"/>
+            </a:pPr>
+            <a:r>
+              <a:rPr lang="de-DE" sz="1200" dirty="0" err="1" smtClean="0">
+                <a:latin typeface="Arial" panose="020B0604020202020204" pitchFamily="34" charset="0"/>
+                <a:cs typeface="Arial" panose="020B0604020202020204" pitchFamily="34" charset="0"/>
+              </a:rPr>
+              <a:t>Assign</a:t>
+            </a:r>
+            <a:r>
+              <a:rPr lang="de-DE" sz="1200" dirty="0" smtClean="0">
+                <a:latin typeface="Arial" panose="020B0604020202020204" pitchFamily="34" charset="0"/>
+                <a:cs typeface="Arial" panose="020B0604020202020204" pitchFamily="34" charset="0"/>
+              </a:rPr>
+              <a:t> User</a:t>
+            </a:r>
+          </a:p>
+          <a:p>
+            <a:pPr marL="285750" indent="-285750">
+              <a:buFont typeface="Arial" panose="020B0604020202020204" pitchFamily="34" charset="0"/>
+              <a:buChar char="•"/>
+            </a:pPr>
+            <a:r>
+              <a:rPr lang="de-DE" sz="1200" dirty="0" err="1" smtClean="0">
                 <a:latin typeface="Arial" panose="020B0604020202020204" pitchFamily="34" charset="0"/>
                 <a:cs typeface="Arial" panose="020B0604020202020204" pitchFamily="34" charset="0"/>
               </a:rPr>
               <a:t>Deassign</a:t>
             </a:r>
             <a:r>
-              <a:rPr lang="de-DE" sz="1000" b="1" dirty="0" smtClean="0">
-                <a:solidFill>
-                  <a:schemeClr val="tx1"/>
-                </a:solidFill>
+              <a:rPr lang="de-DE" sz="1200" dirty="0" smtClean="0">
                 <a:latin typeface="Arial" panose="020B0604020202020204" pitchFamily="34" charset="0"/>
                 <a:cs typeface="Arial" panose="020B0604020202020204" pitchFamily="34" charset="0"/>
               </a:rPr>
-              <a:t> User Script</a:t>
-            </a:r>
-            <a:endParaRPr lang="de-DE" sz="1000" b="1" dirty="0">
-              <a:solidFill>
-                <a:schemeClr val="tx1"/>
-              </a:solidFill>
+              <a:t> User</a:t>
+            </a:r>
+          </a:p>
+          <a:p>
+            <a:pPr marL="285750" indent="-285750">
+              <a:buFont typeface="Arial" panose="020B0604020202020204" pitchFamily="34" charset="0"/>
+              <a:buChar char="•"/>
+            </a:pPr>
+            <a:r>
+              <a:rPr lang="de-DE" sz="1200" dirty="0" err="1" smtClean="0">
+                <a:latin typeface="Arial" panose="020B0604020202020204" pitchFamily="34" charset="0"/>
+                <a:cs typeface="Arial" panose="020B0604020202020204" pitchFamily="34" charset="0"/>
+              </a:rPr>
+              <a:t>Modification</a:t>
+            </a:r>
+            <a:endParaRPr lang="de-DE" sz="1200" dirty="0" smtClean="0">
+              <a:latin typeface="Arial" panose="020B0604020202020204" pitchFamily="34" charset="0"/>
+              <a:cs typeface="Arial" panose="020B0604020202020204" pitchFamily="34" charset="0"/>
+            </a:endParaRPr>
+          </a:p>
+          <a:p>
+            <a:pPr marL="285750" indent="-285750">
+              <a:buFont typeface="Arial" panose="020B0604020202020204" pitchFamily="34" charset="0"/>
+              <a:buChar char="•"/>
+            </a:pPr>
+            <a:r>
+              <a:rPr lang="de-DE" sz="1200" dirty="0" smtClean="0">
+                <a:latin typeface="Arial" panose="020B0604020202020204" pitchFamily="34" charset="0"/>
+                <a:cs typeface="Arial" panose="020B0604020202020204" pitchFamily="34" charset="0"/>
+              </a:rPr>
+              <a:t>Operation</a:t>
+            </a:r>
+          </a:p>
+          <a:p>
+            <a:pPr marL="285750" indent="-285750">
+              <a:buFont typeface="Arial" panose="020B0604020202020204" pitchFamily="34" charset="0"/>
+              <a:buChar char="•"/>
+            </a:pPr>
+            <a:r>
+              <a:rPr lang="de-DE" sz="1200" dirty="0" smtClean="0">
+                <a:latin typeface="Arial" panose="020B0604020202020204" pitchFamily="34" charset="0"/>
+                <a:cs typeface="Arial" panose="020B0604020202020204" pitchFamily="34" charset="0"/>
+              </a:rPr>
+              <a:t>Check Status</a:t>
+            </a:r>
+          </a:p>
+          <a:p>
+            <a:pPr marL="285750" indent="-285750">
+              <a:buFont typeface="Arial" panose="020B0604020202020204" pitchFamily="34" charset="0"/>
+              <a:buChar char="•"/>
+            </a:pPr>
+            <a:r>
+              <a:rPr lang="de-DE" sz="1200" dirty="0" err="1" smtClean="0">
+                <a:latin typeface="Arial" panose="020B0604020202020204" pitchFamily="34" charset="0"/>
+                <a:cs typeface="Arial" panose="020B0604020202020204" pitchFamily="34" charset="0"/>
+              </a:rPr>
+              <a:t>Verification</a:t>
+            </a:r>
+            <a:endParaRPr lang="de-DE" sz="1200" dirty="0">
+              <a:latin typeface="Arial" panose="020B0604020202020204" pitchFamily="34" charset="0"/>
+              <a:cs typeface="Arial" panose="020B0604020202020204" pitchFamily="34" charset="0"/>
+            </a:endParaRPr>
+          </a:p>
+        </p:txBody>
+      </p:sp>
+    </p:spTree>
+    <p:extLst>
+      <p:ext uri="{BB962C8B-B14F-4D97-AF65-F5344CB8AC3E}">
+        <p14:creationId xmlns:p14="http://schemas.microsoft.com/office/powerpoint/2010/main" val="2501095706"/>
+      </p:ext>
+    </p:extLst>
+  </p:cSld>
+  <p:clrMapOvr>
+    <a:masterClrMapping/>
+  </p:clrMapOvr>
+  <p:timing>
+    <p:tnLst>
+      <p:par>
+        <p:cTn id="1" dur="indefinite" restart="never" nodeType="tmRoot"/>
+      </p:par>
+    </p:tnLst>
+  </p:timing>
+</p:sld>
+</file>
+
+<file path=ppt/slides/slide3.xml><?xml version="1.0" encoding="utf-8"?>
+<p:sld xmlns:a="http://schemas.openxmlformats.org/drawingml/2006/main" xmlns:r="http://schemas.openxmlformats.org/officeDocument/2006/relationships" xmlns:p="http://schemas.openxmlformats.org/presentationml/2006/main">
+  <p:cSld>
+    <p:spTree>
+      <p:nvGrpSpPr>
+        <p:cNvPr id="1" name=""/>
+        <p:cNvGrpSpPr/>
+        <p:nvPr/>
+      </p:nvGrpSpPr>
+      <p:grpSpPr>
+        <a:xfrm>
+          <a:off x="0" y="0"/>
+          <a:ext cx="0" cy="0"/>
+          <a:chOff x="0" y="0"/>
+          <a:chExt cx="0" cy="0"/>
+        </a:xfrm>
+      </p:grpSpPr>
+      <p:cxnSp>
+        <p:nvCxnSpPr>
+          <p:cNvPr id="47" name="Straight Arrow Connector 46"/>
+          <p:cNvCxnSpPr>
+            <a:stCxn id="51" idx="2"/>
+            <a:endCxn id="58" idx="0"/>
+          </p:cNvCxnSpPr>
+          <p:nvPr/>
+        </p:nvCxnSpPr>
+        <p:spPr>
+          <a:xfrm flipH="1">
+            <a:off x="4898847" y="4454441"/>
+            <a:ext cx="1" cy="1928500"/>
+          </a:xfrm>
+          <a:prstGeom prst="straightConnector1">
+            <a:avLst/>
+          </a:prstGeom>
+          <a:ln w="19050">
+            <a:solidFill>
+              <a:schemeClr val="tx2"/>
+            </a:solidFill>
+            <a:tailEnd type="arrow"/>
+          </a:ln>
+        </p:spPr>
+        <p:style>
+          <a:lnRef idx="1">
+            <a:schemeClr val="accent1"/>
+          </a:lnRef>
+          <a:fillRef idx="0">
+            <a:schemeClr val="accent1"/>
+          </a:fillRef>
+          <a:effectRef idx="0">
+            <a:schemeClr val="accent1"/>
+          </a:effectRef>
+          <a:fontRef idx="minor">
+            <a:schemeClr val="tx1"/>
+          </a:fontRef>
+        </p:style>
+      </p:cxnSp>
+      <p:sp>
+        <p:nvSpPr>
+          <p:cNvPr id="26" name="Rounded Rectangle 25"/>
+          <p:cNvSpPr/>
+          <p:nvPr/>
+        </p:nvSpPr>
+        <p:spPr>
+          <a:xfrm>
+            <a:off x="477032" y="3339358"/>
+            <a:ext cx="2087872" cy="2160240"/>
+          </a:xfrm>
+          <a:prstGeom prst="roundRect">
+            <a:avLst/>
+          </a:prstGeom>
+          <a:solidFill>
+            <a:schemeClr val="accent2">
+              <a:lumMod val="20000"/>
+              <a:lumOff val="80000"/>
+            </a:schemeClr>
+          </a:solidFill>
+          <a:ln w="31750">
+            <a:solidFill>
+              <a:srgbClr val="C00000"/>
+            </a:solidFill>
+          </a:ln>
+        </p:spPr>
+        <p:style>
+          <a:lnRef idx="2">
+            <a:schemeClr val="accent1">
+              <a:shade val="50000"/>
+            </a:schemeClr>
+          </a:lnRef>
+          <a:fillRef idx="1">
+            <a:schemeClr val="accent1"/>
+          </a:fillRef>
+          <a:effectRef idx="0">
+            <a:schemeClr val="accent1"/>
+          </a:effectRef>
+          <a:fontRef idx="minor">
+            <a:schemeClr val="lt1"/>
+          </a:fontRef>
+        </p:style>
+        <p:txBody>
+          <a:bodyPr rtlCol="0" anchor="ctr"/>
+          <a:lstStyle>
+            <a:defPPr>
+              <a:defRPr lang="de-DE"/>
+            </a:defPPr>
+            <a:lvl1pPr marL="0" algn="l" defTabSz="914400" rtl="0" eaLnBrk="1" latinLnBrk="0" hangingPunct="1">
+              <a:defRPr sz="1800" kern="1200">
+                <a:solidFill>
+                  <a:schemeClr val="lt1"/>
+                </a:solidFill>
+                <a:latin typeface="+mn-lt"/>
+                <a:ea typeface="+mn-ea"/>
+                <a:cs typeface="+mn-cs"/>
+              </a:defRPr>
+            </a:lvl1pPr>
+            <a:lvl2pPr marL="457200" algn="l" defTabSz="914400" rtl="0" eaLnBrk="1" latinLnBrk="0" hangingPunct="1">
+              <a:defRPr sz="1800" kern="1200">
+                <a:solidFill>
+                  <a:schemeClr val="lt1"/>
+                </a:solidFill>
+                <a:latin typeface="+mn-lt"/>
+                <a:ea typeface="+mn-ea"/>
+                <a:cs typeface="+mn-cs"/>
+              </a:defRPr>
+            </a:lvl2pPr>
+            <a:lvl3pPr marL="914400" algn="l" defTabSz="914400" rtl="0" eaLnBrk="1" latinLnBrk="0" hangingPunct="1">
+              <a:defRPr sz="1800" kern="1200">
+                <a:solidFill>
+                  <a:schemeClr val="lt1"/>
+                </a:solidFill>
+                <a:latin typeface="+mn-lt"/>
+                <a:ea typeface="+mn-ea"/>
+                <a:cs typeface="+mn-cs"/>
+              </a:defRPr>
+            </a:lvl3pPr>
+            <a:lvl4pPr marL="1371600" algn="l" defTabSz="914400" rtl="0" eaLnBrk="1" latinLnBrk="0" hangingPunct="1">
+              <a:defRPr sz="1800" kern="1200">
+                <a:solidFill>
+                  <a:schemeClr val="lt1"/>
+                </a:solidFill>
+                <a:latin typeface="+mn-lt"/>
+                <a:ea typeface="+mn-ea"/>
+                <a:cs typeface="+mn-cs"/>
+              </a:defRPr>
+            </a:lvl4pPr>
+            <a:lvl5pPr marL="1828800" algn="l" defTabSz="914400" rtl="0" eaLnBrk="1" latinLnBrk="0" hangingPunct="1">
+              <a:defRPr sz="1800" kern="1200">
+                <a:solidFill>
+                  <a:schemeClr val="lt1"/>
+                </a:solidFill>
+                <a:latin typeface="+mn-lt"/>
+                <a:ea typeface="+mn-ea"/>
+                <a:cs typeface="+mn-cs"/>
+              </a:defRPr>
+            </a:lvl5pPr>
+            <a:lvl6pPr marL="2286000" algn="l" defTabSz="914400" rtl="0" eaLnBrk="1" latinLnBrk="0" hangingPunct="1">
+              <a:defRPr sz="1800" kern="1200">
+                <a:solidFill>
+                  <a:schemeClr val="lt1"/>
+                </a:solidFill>
+                <a:latin typeface="+mn-lt"/>
+                <a:ea typeface="+mn-ea"/>
+                <a:cs typeface="+mn-cs"/>
+              </a:defRPr>
+            </a:lvl6pPr>
+            <a:lvl7pPr marL="2743200" algn="l" defTabSz="914400" rtl="0" eaLnBrk="1" latinLnBrk="0" hangingPunct="1">
+              <a:defRPr sz="1800" kern="1200">
+                <a:solidFill>
+                  <a:schemeClr val="lt1"/>
+                </a:solidFill>
+                <a:latin typeface="+mn-lt"/>
+                <a:ea typeface="+mn-ea"/>
+                <a:cs typeface="+mn-cs"/>
+              </a:defRPr>
+            </a:lvl7pPr>
+            <a:lvl8pPr marL="3200400" algn="l" defTabSz="914400" rtl="0" eaLnBrk="1" latinLnBrk="0" hangingPunct="1">
+              <a:defRPr sz="1800" kern="1200">
+                <a:solidFill>
+                  <a:schemeClr val="lt1"/>
+                </a:solidFill>
+                <a:latin typeface="+mn-lt"/>
+                <a:ea typeface="+mn-ea"/>
+                <a:cs typeface="+mn-cs"/>
+              </a:defRPr>
+            </a:lvl8pPr>
+            <a:lvl9pPr marL="3657600" algn="l" defTabSz="914400" rtl="0" eaLnBrk="1" latinLnBrk="0" hangingPunct="1">
+              <a:defRPr sz="1800" kern="1200">
+                <a:solidFill>
+                  <a:schemeClr val="lt1"/>
+                </a:solidFill>
+                <a:latin typeface="+mn-lt"/>
+                <a:ea typeface="+mn-ea"/>
+                <a:cs typeface="+mn-cs"/>
+              </a:defRPr>
+            </a:lvl9pPr>
+          </a:lstStyle>
+          <a:p>
+            <a:pPr algn="ctr"/>
+            <a:endParaRPr lang="de-DE" sz="1000" b="1" dirty="0"/>
+          </a:p>
+        </p:txBody>
+      </p:sp>
+      <p:sp>
+        <p:nvSpPr>
+          <p:cNvPr id="32" name="TextBox 11"/>
+          <p:cNvSpPr txBox="1"/>
+          <p:nvPr/>
+        </p:nvSpPr>
+        <p:spPr>
+          <a:xfrm>
+            <a:off x="645635" y="3443633"/>
+            <a:ext cx="2124236" cy="276999"/>
+          </a:xfrm>
+          <a:prstGeom prst="rect">
+            <a:avLst/>
+          </a:prstGeom>
+          <a:noFill/>
+        </p:spPr>
+        <p:txBody>
+          <a:bodyPr wrap="square" rtlCol="0">
+            <a:spAutoFit/>
+          </a:bodyPr>
+          <a:lstStyle>
+            <a:defPPr>
+              <a:defRPr lang="de-DE"/>
+            </a:defPPr>
+            <a:lvl1pPr marL="0" algn="l" defTabSz="914400" rtl="0" eaLnBrk="1" latinLnBrk="0" hangingPunct="1">
+              <a:defRPr sz="1800" kern="1200">
+                <a:solidFill>
+                  <a:schemeClr val="tx1"/>
+                </a:solidFill>
+                <a:latin typeface="+mn-lt"/>
+                <a:ea typeface="+mn-ea"/>
+                <a:cs typeface="+mn-cs"/>
+              </a:defRPr>
+            </a:lvl1pPr>
+            <a:lvl2pPr marL="457200" algn="l" defTabSz="914400" rtl="0" eaLnBrk="1" latinLnBrk="0" hangingPunct="1">
+              <a:defRPr sz="1800" kern="1200">
+                <a:solidFill>
+                  <a:schemeClr val="tx1"/>
+                </a:solidFill>
+                <a:latin typeface="+mn-lt"/>
+                <a:ea typeface="+mn-ea"/>
+                <a:cs typeface="+mn-cs"/>
+              </a:defRPr>
+            </a:lvl2pPr>
+            <a:lvl3pPr marL="914400" algn="l" defTabSz="914400" rtl="0" eaLnBrk="1" latinLnBrk="0" hangingPunct="1">
+              <a:defRPr sz="1800" kern="1200">
+                <a:solidFill>
+                  <a:schemeClr val="tx1"/>
+                </a:solidFill>
+                <a:latin typeface="+mn-lt"/>
+                <a:ea typeface="+mn-ea"/>
+                <a:cs typeface="+mn-cs"/>
+              </a:defRPr>
+            </a:lvl3pPr>
+            <a:lvl4pPr marL="1371600" algn="l" defTabSz="914400" rtl="0" eaLnBrk="1" latinLnBrk="0" hangingPunct="1">
+              <a:defRPr sz="1800" kern="1200">
+                <a:solidFill>
+                  <a:schemeClr val="tx1"/>
+                </a:solidFill>
+                <a:latin typeface="+mn-lt"/>
+                <a:ea typeface="+mn-ea"/>
+                <a:cs typeface="+mn-cs"/>
+              </a:defRPr>
+            </a:lvl4pPr>
+            <a:lvl5pPr marL="1828800" algn="l" defTabSz="914400" rtl="0" eaLnBrk="1" latinLnBrk="0" hangingPunct="1">
+              <a:defRPr sz="1800" kern="1200">
+                <a:solidFill>
+                  <a:schemeClr val="tx1"/>
+                </a:solidFill>
+                <a:latin typeface="+mn-lt"/>
+                <a:ea typeface="+mn-ea"/>
+                <a:cs typeface="+mn-cs"/>
+              </a:defRPr>
+            </a:lvl5pPr>
+            <a:lvl6pPr marL="2286000" algn="l" defTabSz="914400" rtl="0" eaLnBrk="1" latinLnBrk="0" hangingPunct="1">
+              <a:defRPr sz="1800" kern="1200">
+                <a:solidFill>
+                  <a:schemeClr val="tx1"/>
+                </a:solidFill>
+                <a:latin typeface="+mn-lt"/>
+                <a:ea typeface="+mn-ea"/>
+                <a:cs typeface="+mn-cs"/>
+              </a:defRPr>
+            </a:lvl6pPr>
+            <a:lvl7pPr marL="2743200" algn="l" defTabSz="914400" rtl="0" eaLnBrk="1" latinLnBrk="0" hangingPunct="1">
+              <a:defRPr sz="1800" kern="1200">
+                <a:solidFill>
+                  <a:schemeClr val="tx1"/>
+                </a:solidFill>
+                <a:latin typeface="+mn-lt"/>
+                <a:ea typeface="+mn-ea"/>
+                <a:cs typeface="+mn-cs"/>
+              </a:defRPr>
+            </a:lvl7pPr>
+            <a:lvl8pPr marL="3200400" algn="l" defTabSz="914400" rtl="0" eaLnBrk="1" latinLnBrk="0" hangingPunct="1">
+              <a:defRPr sz="1800" kern="1200">
+                <a:solidFill>
+                  <a:schemeClr val="tx1"/>
+                </a:solidFill>
+                <a:latin typeface="+mn-lt"/>
+                <a:ea typeface="+mn-ea"/>
+                <a:cs typeface="+mn-cs"/>
+              </a:defRPr>
+            </a:lvl8pPr>
+            <a:lvl9pPr marL="3657600" algn="l" defTabSz="914400" rtl="0" eaLnBrk="1" latinLnBrk="0" hangingPunct="1">
+              <a:defRPr sz="1800" kern="1200">
+                <a:solidFill>
+                  <a:schemeClr val="tx1"/>
+                </a:solidFill>
+                <a:latin typeface="+mn-lt"/>
+                <a:ea typeface="+mn-ea"/>
+                <a:cs typeface="+mn-cs"/>
+              </a:defRPr>
+            </a:lvl9pPr>
+          </a:lstStyle>
+          <a:p>
+            <a:r>
+              <a:rPr lang="de-DE" sz="1200" b="1" dirty="0" err="1" smtClean="0">
+                <a:latin typeface="Arial" panose="020B0604020202020204" pitchFamily="34" charset="0"/>
+                <a:cs typeface="Arial" panose="020B0604020202020204" pitchFamily="34" charset="0"/>
+              </a:rPr>
+              <a:t>oscm</a:t>
+            </a:r>
+            <a:r>
+              <a:rPr lang="de-DE" sz="1200" b="1" dirty="0" smtClean="0">
+                <a:latin typeface="Arial" panose="020B0604020202020204" pitchFamily="34" charset="0"/>
+                <a:cs typeface="Arial" panose="020B0604020202020204" pitchFamily="34" charset="0"/>
+              </a:rPr>
+              <a:t>-core Container</a:t>
+            </a:r>
+            <a:endParaRPr lang="de-DE" sz="1200" b="1" dirty="0">
               <a:latin typeface="Arial" panose="020B0604020202020204" pitchFamily="34" charset="0"/>
               <a:cs typeface="Arial" panose="020B0604020202020204" pitchFamily="34" charset="0"/>
             </a:endParaRPr>
@@ -6848,8 +7175,749 @@
         </p:nvSpPr>
         <p:spPr>
           <a:xfrm>
-            <a:off x="4005064" y="1043608"/>
-            <a:ext cx="1890340" cy="211832"/>
+            <a:off x="559930" y="3800468"/>
+            <a:ext cx="1919916" cy="1131572"/>
+          </a:xfrm>
+          <a:prstGeom prst="roundRect">
+            <a:avLst/>
+          </a:prstGeom>
+          <a:solidFill>
+            <a:schemeClr val="bg1"/>
+          </a:solidFill>
+          <a:ln w="31750">
+            <a:solidFill>
+              <a:srgbClr val="C00000"/>
+            </a:solidFill>
+          </a:ln>
+        </p:spPr>
+        <p:style>
+          <a:lnRef idx="2">
+            <a:schemeClr val="accent1">
+              <a:shade val="50000"/>
+            </a:schemeClr>
+          </a:lnRef>
+          <a:fillRef idx="1">
+            <a:schemeClr val="accent1"/>
+          </a:fillRef>
+          <a:effectRef idx="0">
+            <a:schemeClr val="accent1"/>
+          </a:effectRef>
+          <a:fontRef idx="minor">
+            <a:schemeClr val="lt1"/>
+          </a:fontRef>
+        </p:style>
+        <p:txBody>
+          <a:bodyPr rtlCol="0" anchor="ctr"/>
+          <a:lstStyle>
+            <a:defPPr>
+              <a:defRPr lang="de-DE"/>
+            </a:defPPr>
+            <a:lvl1pPr marL="0" algn="l" defTabSz="914400" rtl="0" eaLnBrk="1" latinLnBrk="0" hangingPunct="1">
+              <a:defRPr sz="1800" kern="1200">
+                <a:solidFill>
+                  <a:schemeClr val="lt1"/>
+                </a:solidFill>
+                <a:latin typeface="+mn-lt"/>
+                <a:ea typeface="+mn-ea"/>
+                <a:cs typeface="+mn-cs"/>
+              </a:defRPr>
+            </a:lvl1pPr>
+            <a:lvl2pPr marL="457200" algn="l" defTabSz="914400" rtl="0" eaLnBrk="1" latinLnBrk="0" hangingPunct="1">
+              <a:defRPr sz="1800" kern="1200">
+                <a:solidFill>
+                  <a:schemeClr val="lt1"/>
+                </a:solidFill>
+                <a:latin typeface="+mn-lt"/>
+                <a:ea typeface="+mn-ea"/>
+                <a:cs typeface="+mn-cs"/>
+              </a:defRPr>
+            </a:lvl2pPr>
+            <a:lvl3pPr marL="914400" algn="l" defTabSz="914400" rtl="0" eaLnBrk="1" latinLnBrk="0" hangingPunct="1">
+              <a:defRPr sz="1800" kern="1200">
+                <a:solidFill>
+                  <a:schemeClr val="lt1"/>
+                </a:solidFill>
+                <a:latin typeface="+mn-lt"/>
+                <a:ea typeface="+mn-ea"/>
+                <a:cs typeface="+mn-cs"/>
+              </a:defRPr>
+            </a:lvl3pPr>
+            <a:lvl4pPr marL="1371600" algn="l" defTabSz="914400" rtl="0" eaLnBrk="1" latinLnBrk="0" hangingPunct="1">
+              <a:defRPr sz="1800" kern="1200">
+                <a:solidFill>
+                  <a:schemeClr val="lt1"/>
+                </a:solidFill>
+                <a:latin typeface="+mn-lt"/>
+                <a:ea typeface="+mn-ea"/>
+                <a:cs typeface="+mn-cs"/>
+              </a:defRPr>
+            </a:lvl4pPr>
+            <a:lvl5pPr marL="1828800" algn="l" defTabSz="914400" rtl="0" eaLnBrk="1" latinLnBrk="0" hangingPunct="1">
+              <a:defRPr sz="1800" kern="1200">
+                <a:solidFill>
+                  <a:schemeClr val="lt1"/>
+                </a:solidFill>
+                <a:latin typeface="+mn-lt"/>
+                <a:ea typeface="+mn-ea"/>
+                <a:cs typeface="+mn-cs"/>
+              </a:defRPr>
+            </a:lvl5pPr>
+            <a:lvl6pPr marL="2286000" algn="l" defTabSz="914400" rtl="0" eaLnBrk="1" latinLnBrk="0" hangingPunct="1">
+              <a:defRPr sz="1800" kern="1200">
+                <a:solidFill>
+                  <a:schemeClr val="lt1"/>
+                </a:solidFill>
+                <a:latin typeface="+mn-lt"/>
+                <a:ea typeface="+mn-ea"/>
+                <a:cs typeface="+mn-cs"/>
+              </a:defRPr>
+            </a:lvl6pPr>
+            <a:lvl7pPr marL="2743200" algn="l" defTabSz="914400" rtl="0" eaLnBrk="1" latinLnBrk="0" hangingPunct="1">
+              <a:defRPr sz="1800" kern="1200">
+                <a:solidFill>
+                  <a:schemeClr val="lt1"/>
+                </a:solidFill>
+                <a:latin typeface="+mn-lt"/>
+                <a:ea typeface="+mn-ea"/>
+                <a:cs typeface="+mn-cs"/>
+              </a:defRPr>
+            </a:lvl7pPr>
+            <a:lvl8pPr marL="3200400" algn="l" defTabSz="914400" rtl="0" eaLnBrk="1" latinLnBrk="0" hangingPunct="1">
+              <a:defRPr sz="1800" kern="1200">
+                <a:solidFill>
+                  <a:schemeClr val="lt1"/>
+                </a:solidFill>
+                <a:latin typeface="+mn-lt"/>
+                <a:ea typeface="+mn-ea"/>
+                <a:cs typeface="+mn-cs"/>
+              </a:defRPr>
+            </a:lvl8pPr>
+            <a:lvl9pPr marL="3657600" algn="l" defTabSz="914400" rtl="0" eaLnBrk="1" latinLnBrk="0" hangingPunct="1">
+              <a:defRPr sz="1800" kern="1200">
+                <a:solidFill>
+                  <a:schemeClr val="lt1"/>
+                </a:solidFill>
+                <a:latin typeface="+mn-lt"/>
+                <a:ea typeface="+mn-ea"/>
+                <a:cs typeface="+mn-cs"/>
+              </a:defRPr>
+            </a:lvl9pPr>
+          </a:lstStyle>
+          <a:p>
+            <a:pPr algn="ctr"/>
+            <a:endParaRPr lang="de-DE" sz="1000" b="1" dirty="0"/>
+          </a:p>
+        </p:txBody>
+      </p:sp>
+      <p:sp>
+        <p:nvSpPr>
+          <p:cNvPr id="30" name="Rounded Rectangle 29"/>
+          <p:cNvSpPr/>
+          <p:nvPr/>
+        </p:nvSpPr>
+        <p:spPr>
+          <a:xfrm>
+            <a:off x="1120552" y="4067943"/>
+            <a:ext cx="1276660" cy="362647"/>
+          </a:xfrm>
+          <a:prstGeom prst="roundRect">
+            <a:avLst/>
+          </a:prstGeom>
+          <a:solidFill>
+            <a:schemeClr val="accent2"/>
+          </a:solidFill>
+          <a:ln w="31750">
+            <a:solidFill>
+              <a:srgbClr val="C00000"/>
+            </a:solidFill>
+          </a:ln>
+        </p:spPr>
+        <p:style>
+          <a:lnRef idx="2">
+            <a:schemeClr val="accent1">
+              <a:shade val="50000"/>
+            </a:schemeClr>
+          </a:lnRef>
+          <a:fillRef idx="1">
+            <a:schemeClr val="accent1"/>
+          </a:fillRef>
+          <a:effectRef idx="0">
+            <a:schemeClr val="accent1"/>
+          </a:effectRef>
+          <a:fontRef idx="minor">
+            <a:schemeClr val="lt1"/>
+          </a:fontRef>
+        </p:style>
+        <p:txBody>
+          <a:bodyPr lIns="0" tIns="0" rIns="36000" bIns="36000" rtlCol="0" anchor="ctr"/>
+          <a:lstStyle>
+            <a:defPPr>
+              <a:defRPr lang="de-DE"/>
+            </a:defPPr>
+            <a:lvl1pPr marL="0" algn="l" defTabSz="914400" rtl="0" eaLnBrk="1" latinLnBrk="0" hangingPunct="1">
+              <a:defRPr sz="1800" kern="1200">
+                <a:solidFill>
+                  <a:schemeClr val="lt1"/>
+                </a:solidFill>
+                <a:latin typeface="+mn-lt"/>
+                <a:ea typeface="+mn-ea"/>
+                <a:cs typeface="+mn-cs"/>
+              </a:defRPr>
+            </a:lvl1pPr>
+            <a:lvl2pPr marL="457200" algn="l" defTabSz="914400" rtl="0" eaLnBrk="1" latinLnBrk="0" hangingPunct="1">
+              <a:defRPr sz="1800" kern="1200">
+                <a:solidFill>
+                  <a:schemeClr val="lt1"/>
+                </a:solidFill>
+                <a:latin typeface="+mn-lt"/>
+                <a:ea typeface="+mn-ea"/>
+                <a:cs typeface="+mn-cs"/>
+              </a:defRPr>
+            </a:lvl2pPr>
+            <a:lvl3pPr marL="914400" algn="l" defTabSz="914400" rtl="0" eaLnBrk="1" latinLnBrk="0" hangingPunct="1">
+              <a:defRPr sz="1800" kern="1200">
+                <a:solidFill>
+                  <a:schemeClr val="lt1"/>
+                </a:solidFill>
+                <a:latin typeface="+mn-lt"/>
+                <a:ea typeface="+mn-ea"/>
+                <a:cs typeface="+mn-cs"/>
+              </a:defRPr>
+            </a:lvl3pPr>
+            <a:lvl4pPr marL="1371600" algn="l" defTabSz="914400" rtl="0" eaLnBrk="1" latinLnBrk="0" hangingPunct="1">
+              <a:defRPr sz="1800" kern="1200">
+                <a:solidFill>
+                  <a:schemeClr val="lt1"/>
+                </a:solidFill>
+                <a:latin typeface="+mn-lt"/>
+                <a:ea typeface="+mn-ea"/>
+                <a:cs typeface="+mn-cs"/>
+              </a:defRPr>
+            </a:lvl4pPr>
+            <a:lvl5pPr marL="1828800" algn="l" defTabSz="914400" rtl="0" eaLnBrk="1" latinLnBrk="0" hangingPunct="1">
+              <a:defRPr sz="1800" kern="1200">
+                <a:solidFill>
+                  <a:schemeClr val="lt1"/>
+                </a:solidFill>
+                <a:latin typeface="+mn-lt"/>
+                <a:ea typeface="+mn-ea"/>
+                <a:cs typeface="+mn-cs"/>
+              </a:defRPr>
+            </a:lvl5pPr>
+            <a:lvl6pPr marL="2286000" algn="l" defTabSz="914400" rtl="0" eaLnBrk="1" latinLnBrk="0" hangingPunct="1">
+              <a:defRPr sz="1800" kern="1200">
+                <a:solidFill>
+                  <a:schemeClr val="lt1"/>
+                </a:solidFill>
+                <a:latin typeface="+mn-lt"/>
+                <a:ea typeface="+mn-ea"/>
+                <a:cs typeface="+mn-cs"/>
+              </a:defRPr>
+            </a:lvl6pPr>
+            <a:lvl7pPr marL="2743200" algn="l" defTabSz="914400" rtl="0" eaLnBrk="1" latinLnBrk="0" hangingPunct="1">
+              <a:defRPr sz="1800" kern="1200">
+                <a:solidFill>
+                  <a:schemeClr val="lt1"/>
+                </a:solidFill>
+                <a:latin typeface="+mn-lt"/>
+                <a:ea typeface="+mn-ea"/>
+                <a:cs typeface="+mn-cs"/>
+              </a:defRPr>
+            </a:lvl7pPr>
+            <a:lvl8pPr marL="3200400" algn="l" defTabSz="914400" rtl="0" eaLnBrk="1" latinLnBrk="0" hangingPunct="1">
+              <a:defRPr sz="1800" kern="1200">
+                <a:solidFill>
+                  <a:schemeClr val="lt1"/>
+                </a:solidFill>
+                <a:latin typeface="+mn-lt"/>
+                <a:ea typeface="+mn-ea"/>
+                <a:cs typeface="+mn-cs"/>
+              </a:defRPr>
+            </a:lvl8pPr>
+            <a:lvl9pPr marL="3657600" algn="l" defTabSz="914400" rtl="0" eaLnBrk="1" latinLnBrk="0" hangingPunct="1">
+              <a:defRPr sz="1800" kern="1200">
+                <a:solidFill>
+                  <a:schemeClr val="lt1"/>
+                </a:solidFill>
+                <a:latin typeface="+mn-lt"/>
+                <a:ea typeface="+mn-ea"/>
+                <a:cs typeface="+mn-cs"/>
+              </a:defRPr>
+            </a:lvl9pPr>
+          </a:lstStyle>
+          <a:p>
+            <a:pPr algn="ctr"/>
+            <a:r>
+              <a:rPr lang="de-DE" sz="1000" b="1" dirty="0" smtClean="0">
+                <a:solidFill>
+                  <a:schemeClr val="tx1"/>
+                </a:solidFill>
+                <a:latin typeface="Arial" panose="020B0604020202020204" pitchFamily="34" charset="0"/>
+                <a:cs typeface="Arial" panose="020B0604020202020204" pitchFamily="34" charset="0"/>
+              </a:rPr>
+              <a:t>Service</a:t>
+            </a:r>
+            <a:endParaRPr lang="de-DE" sz="1000" b="1" dirty="0">
+              <a:solidFill>
+                <a:schemeClr val="tx1"/>
+              </a:solidFill>
+              <a:latin typeface="Arial" panose="020B0604020202020204" pitchFamily="34" charset="0"/>
+              <a:cs typeface="Arial" panose="020B0604020202020204" pitchFamily="34" charset="0"/>
+            </a:endParaRPr>
+          </a:p>
+        </p:txBody>
+      </p:sp>
+      <p:sp>
+        <p:nvSpPr>
+          <p:cNvPr id="42" name="TextBox 19"/>
+          <p:cNvSpPr txBox="1"/>
+          <p:nvPr/>
+        </p:nvSpPr>
+        <p:spPr>
+          <a:xfrm>
+            <a:off x="1064823" y="3822532"/>
+            <a:ext cx="936104" cy="246221"/>
+          </a:xfrm>
+          <a:prstGeom prst="rect">
+            <a:avLst/>
+          </a:prstGeom>
+          <a:noFill/>
+        </p:spPr>
+        <p:txBody>
+          <a:bodyPr wrap="square" rtlCol="0">
+            <a:spAutoFit/>
+          </a:bodyPr>
+          <a:lstStyle>
+            <a:defPPr>
+              <a:defRPr lang="de-DE"/>
+            </a:defPPr>
+            <a:lvl1pPr marL="0" algn="l" defTabSz="914400" rtl="0" eaLnBrk="1" latinLnBrk="0" hangingPunct="1">
+              <a:defRPr sz="1800" kern="1200">
+                <a:solidFill>
+                  <a:schemeClr val="tx1"/>
+                </a:solidFill>
+                <a:latin typeface="+mn-lt"/>
+                <a:ea typeface="+mn-ea"/>
+                <a:cs typeface="+mn-cs"/>
+              </a:defRPr>
+            </a:lvl1pPr>
+            <a:lvl2pPr marL="457200" algn="l" defTabSz="914400" rtl="0" eaLnBrk="1" latinLnBrk="0" hangingPunct="1">
+              <a:defRPr sz="1800" kern="1200">
+                <a:solidFill>
+                  <a:schemeClr val="tx1"/>
+                </a:solidFill>
+                <a:latin typeface="+mn-lt"/>
+                <a:ea typeface="+mn-ea"/>
+                <a:cs typeface="+mn-cs"/>
+              </a:defRPr>
+            </a:lvl2pPr>
+            <a:lvl3pPr marL="914400" algn="l" defTabSz="914400" rtl="0" eaLnBrk="1" latinLnBrk="0" hangingPunct="1">
+              <a:defRPr sz="1800" kern="1200">
+                <a:solidFill>
+                  <a:schemeClr val="tx1"/>
+                </a:solidFill>
+                <a:latin typeface="+mn-lt"/>
+                <a:ea typeface="+mn-ea"/>
+                <a:cs typeface="+mn-cs"/>
+              </a:defRPr>
+            </a:lvl3pPr>
+            <a:lvl4pPr marL="1371600" algn="l" defTabSz="914400" rtl="0" eaLnBrk="1" latinLnBrk="0" hangingPunct="1">
+              <a:defRPr sz="1800" kern="1200">
+                <a:solidFill>
+                  <a:schemeClr val="tx1"/>
+                </a:solidFill>
+                <a:latin typeface="+mn-lt"/>
+                <a:ea typeface="+mn-ea"/>
+                <a:cs typeface="+mn-cs"/>
+              </a:defRPr>
+            </a:lvl4pPr>
+            <a:lvl5pPr marL="1828800" algn="l" defTabSz="914400" rtl="0" eaLnBrk="1" latinLnBrk="0" hangingPunct="1">
+              <a:defRPr sz="1800" kern="1200">
+                <a:solidFill>
+                  <a:schemeClr val="tx1"/>
+                </a:solidFill>
+                <a:latin typeface="+mn-lt"/>
+                <a:ea typeface="+mn-ea"/>
+                <a:cs typeface="+mn-cs"/>
+              </a:defRPr>
+            </a:lvl5pPr>
+            <a:lvl6pPr marL="2286000" algn="l" defTabSz="914400" rtl="0" eaLnBrk="1" latinLnBrk="0" hangingPunct="1">
+              <a:defRPr sz="1800" kern="1200">
+                <a:solidFill>
+                  <a:schemeClr val="tx1"/>
+                </a:solidFill>
+                <a:latin typeface="+mn-lt"/>
+                <a:ea typeface="+mn-ea"/>
+                <a:cs typeface="+mn-cs"/>
+              </a:defRPr>
+            </a:lvl6pPr>
+            <a:lvl7pPr marL="2743200" algn="l" defTabSz="914400" rtl="0" eaLnBrk="1" latinLnBrk="0" hangingPunct="1">
+              <a:defRPr sz="1800" kern="1200">
+                <a:solidFill>
+                  <a:schemeClr val="tx1"/>
+                </a:solidFill>
+                <a:latin typeface="+mn-lt"/>
+                <a:ea typeface="+mn-ea"/>
+                <a:cs typeface="+mn-cs"/>
+              </a:defRPr>
+            </a:lvl7pPr>
+            <a:lvl8pPr marL="3200400" algn="l" defTabSz="914400" rtl="0" eaLnBrk="1" latinLnBrk="0" hangingPunct="1">
+              <a:defRPr sz="1800" kern="1200">
+                <a:solidFill>
+                  <a:schemeClr val="tx1"/>
+                </a:solidFill>
+                <a:latin typeface="+mn-lt"/>
+                <a:ea typeface="+mn-ea"/>
+                <a:cs typeface="+mn-cs"/>
+              </a:defRPr>
+            </a:lvl8pPr>
+            <a:lvl9pPr marL="3657600" algn="l" defTabSz="914400" rtl="0" eaLnBrk="1" latinLnBrk="0" hangingPunct="1">
+              <a:defRPr sz="1800" kern="1200">
+                <a:solidFill>
+                  <a:schemeClr val="tx1"/>
+                </a:solidFill>
+                <a:latin typeface="+mn-lt"/>
+                <a:ea typeface="+mn-ea"/>
+                <a:cs typeface="+mn-cs"/>
+              </a:defRPr>
+            </a:lvl9pPr>
+          </a:lstStyle>
+          <a:p>
+            <a:r>
+              <a:rPr lang="de-DE" sz="1000" b="1" dirty="0" smtClean="0">
+                <a:latin typeface="Arial" panose="020B0604020202020204" pitchFamily="34" charset="0"/>
+                <a:cs typeface="Arial" panose="020B0604020202020204" pitchFamily="34" charset="0"/>
+              </a:rPr>
+              <a:t>Marketplace</a:t>
+            </a:r>
+            <a:endParaRPr lang="de-DE" sz="1000" b="1" dirty="0">
+              <a:latin typeface="Arial" panose="020B0604020202020204" pitchFamily="34" charset="0"/>
+              <a:cs typeface="Arial" panose="020B0604020202020204" pitchFamily="34" charset="0"/>
+            </a:endParaRPr>
+          </a:p>
+        </p:txBody>
+      </p:sp>
+      <p:cxnSp>
+        <p:nvCxnSpPr>
+          <p:cNvPr id="44" name="Straight Arrow Connector 43"/>
+          <p:cNvCxnSpPr>
+            <a:stCxn id="30" idx="3"/>
+          </p:cNvCxnSpPr>
+          <p:nvPr/>
+        </p:nvCxnSpPr>
+        <p:spPr>
+          <a:xfrm>
+            <a:off x="2397212" y="4249267"/>
+            <a:ext cx="657688" cy="15523"/>
+          </a:xfrm>
+          <a:prstGeom prst="straightConnector1">
+            <a:avLst/>
+          </a:prstGeom>
+          <a:ln w="19050">
+            <a:solidFill>
+              <a:srgbClr val="C00000"/>
+            </a:solidFill>
+            <a:tailEnd type="arrow"/>
+          </a:ln>
+        </p:spPr>
+        <p:style>
+          <a:lnRef idx="1">
+            <a:schemeClr val="accent1"/>
+          </a:lnRef>
+          <a:fillRef idx="0">
+            <a:schemeClr val="accent1"/>
+          </a:fillRef>
+          <a:effectRef idx="0">
+            <a:schemeClr val="accent1"/>
+          </a:effectRef>
+          <a:fontRef idx="minor">
+            <a:schemeClr val="tx1"/>
+          </a:fontRef>
+        </p:style>
+      </p:cxnSp>
+      <p:sp>
+        <p:nvSpPr>
+          <p:cNvPr id="23" name="Rounded Rectangle 22"/>
+          <p:cNvSpPr/>
+          <p:nvPr/>
+        </p:nvSpPr>
+        <p:spPr>
+          <a:xfrm>
+            <a:off x="2754692" y="3336830"/>
+            <a:ext cx="3842659" cy="2162767"/>
+          </a:xfrm>
+          <a:prstGeom prst="roundRect">
+            <a:avLst/>
+          </a:prstGeom>
+          <a:noFill/>
+          <a:ln w="31750"/>
+        </p:spPr>
+        <p:style>
+          <a:lnRef idx="2">
+            <a:schemeClr val="accent1">
+              <a:shade val="50000"/>
+            </a:schemeClr>
+          </a:lnRef>
+          <a:fillRef idx="1">
+            <a:schemeClr val="accent1"/>
+          </a:fillRef>
+          <a:effectRef idx="0">
+            <a:schemeClr val="accent1"/>
+          </a:effectRef>
+          <a:fontRef idx="minor">
+            <a:schemeClr val="lt1"/>
+          </a:fontRef>
+        </p:style>
+        <p:txBody>
+          <a:bodyPr rtlCol="0" anchor="ctr"/>
+          <a:lstStyle>
+            <a:defPPr>
+              <a:defRPr lang="de-DE"/>
+            </a:defPPr>
+            <a:lvl1pPr marL="0" algn="l" defTabSz="914400" rtl="0" eaLnBrk="1" latinLnBrk="0" hangingPunct="1">
+              <a:defRPr sz="1800" kern="1200">
+                <a:solidFill>
+                  <a:schemeClr val="lt1"/>
+                </a:solidFill>
+                <a:latin typeface="+mn-lt"/>
+                <a:ea typeface="+mn-ea"/>
+                <a:cs typeface="+mn-cs"/>
+              </a:defRPr>
+            </a:lvl1pPr>
+            <a:lvl2pPr marL="457200" algn="l" defTabSz="914400" rtl="0" eaLnBrk="1" latinLnBrk="0" hangingPunct="1">
+              <a:defRPr sz="1800" kern="1200">
+                <a:solidFill>
+                  <a:schemeClr val="lt1"/>
+                </a:solidFill>
+                <a:latin typeface="+mn-lt"/>
+                <a:ea typeface="+mn-ea"/>
+                <a:cs typeface="+mn-cs"/>
+              </a:defRPr>
+            </a:lvl2pPr>
+            <a:lvl3pPr marL="914400" algn="l" defTabSz="914400" rtl="0" eaLnBrk="1" latinLnBrk="0" hangingPunct="1">
+              <a:defRPr sz="1800" kern="1200">
+                <a:solidFill>
+                  <a:schemeClr val="lt1"/>
+                </a:solidFill>
+                <a:latin typeface="+mn-lt"/>
+                <a:ea typeface="+mn-ea"/>
+                <a:cs typeface="+mn-cs"/>
+              </a:defRPr>
+            </a:lvl3pPr>
+            <a:lvl4pPr marL="1371600" algn="l" defTabSz="914400" rtl="0" eaLnBrk="1" latinLnBrk="0" hangingPunct="1">
+              <a:defRPr sz="1800" kern="1200">
+                <a:solidFill>
+                  <a:schemeClr val="lt1"/>
+                </a:solidFill>
+                <a:latin typeface="+mn-lt"/>
+                <a:ea typeface="+mn-ea"/>
+                <a:cs typeface="+mn-cs"/>
+              </a:defRPr>
+            </a:lvl4pPr>
+            <a:lvl5pPr marL="1828800" algn="l" defTabSz="914400" rtl="0" eaLnBrk="1" latinLnBrk="0" hangingPunct="1">
+              <a:defRPr sz="1800" kern="1200">
+                <a:solidFill>
+                  <a:schemeClr val="lt1"/>
+                </a:solidFill>
+                <a:latin typeface="+mn-lt"/>
+                <a:ea typeface="+mn-ea"/>
+                <a:cs typeface="+mn-cs"/>
+              </a:defRPr>
+            </a:lvl5pPr>
+            <a:lvl6pPr marL="2286000" algn="l" defTabSz="914400" rtl="0" eaLnBrk="1" latinLnBrk="0" hangingPunct="1">
+              <a:defRPr sz="1800" kern="1200">
+                <a:solidFill>
+                  <a:schemeClr val="lt1"/>
+                </a:solidFill>
+                <a:latin typeface="+mn-lt"/>
+                <a:ea typeface="+mn-ea"/>
+                <a:cs typeface="+mn-cs"/>
+              </a:defRPr>
+            </a:lvl6pPr>
+            <a:lvl7pPr marL="2743200" algn="l" defTabSz="914400" rtl="0" eaLnBrk="1" latinLnBrk="0" hangingPunct="1">
+              <a:defRPr sz="1800" kern="1200">
+                <a:solidFill>
+                  <a:schemeClr val="lt1"/>
+                </a:solidFill>
+                <a:latin typeface="+mn-lt"/>
+                <a:ea typeface="+mn-ea"/>
+                <a:cs typeface="+mn-cs"/>
+              </a:defRPr>
+            </a:lvl7pPr>
+            <a:lvl8pPr marL="3200400" algn="l" defTabSz="914400" rtl="0" eaLnBrk="1" latinLnBrk="0" hangingPunct="1">
+              <a:defRPr sz="1800" kern="1200">
+                <a:solidFill>
+                  <a:schemeClr val="lt1"/>
+                </a:solidFill>
+                <a:latin typeface="+mn-lt"/>
+                <a:ea typeface="+mn-ea"/>
+                <a:cs typeface="+mn-cs"/>
+              </a:defRPr>
+            </a:lvl8pPr>
+            <a:lvl9pPr marL="3657600" algn="l" defTabSz="914400" rtl="0" eaLnBrk="1" latinLnBrk="0" hangingPunct="1">
+              <a:defRPr sz="1800" kern="1200">
+                <a:solidFill>
+                  <a:schemeClr val="lt1"/>
+                </a:solidFill>
+                <a:latin typeface="+mn-lt"/>
+                <a:ea typeface="+mn-ea"/>
+                <a:cs typeface="+mn-cs"/>
+              </a:defRPr>
+            </a:lvl9pPr>
+          </a:lstStyle>
+          <a:p>
+            <a:pPr algn="ctr"/>
+            <a:endParaRPr lang="de-DE"/>
+          </a:p>
+        </p:txBody>
+      </p:sp>
+      <p:sp>
+        <p:nvSpPr>
+          <p:cNvPr id="33" name="TextBox 12"/>
+          <p:cNvSpPr txBox="1"/>
+          <p:nvPr/>
+        </p:nvSpPr>
+        <p:spPr>
+          <a:xfrm>
+            <a:off x="2923235" y="3426575"/>
+            <a:ext cx="2788708" cy="299365"/>
+          </a:xfrm>
+          <a:prstGeom prst="rect">
+            <a:avLst/>
+          </a:prstGeom>
+          <a:noFill/>
+        </p:spPr>
+        <p:txBody>
+          <a:bodyPr wrap="none" rtlCol="0">
+            <a:spAutoFit/>
+          </a:bodyPr>
+          <a:lstStyle>
+            <a:defPPr>
+              <a:defRPr lang="de-DE"/>
+            </a:defPPr>
+            <a:lvl1pPr marL="0" algn="l" defTabSz="914400" rtl="0" eaLnBrk="1" latinLnBrk="0" hangingPunct="1">
+              <a:defRPr sz="1800" kern="1200">
+                <a:solidFill>
+                  <a:schemeClr val="tx1"/>
+                </a:solidFill>
+                <a:latin typeface="+mn-lt"/>
+                <a:ea typeface="+mn-ea"/>
+                <a:cs typeface="+mn-cs"/>
+              </a:defRPr>
+            </a:lvl1pPr>
+            <a:lvl2pPr marL="457200" algn="l" defTabSz="914400" rtl="0" eaLnBrk="1" latinLnBrk="0" hangingPunct="1">
+              <a:defRPr sz="1800" kern="1200">
+                <a:solidFill>
+                  <a:schemeClr val="tx1"/>
+                </a:solidFill>
+                <a:latin typeface="+mn-lt"/>
+                <a:ea typeface="+mn-ea"/>
+                <a:cs typeface="+mn-cs"/>
+              </a:defRPr>
+            </a:lvl2pPr>
+            <a:lvl3pPr marL="914400" algn="l" defTabSz="914400" rtl="0" eaLnBrk="1" latinLnBrk="0" hangingPunct="1">
+              <a:defRPr sz="1800" kern="1200">
+                <a:solidFill>
+                  <a:schemeClr val="tx1"/>
+                </a:solidFill>
+                <a:latin typeface="+mn-lt"/>
+                <a:ea typeface="+mn-ea"/>
+                <a:cs typeface="+mn-cs"/>
+              </a:defRPr>
+            </a:lvl3pPr>
+            <a:lvl4pPr marL="1371600" algn="l" defTabSz="914400" rtl="0" eaLnBrk="1" latinLnBrk="0" hangingPunct="1">
+              <a:defRPr sz="1800" kern="1200">
+                <a:solidFill>
+                  <a:schemeClr val="tx1"/>
+                </a:solidFill>
+                <a:latin typeface="+mn-lt"/>
+                <a:ea typeface="+mn-ea"/>
+                <a:cs typeface="+mn-cs"/>
+              </a:defRPr>
+            </a:lvl4pPr>
+            <a:lvl5pPr marL="1828800" algn="l" defTabSz="914400" rtl="0" eaLnBrk="1" latinLnBrk="0" hangingPunct="1">
+              <a:defRPr sz="1800" kern="1200">
+                <a:solidFill>
+                  <a:schemeClr val="tx1"/>
+                </a:solidFill>
+                <a:latin typeface="+mn-lt"/>
+                <a:ea typeface="+mn-ea"/>
+                <a:cs typeface="+mn-cs"/>
+              </a:defRPr>
+            </a:lvl5pPr>
+            <a:lvl6pPr marL="2286000" algn="l" defTabSz="914400" rtl="0" eaLnBrk="1" latinLnBrk="0" hangingPunct="1">
+              <a:defRPr sz="1800" kern="1200">
+                <a:solidFill>
+                  <a:schemeClr val="tx1"/>
+                </a:solidFill>
+                <a:latin typeface="+mn-lt"/>
+                <a:ea typeface="+mn-ea"/>
+                <a:cs typeface="+mn-cs"/>
+              </a:defRPr>
+            </a:lvl6pPr>
+            <a:lvl7pPr marL="2743200" algn="l" defTabSz="914400" rtl="0" eaLnBrk="1" latinLnBrk="0" hangingPunct="1">
+              <a:defRPr sz="1800" kern="1200">
+                <a:solidFill>
+                  <a:schemeClr val="tx1"/>
+                </a:solidFill>
+                <a:latin typeface="+mn-lt"/>
+                <a:ea typeface="+mn-ea"/>
+                <a:cs typeface="+mn-cs"/>
+              </a:defRPr>
+            </a:lvl7pPr>
+            <a:lvl8pPr marL="3200400" algn="l" defTabSz="914400" rtl="0" eaLnBrk="1" latinLnBrk="0" hangingPunct="1">
+              <a:defRPr sz="1800" kern="1200">
+                <a:solidFill>
+                  <a:schemeClr val="tx1"/>
+                </a:solidFill>
+                <a:latin typeface="+mn-lt"/>
+                <a:ea typeface="+mn-ea"/>
+                <a:cs typeface="+mn-cs"/>
+              </a:defRPr>
+            </a:lvl8pPr>
+            <a:lvl9pPr marL="3657600" algn="l" defTabSz="914400" rtl="0" eaLnBrk="1" latinLnBrk="0" hangingPunct="1">
+              <a:defRPr sz="1800" kern="1200">
+                <a:solidFill>
+                  <a:schemeClr val="tx1"/>
+                </a:solidFill>
+                <a:latin typeface="+mn-lt"/>
+                <a:ea typeface="+mn-ea"/>
+                <a:cs typeface="+mn-cs"/>
+              </a:defRPr>
+            </a:lvl9pPr>
+          </a:lstStyle>
+          <a:p>
+            <a:r>
+              <a:rPr lang="de-DE" sz="1200" b="1" dirty="0" err="1" smtClean="0">
+                <a:latin typeface="Arial" panose="020B0604020202020204" pitchFamily="34" charset="0"/>
+                <a:cs typeface="Arial" panose="020B0604020202020204" pitchFamily="34" charset="0"/>
+              </a:rPr>
+              <a:t>oscm-app</a:t>
+            </a:r>
+            <a:r>
+              <a:rPr lang="de-DE" sz="1200" b="1" dirty="0" smtClean="0">
+                <a:latin typeface="Arial" panose="020B0604020202020204" pitchFamily="34" charset="0"/>
+                <a:cs typeface="Arial" panose="020B0604020202020204" pitchFamily="34" charset="0"/>
+              </a:rPr>
+              <a:t> Container</a:t>
+            </a:r>
+            <a:endParaRPr lang="de-DE" sz="1200" b="1" dirty="0">
+              <a:latin typeface="Arial" panose="020B0604020202020204" pitchFamily="34" charset="0"/>
+              <a:cs typeface="Arial" panose="020B0604020202020204" pitchFamily="34" charset="0"/>
+            </a:endParaRPr>
+          </a:p>
+        </p:txBody>
+      </p:sp>
+      <p:sp>
+        <p:nvSpPr>
+          <p:cNvPr id="48" name="Rounded Rectangle 47"/>
+          <p:cNvSpPr/>
+          <p:nvPr/>
+        </p:nvSpPr>
+        <p:spPr>
+          <a:xfrm>
+            <a:off x="3054900" y="3779913"/>
+            <a:ext cx="871211" cy="650678"/>
           </a:xfrm>
           <a:prstGeom prst="roundRect">
             <a:avLst/>
@@ -6883,26 +7951,6 @@
           <a:lstStyle/>
           <a:p>
             <a:pPr algn="ctr"/>
-            <a:r>
-              <a:rPr lang="de-DE" sz="1000" b="1" dirty="0" err="1" smtClean="0">
-                <a:solidFill>
-                  <a:schemeClr val="tx1"/>
-                </a:solidFill>
-                <a:latin typeface="Arial" panose="020B0604020202020204" pitchFamily="34" charset="0"/>
-                <a:cs typeface="Arial" panose="020B0604020202020204" pitchFamily="34" charset="0"/>
-              </a:rPr>
-              <a:t>Provisioning</a:t>
-            </a:r>
-            <a:r>
-              <a:rPr lang="de-DE" sz="1000" b="1" dirty="0" smtClean="0">
-                <a:solidFill>
-                  <a:schemeClr val="tx1"/>
-                </a:solidFill>
-                <a:latin typeface="Arial" panose="020B0604020202020204" pitchFamily="34" charset="0"/>
-                <a:cs typeface="Arial" panose="020B0604020202020204" pitchFamily="34" charset="0"/>
-              </a:rPr>
-              <a:t> Script</a:t>
-            </a:r>
             <a:endParaRPr lang="de-DE" sz="1000" b="1" dirty="0">
               <a:solidFill>
                 <a:schemeClr val="tx1"/>
@@ -6910,6 +7958,38 @@
               <a:latin typeface="Arial" panose="020B0604020202020204" pitchFamily="34" charset="0"/>
               <a:cs typeface="Arial" panose="020B0604020202020204" pitchFamily="34" charset="0"/>
             </a:endParaRPr>
+          </a:p>
+        </p:txBody>
+      </p:sp>
+      <p:sp>
+        <p:nvSpPr>
+          <p:cNvPr id="49" name="TextBox 48"/>
+          <p:cNvSpPr txBox="1"/>
+          <p:nvPr/>
+        </p:nvSpPr>
+        <p:spPr>
+          <a:xfrm>
+            <a:off x="3217966" y="3964575"/>
+            <a:ext cx="447558" cy="246221"/>
+          </a:xfrm>
+          <a:prstGeom prst="rect">
+            <a:avLst/>
+          </a:prstGeom>
+          <a:noFill/>
+        </p:spPr>
+        <p:txBody>
+          <a:bodyPr wrap="none" rtlCol="0">
+            <a:spAutoFit/>
+          </a:bodyPr>
+          <a:lstStyle/>
+          <a:p>
+            <a:r>
+              <a:rPr lang="de-DE" sz="1000" b="1" dirty="0">
+                <a:latin typeface="Arial" panose="020B0604020202020204" pitchFamily="34" charset="0"/>
+                <a:cs typeface="Arial" panose="020B0604020202020204" pitchFamily="34" charset="0"/>
+              </a:rPr>
+              <a:t>APP</a:t>
+            </a:r>
           </a:p>
         </p:txBody>
       </p:sp>
@@ -6921,8 +8001,8 @@
         </p:nvSpPr>
         <p:spPr>
           <a:xfrm>
-            <a:off x="4005064" y="1407840"/>
-            <a:ext cx="1890340" cy="211832"/>
+            <a:off x="4178349" y="3793087"/>
+            <a:ext cx="1440997" cy="661354"/>
           </a:xfrm>
           <a:prstGeom prst="roundRect">
             <a:avLst/>
@@ -6957,24 +8037,40 @@
           <a:p>
             <a:pPr algn="ctr"/>
             <a:r>
-              <a:rPr lang="de-DE" sz="1000" b="1" dirty="0" err="1" smtClean="0">
+              <a:rPr lang="de-DE" sz="1000" b="1" dirty="0">
                 <a:solidFill>
                   <a:schemeClr val="tx1"/>
                 </a:solidFill>
                 <a:latin typeface="Arial" panose="020B0604020202020204" pitchFamily="34" charset="0"/>
                 <a:cs typeface="Arial" panose="020B0604020202020204" pitchFamily="34" charset="0"/>
               </a:rPr>
-              <a:t>Modification</a:t>
-            </a:r>
-            <a:r>
-              <a:rPr lang="de-DE" sz="1000" b="1" dirty="0" smtClean="0">
+              <a:t>Shell</a:t>
+            </a:r>
+          </a:p>
+          <a:p>
+            <a:pPr algn="ctr"/>
+            <a:r>
+              <a:rPr lang="de-DE" sz="1000" b="1" dirty="0">
                 <a:solidFill>
                   <a:schemeClr val="tx1"/>
                 </a:solidFill>
                 <a:latin typeface="Arial" panose="020B0604020202020204" pitchFamily="34" charset="0"/>
                 <a:cs typeface="Arial" panose="020B0604020202020204" pitchFamily="34" charset="0"/>
               </a:rPr>
-              <a:t> Script</a:t>
+              <a:t>Service</a:t>
+            </a:r>
+          </a:p>
+          <a:p>
+            <a:pPr algn="ctr"/>
+            <a:r>
+              <a:rPr lang="de-DE" sz="1000" b="1" dirty="0">
+                <a:solidFill>
+                  <a:schemeClr val="tx1"/>
+                </a:solidFill>
+                <a:latin typeface="Arial" panose="020B0604020202020204" pitchFamily="34" charset="0"/>
+                <a:cs typeface="Arial" panose="020B0604020202020204" pitchFamily="34" charset="0"/>
+              </a:rPr>
+              <a:t>Controller</a:t>
             </a:r>
             <a:endParaRPr lang="de-DE" sz="1000" b="1" dirty="0">
               <a:solidFill>
@@ -6986,18 +8082,259 @@
           </a:p>
         </p:txBody>
       </p:sp>
+      <p:cxnSp>
+        <p:nvCxnSpPr>
+          <p:cNvPr id="52" name="Straight Arrow Connector 51"/>
+          <p:cNvCxnSpPr>
+            <a:stCxn id="48" idx="3"/>
+            <a:endCxn id="51" idx="1"/>
+          </p:cNvCxnSpPr>
+          <p:nvPr/>
+        </p:nvCxnSpPr>
+        <p:spPr>
+          <a:xfrm>
+            <a:off x="3926111" y="4105252"/>
+            <a:ext cx="252238" cy="18512"/>
+          </a:xfrm>
+          <a:prstGeom prst="straightConnector1">
+            <a:avLst/>
+          </a:prstGeom>
+          <a:ln w="19050">
+            <a:solidFill>
+              <a:schemeClr val="tx2"/>
+            </a:solidFill>
+            <a:tailEnd type="arrow"/>
+          </a:ln>
+        </p:spPr>
+        <p:style>
+          <a:lnRef idx="1">
+            <a:schemeClr val="accent1"/>
+          </a:lnRef>
+          <a:fillRef idx="0">
+            <a:schemeClr val="accent1"/>
+          </a:fillRef>
+          <a:effectRef idx="0">
+            <a:schemeClr val="accent1"/>
+          </a:effectRef>
+          <a:fontRef idx="minor">
+            <a:schemeClr val="tx1"/>
+          </a:fontRef>
+        </p:style>
+      </p:cxnSp>
       <p:sp>
         <p:nvSpPr>
-          <p:cNvPr id="52" name="Rounded Rectangle 51"/>
+          <p:cNvPr id="56" name="Rectangle 55"/>
           <p:cNvSpPr/>
           <p:nvPr/>
         </p:nvSpPr>
         <p:spPr>
           <a:xfrm>
-            <a:off x="4005064" y="1767880"/>
-            <a:ext cx="1890340" cy="211832"/>
+            <a:off x="4996574" y="4547689"/>
+            <a:ext cx="1600777" cy="861774"/>
           </a:xfrm>
-          <a:prstGeom prst="roundRect">
+          <a:prstGeom prst="rect">
+            <a:avLst/>
+          </a:prstGeom>
+        </p:spPr>
+        <p:txBody>
+          <a:bodyPr wrap="square">
+            <a:spAutoFit/>
+          </a:bodyPr>
+          <a:lstStyle/>
+          <a:p>
+            <a:r>
+              <a:rPr lang="de-DE" sz="1000" b="1" dirty="0" smtClean="0">
+                <a:latin typeface="Arial" panose="020B0604020202020204" pitchFamily="34" charset="0"/>
+                <a:cs typeface="Arial" panose="020B0604020202020204" pitchFamily="34" charset="0"/>
+              </a:rPr>
+              <a:t>Run </a:t>
+            </a:r>
+            <a:r>
+              <a:rPr lang="de-DE" sz="1000" b="1" dirty="0" err="1" smtClean="0">
+                <a:latin typeface="Arial" panose="020B0604020202020204" pitchFamily="34" charset="0"/>
+                <a:cs typeface="Arial" panose="020B0604020202020204" pitchFamily="34" charset="0"/>
+              </a:rPr>
+              <a:t>the</a:t>
+            </a:r>
+            <a:r>
+              <a:rPr lang="de-DE" sz="1000" b="1" dirty="0" smtClean="0">
+                <a:latin typeface="Arial" panose="020B0604020202020204" pitchFamily="34" charset="0"/>
+                <a:cs typeface="Arial" panose="020B0604020202020204" pitchFamily="34" charset="0"/>
+              </a:rPr>
+              <a:t> Shell </a:t>
+            </a:r>
+            <a:r>
+              <a:rPr lang="de-DE" sz="1000" b="1" dirty="0" err="1" smtClean="0">
+                <a:latin typeface="Arial" panose="020B0604020202020204" pitchFamily="34" charset="0"/>
+                <a:cs typeface="Arial" panose="020B0604020202020204" pitchFamily="34" charset="0"/>
+              </a:rPr>
+              <a:t>scripts</a:t>
+            </a:r>
+            <a:endParaRPr lang="de-DE" sz="1000" b="1" dirty="0" smtClean="0">
+              <a:latin typeface="Arial" panose="020B0604020202020204" pitchFamily="34" charset="0"/>
+              <a:cs typeface="Arial" panose="020B0604020202020204" pitchFamily="34" charset="0"/>
+            </a:endParaRPr>
+          </a:p>
+          <a:p>
+            <a:pPr marL="171450" indent="-171450">
+              <a:buFont typeface="Arial" panose="020B0604020202020204" pitchFamily="34" charset="0"/>
+              <a:buChar char="•"/>
+            </a:pPr>
+            <a:r>
+              <a:rPr lang="de-DE" sz="1000" b="1" dirty="0" smtClean="0">
+                <a:latin typeface="Arial" panose="020B0604020202020204" pitchFamily="34" charset="0"/>
+                <a:cs typeface="Arial" panose="020B0604020202020204" pitchFamily="34" charset="0"/>
+              </a:rPr>
+              <a:t>As </a:t>
+            </a:r>
+            <a:r>
+              <a:rPr lang="de-DE" sz="1000" b="1" dirty="0" err="1" smtClean="0">
+                <a:latin typeface="Arial" panose="020B0604020202020204" pitchFamily="34" charset="0"/>
+                <a:cs typeface="Arial" panose="020B0604020202020204" pitchFamily="34" charset="0"/>
+              </a:rPr>
+              <a:t>local</a:t>
+            </a:r>
+            <a:r>
+              <a:rPr lang="de-DE" sz="1000" b="1" dirty="0" smtClean="0">
+                <a:latin typeface="Arial" panose="020B0604020202020204" pitchFamily="34" charset="0"/>
+                <a:cs typeface="Arial" panose="020B0604020202020204" pitchFamily="34" charset="0"/>
+              </a:rPr>
+              <a:t> </a:t>
+            </a:r>
+            <a:r>
+              <a:rPr lang="de-DE" sz="1000" b="1" dirty="0" err="1" smtClean="0">
+                <a:latin typeface="Arial" panose="020B0604020202020204" pitchFamily="34" charset="0"/>
+                <a:cs typeface="Arial" panose="020B0604020202020204" pitchFamily="34" charset="0"/>
+              </a:rPr>
+              <a:t>command</a:t>
+            </a:r>
+            <a:endParaRPr lang="de-DE" sz="1000" b="1" dirty="0" smtClean="0">
+              <a:latin typeface="Arial" panose="020B0604020202020204" pitchFamily="34" charset="0"/>
+              <a:cs typeface="Arial" panose="020B0604020202020204" pitchFamily="34" charset="0"/>
+            </a:endParaRPr>
+          </a:p>
+          <a:p>
+            <a:pPr marL="171450" indent="-171450">
+              <a:buFont typeface="Arial" panose="020B0604020202020204" pitchFamily="34" charset="0"/>
+              <a:buChar char="•"/>
+            </a:pPr>
+            <a:r>
+              <a:rPr lang="de-DE" sz="1000" b="1" dirty="0" smtClean="0">
+                <a:latin typeface="Arial" panose="020B0604020202020204" pitchFamily="34" charset="0"/>
+                <a:cs typeface="Arial" panose="020B0604020202020204" pitchFamily="34" charset="0"/>
+              </a:rPr>
+              <a:t>As </a:t>
+            </a:r>
+            <a:r>
+              <a:rPr lang="de-DE" sz="1000" b="1" dirty="0" err="1" smtClean="0">
+                <a:latin typeface="Arial" panose="020B0604020202020204" pitchFamily="34" charset="0"/>
+                <a:cs typeface="Arial" panose="020B0604020202020204" pitchFamily="34" charset="0"/>
+              </a:rPr>
+              <a:t>the</a:t>
+            </a:r>
+            <a:r>
+              <a:rPr lang="de-DE" sz="1000" b="1" dirty="0" smtClean="0">
+                <a:latin typeface="Arial" panose="020B0604020202020204" pitchFamily="34" charset="0"/>
+                <a:cs typeface="Arial" panose="020B0604020202020204" pitchFamily="34" charset="0"/>
+              </a:rPr>
+              <a:t> same </a:t>
+            </a:r>
+            <a:r>
+              <a:rPr lang="de-DE" sz="1000" b="1" dirty="0" err="1" smtClean="0">
+                <a:latin typeface="Arial" panose="020B0604020202020204" pitchFamily="34" charset="0"/>
+                <a:cs typeface="Arial" panose="020B0604020202020204" pitchFamily="34" charset="0"/>
+              </a:rPr>
+              <a:t>user</a:t>
+            </a:r>
+            <a:r>
+              <a:rPr lang="de-DE" sz="1000" b="1" dirty="0" smtClean="0">
+                <a:latin typeface="Arial" panose="020B0604020202020204" pitchFamily="34" charset="0"/>
+                <a:cs typeface="Arial" panose="020B0604020202020204" pitchFamily="34" charset="0"/>
+              </a:rPr>
+              <a:t> </a:t>
+            </a:r>
+            <a:r>
+              <a:rPr lang="de-DE" sz="1000" b="1" dirty="0" err="1" smtClean="0">
+                <a:latin typeface="Arial" panose="020B0604020202020204" pitchFamily="34" charset="0"/>
+                <a:cs typeface="Arial" panose="020B0604020202020204" pitchFamily="34" charset="0"/>
+              </a:rPr>
+              <a:t>who</a:t>
+            </a:r>
+            <a:r>
+              <a:rPr lang="de-DE" sz="1000" b="1" dirty="0" smtClean="0">
+                <a:latin typeface="Arial" panose="020B0604020202020204" pitchFamily="34" charset="0"/>
+                <a:cs typeface="Arial" panose="020B0604020202020204" pitchFamily="34" charset="0"/>
+              </a:rPr>
+              <a:t> </a:t>
+            </a:r>
+            <a:r>
+              <a:rPr lang="de-DE" sz="1000" b="1" dirty="0" err="1" smtClean="0">
+                <a:latin typeface="Arial" panose="020B0604020202020204" pitchFamily="34" charset="0"/>
+                <a:cs typeface="Arial" panose="020B0604020202020204" pitchFamily="34" charset="0"/>
+              </a:rPr>
+              <a:t>runs</a:t>
+            </a:r>
+            <a:r>
+              <a:rPr lang="de-DE" sz="1000" b="1" dirty="0" smtClean="0">
+                <a:latin typeface="Arial" panose="020B0604020202020204" pitchFamily="34" charset="0"/>
+                <a:cs typeface="Arial" panose="020B0604020202020204" pitchFamily="34" charset="0"/>
+              </a:rPr>
+              <a:t> </a:t>
+            </a:r>
+            <a:r>
+              <a:rPr lang="de-DE" sz="1000" b="1" dirty="0" err="1" smtClean="0">
+                <a:latin typeface="Arial" panose="020B0604020202020204" pitchFamily="34" charset="0"/>
+                <a:cs typeface="Arial" panose="020B0604020202020204" pitchFamily="34" charset="0"/>
+              </a:rPr>
+              <a:t>the</a:t>
+            </a:r>
+            <a:r>
+              <a:rPr lang="de-DE" sz="1000" b="1" dirty="0" smtClean="0">
+                <a:latin typeface="Arial" panose="020B0604020202020204" pitchFamily="34" charset="0"/>
+                <a:cs typeface="Arial" panose="020B0604020202020204" pitchFamily="34" charset="0"/>
+              </a:rPr>
+              <a:t> </a:t>
+            </a:r>
+            <a:r>
+              <a:rPr lang="de-DE" sz="1000" b="1" dirty="0" err="1" smtClean="0">
+                <a:latin typeface="Arial" panose="020B0604020202020204" pitchFamily="34" charset="0"/>
+                <a:cs typeface="Arial" panose="020B0604020202020204" pitchFamily="34" charset="0"/>
+              </a:rPr>
+              <a:t>oscm-app</a:t>
+            </a:r>
+            <a:r>
+              <a:rPr lang="de-DE" sz="1000" b="1" dirty="0" smtClean="0">
+                <a:latin typeface="Arial" panose="020B0604020202020204" pitchFamily="34" charset="0"/>
+                <a:cs typeface="Arial" panose="020B0604020202020204" pitchFamily="34" charset="0"/>
+              </a:rPr>
+              <a:t> </a:t>
+            </a:r>
+            <a:r>
+              <a:rPr lang="de-DE" sz="1000" b="1" dirty="0" err="1" smtClean="0">
+                <a:latin typeface="Arial" panose="020B0604020202020204" pitchFamily="34" charset="0"/>
+                <a:cs typeface="Arial" panose="020B0604020202020204" pitchFamily="34" charset="0"/>
+              </a:rPr>
+              <a:t>container</a:t>
+            </a:r>
+            <a:endParaRPr lang="de-DE" sz="1000" b="1" dirty="0">
+              <a:latin typeface="Arial" panose="020B0604020202020204" pitchFamily="34" charset="0"/>
+              <a:cs typeface="Arial" panose="020B0604020202020204" pitchFamily="34" charset="0"/>
+            </a:endParaRPr>
+          </a:p>
+        </p:txBody>
+      </p:sp>
+      <p:sp>
+        <p:nvSpPr>
+          <p:cNvPr id="57" name="Can 56"/>
+          <p:cNvSpPr/>
+          <p:nvPr/>
+        </p:nvSpPr>
+        <p:spPr>
+          <a:xfrm>
+            <a:off x="3490505" y="6041437"/>
+            <a:ext cx="1152128" cy="906827"/>
+          </a:xfrm>
+          <a:prstGeom prst="can">
             <a:avLst/>
           </a:prstGeom>
           <a:solidFill>
@@ -7006,7 +8343,6 @@
               <a:lumOff val="80000"/>
             </a:schemeClr>
           </a:solidFill>
-          <a:ln w="31750"/>
         </p:spPr>
         <p:style>
           <a:lnRef idx="2">
@@ -7029,48 +8365,22 @@
           <a:lstStyle/>
           <a:p>
             <a:pPr algn="ctr"/>
-            <a:r>
-              <a:rPr lang="de-DE" sz="1000" b="1" dirty="0" err="1" smtClean="0">
-                <a:solidFill>
-                  <a:schemeClr val="tx1"/>
-                </a:solidFill>
-                <a:latin typeface="Arial" panose="020B0604020202020204" pitchFamily="34" charset="0"/>
-                <a:cs typeface="Arial" panose="020B0604020202020204" pitchFamily="34" charset="0"/>
-              </a:rPr>
-              <a:t>Deprovisioning</a:t>
-            </a:r>
-            <a:r>
-              <a:rPr lang="de-DE" sz="1000" b="1" dirty="0" smtClean="0">
-                <a:solidFill>
-                  <a:schemeClr val="tx1"/>
-                </a:solidFill>
-                <a:latin typeface="Arial" panose="020B0604020202020204" pitchFamily="34" charset="0"/>
-                <a:cs typeface="Arial" panose="020B0604020202020204" pitchFamily="34" charset="0"/>
-              </a:rPr>
-              <a:t> Script</a:t>
-            </a:r>
-            <a:endParaRPr lang="de-DE" sz="1000" b="1" dirty="0">
-              <a:solidFill>
-                <a:schemeClr val="tx1"/>
-              </a:solidFill>
-              <a:latin typeface="Arial" panose="020B0604020202020204" pitchFamily="34" charset="0"/>
-              <a:cs typeface="Arial" panose="020B0604020202020204" pitchFamily="34" charset="0"/>
-            </a:endParaRPr>
+            <a:endParaRPr lang="de-DE"/>
           </a:p>
         </p:txBody>
       </p:sp>
       <p:sp>
         <p:nvSpPr>
-          <p:cNvPr id="53" name="Rounded Rectangle 52"/>
+          <p:cNvPr id="58" name="Folded Corner 57"/>
           <p:cNvSpPr/>
           <p:nvPr/>
         </p:nvSpPr>
         <p:spPr>
           <a:xfrm>
-            <a:off x="4005064" y="2127920"/>
-            <a:ext cx="1890340" cy="211832"/>
+            <a:off x="4379738" y="6382941"/>
+            <a:ext cx="1038218" cy="402599"/>
           </a:xfrm>
-          <a:prstGeom prst="roundRect">
+          <a:prstGeom prst="foldedCorner">
             <a:avLst/>
           </a:prstGeom>
           <a:solidFill>
@@ -7079,7 +8389,6 @@
               <a:lumOff val="80000"/>
             </a:schemeClr>
           </a:solidFill>
-          <a:ln w="31750"/>
         </p:spPr>
         <p:style>
           <a:lnRef idx="2">
@@ -7102,40 +8411,182 @@
           <a:lstStyle/>
           <a:p>
             <a:pPr algn="ctr"/>
-            <a:r>
-              <a:rPr lang="de-DE" sz="1000" b="1" dirty="0" err="1" smtClean="0">
-                <a:solidFill>
-                  <a:schemeClr val="tx1"/>
-                </a:solidFill>
+            <a:endParaRPr lang="de-DE"/>
+          </a:p>
+        </p:txBody>
+      </p:sp>
+      <p:sp>
+        <p:nvSpPr>
+          <p:cNvPr id="59" name="Rectangle 58"/>
+          <p:cNvSpPr/>
+          <p:nvPr/>
+        </p:nvSpPr>
+        <p:spPr>
+          <a:xfrm>
+            <a:off x="4490765" y="6461129"/>
+            <a:ext cx="872355" cy="246221"/>
+          </a:xfrm>
+          <a:prstGeom prst="rect">
+            <a:avLst/>
+          </a:prstGeom>
+        </p:spPr>
+        <p:txBody>
+          <a:bodyPr wrap="none">
+            <a:spAutoFit/>
+          </a:bodyPr>
+          <a:lstStyle/>
+          <a:p>
+            <a:r>
+              <a:rPr lang="de-DE" sz="1000" b="1" dirty="0" smtClean="0">
                 <a:latin typeface="Arial" panose="020B0604020202020204" pitchFamily="34" charset="0"/>
                 <a:cs typeface="Arial" panose="020B0604020202020204" pitchFamily="34" charset="0"/>
               </a:rPr>
-              <a:t>Assign</a:t>
-            </a:r>
-            <a:r>
-              <a:rPr lang="de-DE" sz="1000" b="1" dirty="0" smtClean="0">
-                <a:solidFill>
-                  <a:schemeClr val="tx1"/>
-                </a:solidFill>
+              <a:t>Shell </a:t>
+            </a:r>
+            <a:r>
+              <a:rPr lang="de-DE" sz="1000" b="1" dirty="0" err="1" smtClean="0">
                 <a:latin typeface="Arial" panose="020B0604020202020204" pitchFamily="34" charset="0"/>
                 <a:cs typeface="Arial" panose="020B0604020202020204" pitchFamily="34" charset="0"/>
               </a:rPr>
-              <a:t> User Script</a:t>
-            </a:r>
-            <a:endParaRPr lang="de-DE" sz="1000" b="1" dirty="0">
-              <a:solidFill>
-                <a:schemeClr val="tx1"/>
-              </a:solidFill>
+              <a:t>script</a:t>
+            </a:r>
+            <a:endParaRPr lang="de-DE" sz="1000" dirty="0"/>
+          </a:p>
+        </p:txBody>
+      </p:sp>
+      <p:sp>
+        <p:nvSpPr>
+          <p:cNvPr id="61" name="Rectangle 60"/>
+          <p:cNvSpPr/>
+          <p:nvPr/>
+        </p:nvSpPr>
+        <p:spPr>
+          <a:xfrm>
+            <a:off x="3500956" y="6342693"/>
+            <a:ext cx="837089" cy="400110"/>
+          </a:xfrm>
+          <a:prstGeom prst="rect">
+            <a:avLst/>
+          </a:prstGeom>
+        </p:spPr>
+        <p:txBody>
+          <a:bodyPr wrap="none">
+            <a:spAutoFit/>
+          </a:bodyPr>
+          <a:lstStyle/>
+          <a:p>
+            <a:r>
+              <a:rPr lang="de-DE" sz="1000" b="1" dirty="0" err="1" smtClean="0">
+                <a:latin typeface="Arial" panose="020B0604020202020204" pitchFamily="34" charset="0"/>
+                <a:cs typeface="Arial" panose="020B0604020202020204" pitchFamily="34" charset="0"/>
+              </a:rPr>
+              <a:t>Shared</a:t>
+            </a:r>
+            <a:r>
+              <a:rPr lang="de-DE" sz="1000" b="1" dirty="0" smtClean="0">
+                <a:latin typeface="Arial" panose="020B0604020202020204" pitchFamily="34" charset="0"/>
+                <a:cs typeface="Arial" panose="020B0604020202020204" pitchFamily="34" charset="0"/>
+              </a:rPr>
+              <a:t> </a:t>
+            </a:r>
+            <a:r>
+              <a:rPr lang="de-DE" sz="1000" b="1" dirty="0" err="1" smtClean="0">
+                <a:latin typeface="Arial" panose="020B0604020202020204" pitchFamily="34" charset="0"/>
+                <a:cs typeface="Arial" panose="020B0604020202020204" pitchFamily="34" charset="0"/>
+              </a:rPr>
+              <a:t>file</a:t>
+            </a:r>
+            <a:endParaRPr lang="de-DE" sz="1000" b="1" dirty="0" smtClean="0">
               <a:latin typeface="Arial" panose="020B0604020202020204" pitchFamily="34" charset="0"/>
               <a:cs typeface="Arial" panose="020B0604020202020204" pitchFamily="34" charset="0"/>
             </a:endParaRPr>
+          </a:p>
+          <a:p>
+            <a:r>
+              <a:rPr lang="de-DE" sz="1000" b="1" dirty="0" err="1" smtClean="0">
+                <a:latin typeface="Arial" panose="020B0604020202020204" pitchFamily="34" charset="0"/>
+                <a:cs typeface="Arial" panose="020B0604020202020204" pitchFamily="34" charset="0"/>
+              </a:rPr>
+              <a:t>system</a:t>
+            </a:r>
+            <a:endParaRPr lang="de-DE" sz="1000" dirty="0"/>
+          </a:p>
+        </p:txBody>
+      </p:sp>
+      <p:cxnSp>
+        <p:nvCxnSpPr>
+          <p:cNvPr id="62" name="Straight Arrow Connector 61"/>
+          <p:cNvCxnSpPr>
+            <a:endCxn id="57" idx="1"/>
+          </p:cNvCxnSpPr>
+          <p:nvPr/>
+        </p:nvCxnSpPr>
+        <p:spPr>
+          <a:xfrm>
+            <a:off x="4066569" y="5510629"/>
+            <a:ext cx="0" cy="530808"/>
+          </a:xfrm>
+          <a:prstGeom prst="straightConnector1">
+            <a:avLst/>
+          </a:prstGeom>
+          <a:ln w="19050">
+            <a:solidFill>
+              <a:schemeClr val="tx2"/>
+            </a:solidFill>
+            <a:tailEnd type="none"/>
+          </a:ln>
+        </p:spPr>
+        <p:style>
+          <a:lnRef idx="1">
+            <a:schemeClr val="accent1"/>
+          </a:lnRef>
+          <a:fillRef idx="0">
+            <a:schemeClr val="accent1"/>
+          </a:fillRef>
+          <a:effectRef idx="0">
+            <a:schemeClr val="accent1"/>
+          </a:effectRef>
+          <a:fontRef idx="minor">
+            <a:schemeClr val="tx1"/>
+          </a:fontRef>
+        </p:style>
+      </p:cxnSp>
+      <p:sp>
+        <p:nvSpPr>
+          <p:cNvPr id="67" name="Rectangle 66"/>
+          <p:cNvSpPr/>
+          <p:nvPr/>
+        </p:nvSpPr>
+        <p:spPr>
+          <a:xfrm>
+            <a:off x="4065901" y="5584053"/>
+            <a:ext cx="577402" cy="246221"/>
+          </a:xfrm>
+          <a:prstGeom prst="rect">
+            <a:avLst/>
+          </a:prstGeom>
+        </p:spPr>
+        <p:txBody>
+          <a:bodyPr wrap="none">
+            <a:spAutoFit/>
+          </a:bodyPr>
+          <a:lstStyle/>
+          <a:p>
+            <a:r>
+              <a:rPr lang="de-DE" sz="1000" b="1" dirty="0" err="1" smtClean="0">
+                <a:latin typeface="Arial" panose="020B0604020202020204" pitchFamily="34" charset="0"/>
+                <a:cs typeface="Arial" panose="020B0604020202020204" pitchFamily="34" charset="0"/>
+              </a:rPr>
+              <a:t>mount</a:t>
+            </a:r>
+            <a:endParaRPr lang="de-DE" sz="1000" dirty="0"/>
           </a:p>
         </p:txBody>
       </p:sp>
     </p:spTree>
     <p:extLst>
       <p:ext uri="{BB962C8B-B14F-4D97-AF65-F5344CB8AC3E}">
-        <p14:creationId xmlns:p14="http://schemas.microsoft.com/office/powerpoint/2010/main" val="545745481"/>
+        <p14:creationId xmlns:p14="http://schemas.microsoft.com/office/powerpoint/2010/main" val="894346611"/>
       </p:ext>
     </p:extLst>
   </p:cSld>

</xml_diff>

<commit_message>
Edit with review comments by Ulrich
</commit_message>
<xml_diff>
--- a/Development/DocSources/en/ShellIntegrationGuide/_images/images.pptx
+++ b/Development/DocSources/en/ShellIntegrationGuide/_images/images.pptx
@@ -306,7 +306,7 @@
           <a:p>
             <a:fld id="{DDD501E0-58CF-4A9F-A444-8A0230425944}" type="datetimeFigureOut">
               <a:rPr lang="de-DE" smtClean="0"/>
-              <a:t>04.12.2018</a:t>
+              <a:t>05.02.2019</a:t>
             </a:fld>
             <a:endParaRPr lang="de-DE"/>
           </a:p>
@@ -476,7 +476,7 @@
           <a:p>
             <a:fld id="{DDD501E0-58CF-4A9F-A444-8A0230425944}" type="datetimeFigureOut">
               <a:rPr lang="de-DE" smtClean="0"/>
-              <a:t>04.12.2018</a:t>
+              <a:t>05.02.2019</a:t>
             </a:fld>
             <a:endParaRPr lang="de-DE"/>
           </a:p>
@@ -656,7 +656,7 @@
           <a:p>
             <a:fld id="{DDD501E0-58CF-4A9F-A444-8A0230425944}" type="datetimeFigureOut">
               <a:rPr lang="de-DE" smtClean="0"/>
-              <a:t>04.12.2018</a:t>
+              <a:t>05.02.2019</a:t>
             </a:fld>
             <a:endParaRPr lang="de-DE"/>
           </a:p>
@@ -826,7 +826,7 @@
           <a:p>
             <a:fld id="{DDD501E0-58CF-4A9F-A444-8A0230425944}" type="datetimeFigureOut">
               <a:rPr lang="de-DE" smtClean="0"/>
-              <a:t>04.12.2018</a:t>
+              <a:t>05.02.2019</a:t>
             </a:fld>
             <a:endParaRPr lang="de-DE"/>
           </a:p>
@@ -1072,7 +1072,7 @@
           <a:p>
             <a:fld id="{DDD501E0-58CF-4A9F-A444-8A0230425944}" type="datetimeFigureOut">
               <a:rPr lang="de-DE" smtClean="0"/>
-              <a:t>04.12.2018</a:t>
+              <a:t>05.02.2019</a:t>
             </a:fld>
             <a:endParaRPr lang="de-DE"/>
           </a:p>
@@ -1360,7 +1360,7 @@
           <a:p>
             <a:fld id="{DDD501E0-58CF-4A9F-A444-8A0230425944}" type="datetimeFigureOut">
               <a:rPr lang="de-DE" smtClean="0"/>
-              <a:t>04.12.2018</a:t>
+              <a:t>05.02.2019</a:t>
             </a:fld>
             <a:endParaRPr lang="de-DE"/>
           </a:p>
@@ -1782,7 +1782,7 @@
           <a:p>
             <a:fld id="{DDD501E0-58CF-4A9F-A444-8A0230425944}" type="datetimeFigureOut">
               <a:rPr lang="de-DE" smtClean="0"/>
-              <a:t>04.12.2018</a:t>
+              <a:t>05.02.2019</a:t>
             </a:fld>
             <a:endParaRPr lang="de-DE"/>
           </a:p>
@@ -1900,7 +1900,7 @@
           <a:p>
             <a:fld id="{DDD501E0-58CF-4A9F-A444-8A0230425944}" type="datetimeFigureOut">
               <a:rPr lang="de-DE" smtClean="0"/>
-              <a:t>04.12.2018</a:t>
+              <a:t>05.02.2019</a:t>
             </a:fld>
             <a:endParaRPr lang="de-DE"/>
           </a:p>
@@ -1995,7 +1995,7 @@
           <a:p>
             <a:fld id="{DDD501E0-58CF-4A9F-A444-8A0230425944}" type="datetimeFigureOut">
               <a:rPr lang="de-DE" smtClean="0"/>
-              <a:t>04.12.2018</a:t>
+              <a:t>05.02.2019</a:t>
             </a:fld>
             <a:endParaRPr lang="de-DE"/>
           </a:p>
@@ -2272,7 +2272,7 @@
           <a:p>
             <a:fld id="{DDD501E0-58CF-4A9F-A444-8A0230425944}" type="datetimeFigureOut">
               <a:rPr lang="de-DE" smtClean="0"/>
-              <a:t>04.12.2018</a:t>
+              <a:t>05.02.2019</a:t>
             </a:fld>
             <a:endParaRPr lang="de-DE"/>
           </a:p>
@@ -2525,7 +2525,7 @@
           <a:p>
             <a:fld id="{DDD501E0-58CF-4A9F-A444-8A0230425944}" type="datetimeFigureOut">
               <a:rPr lang="de-DE" smtClean="0"/>
-              <a:t>04.12.2018</a:t>
+              <a:t>05.02.2019</a:t>
             </a:fld>
             <a:endParaRPr lang="de-DE"/>
           </a:p>
@@ -2738,7 +2738,7 @@
           <a:p>
             <a:fld id="{DDD501E0-58CF-4A9F-A444-8A0230425944}" type="datetimeFigureOut">
               <a:rPr lang="de-DE" smtClean="0"/>
-              <a:t>04.12.2018</a:t>
+              <a:t>05.02.2019</a:t>
             </a:fld>
             <a:endParaRPr lang="de-DE"/>
           </a:p>
@@ -3122,7 +3122,7 @@
         <p:grpSpPr>
           <a:xfrm>
             <a:off x="728700" y="611560"/>
-            <a:ext cx="5400600" cy="2293223"/>
+            <a:ext cx="5400600" cy="2520280"/>
             <a:chOff x="728700" y="611560"/>
             <a:chExt cx="5400600" cy="2293223"/>
           </a:xfrm>
@@ -3974,6 +3974,1913 @@
                   <a:cs typeface="Arial" panose="020B0604020202020204" pitchFamily="34" charset="0"/>
                 </a:rPr>
                 <a:t>ESCM</a:t>
+              </a:r>
+              <a:endParaRPr lang="de-DE" sz="1200" b="1" dirty="0">
+                <a:latin typeface="Arial" panose="020B0604020202020204" pitchFamily="34" charset="0"/>
+                <a:cs typeface="Arial" panose="020B0604020202020204" pitchFamily="34" charset="0"/>
+              </a:endParaRPr>
+            </a:p>
+          </p:txBody>
+        </p:sp>
+        <p:sp>
+          <p:nvSpPr>
+            <p:cNvPr id="28" name="TextBox 12"/>
+            <p:cNvSpPr txBox="1"/>
+            <p:nvPr/>
+          </p:nvSpPr>
+          <p:spPr>
+            <a:xfrm>
+              <a:off x="3926111" y="694601"/>
+              <a:ext cx="1117614" cy="276999"/>
+            </a:xfrm>
+            <a:prstGeom prst="rect">
+              <a:avLst/>
+            </a:prstGeom>
+            <a:noFill/>
+          </p:spPr>
+          <p:txBody>
+            <a:bodyPr wrap="none" rtlCol="0">
+              <a:spAutoFit/>
+            </a:bodyPr>
+            <a:lstStyle>
+              <a:defPPr>
+                <a:defRPr lang="de-DE"/>
+              </a:defPPr>
+              <a:lvl1pPr marL="0" algn="l" defTabSz="914400" rtl="0" eaLnBrk="1" latinLnBrk="0" hangingPunct="1">
+                <a:defRPr sz="1800" kern="1200">
+                  <a:solidFill>
+                    <a:schemeClr val="tx1"/>
+                  </a:solidFill>
+                  <a:latin typeface="+mn-lt"/>
+                  <a:ea typeface="+mn-ea"/>
+                  <a:cs typeface="+mn-cs"/>
+                </a:defRPr>
+              </a:lvl1pPr>
+              <a:lvl2pPr marL="457200" algn="l" defTabSz="914400" rtl="0" eaLnBrk="1" latinLnBrk="0" hangingPunct="1">
+                <a:defRPr sz="1800" kern="1200">
+                  <a:solidFill>
+                    <a:schemeClr val="tx1"/>
+                  </a:solidFill>
+                  <a:latin typeface="+mn-lt"/>
+                  <a:ea typeface="+mn-ea"/>
+                  <a:cs typeface="+mn-cs"/>
+                </a:defRPr>
+              </a:lvl2pPr>
+              <a:lvl3pPr marL="914400" algn="l" defTabSz="914400" rtl="0" eaLnBrk="1" latinLnBrk="0" hangingPunct="1">
+                <a:defRPr sz="1800" kern="1200">
+                  <a:solidFill>
+                    <a:schemeClr val="tx1"/>
+                  </a:solidFill>
+                  <a:latin typeface="+mn-lt"/>
+                  <a:ea typeface="+mn-ea"/>
+                  <a:cs typeface="+mn-cs"/>
+                </a:defRPr>
+              </a:lvl3pPr>
+              <a:lvl4pPr marL="1371600" algn="l" defTabSz="914400" rtl="0" eaLnBrk="1" latinLnBrk="0" hangingPunct="1">
+                <a:defRPr sz="1800" kern="1200">
+                  <a:solidFill>
+                    <a:schemeClr val="tx1"/>
+                  </a:solidFill>
+                  <a:latin typeface="+mn-lt"/>
+                  <a:ea typeface="+mn-ea"/>
+                  <a:cs typeface="+mn-cs"/>
+                </a:defRPr>
+              </a:lvl4pPr>
+              <a:lvl5pPr marL="1828800" algn="l" defTabSz="914400" rtl="0" eaLnBrk="1" latinLnBrk="0" hangingPunct="1">
+                <a:defRPr sz="1800" kern="1200">
+                  <a:solidFill>
+                    <a:schemeClr val="tx1"/>
+                  </a:solidFill>
+                  <a:latin typeface="+mn-lt"/>
+                  <a:ea typeface="+mn-ea"/>
+                  <a:cs typeface="+mn-cs"/>
+                </a:defRPr>
+              </a:lvl5pPr>
+              <a:lvl6pPr marL="2286000" algn="l" defTabSz="914400" rtl="0" eaLnBrk="1" latinLnBrk="0" hangingPunct="1">
+                <a:defRPr sz="1800" kern="1200">
+                  <a:solidFill>
+                    <a:schemeClr val="tx1"/>
+                  </a:solidFill>
+                  <a:latin typeface="+mn-lt"/>
+                  <a:ea typeface="+mn-ea"/>
+                  <a:cs typeface="+mn-cs"/>
+                </a:defRPr>
+              </a:lvl6pPr>
+              <a:lvl7pPr marL="2743200" algn="l" defTabSz="914400" rtl="0" eaLnBrk="1" latinLnBrk="0" hangingPunct="1">
+                <a:defRPr sz="1800" kern="1200">
+                  <a:solidFill>
+                    <a:schemeClr val="tx1"/>
+                  </a:solidFill>
+                  <a:latin typeface="+mn-lt"/>
+                  <a:ea typeface="+mn-ea"/>
+                  <a:cs typeface="+mn-cs"/>
+                </a:defRPr>
+              </a:lvl7pPr>
+              <a:lvl8pPr marL="3200400" algn="l" defTabSz="914400" rtl="0" eaLnBrk="1" latinLnBrk="0" hangingPunct="1">
+                <a:defRPr sz="1800" kern="1200">
+                  <a:solidFill>
+                    <a:schemeClr val="tx1"/>
+                  </a:solidFill>
+                  <a:latin typeface="+mn-lt"/>
+                  <a:ea typeface="+mn-ea"/>
+                  <a:cs typeface="+mn-cs"/>
+                </a:defRPr>
+              </a:lvl8pPr>
+              <a:lvl9pPr marL="3657600" algn="l" defTabSz="914400" rtl="0" eaLnBrk="1" latinLnBrk="0" hangingPunct="1">
+                <a:defRPr sz="1800" kern="1200">
+                  <a:solidFill>
+                    <a:schemeClr val="tx1"/>
+                  </a:solidFill>
+                  <a:latin typeface="+mn-lt"/>
+                  <a:ea typeface="+mn-ea"/>
+                  <a:cs typeface="+mn-cs"/>
+                </a:defRPr>
+              </a:lvl9pPr>
+            </a:lstStyle>
+            <a:p>
+              <a:r>
+                <a:rPr lang="de-DE" sz="1200" b="1" dirty="0" smtClean="0">
+                  <a:latin typeface="Arial" panose="020B0604020202020204" pitchFamily="34" charset="0"/>
+                  <a:cs typeface="Arial" panose="020B0604020202020204" pitchFamily="34" charset="0"/>
+                </a:rPr>
+                <a:t>Shell Scripts</a:t>
+              </a:r>
+              <a:endParaRPr lang="de-DE" sz="1200" b="1" dirty="0">
+                <a:latin typeface="Arial" panose="020B0604020202020204" pitchFamily="34" charset="0"/>
+                <a:cs typeface="Arial" panose="020B0604020202020204" pitchFamily="34" charset="0"/>
+              </a:endParaRPr>
+            </a:p>
+          </p:txBody>
+        </p:sp>
+        <p:sp>
+          <p:nvSpPr>
+            <p:cNvPr id="34" name="Rounded Rectangle 33"/>
+            <p:cNvSpPr/>
+            <p:nvPr/>
+          </p:nvSpPr>
+          <p:spPr>
+            <a:xfrm>
+              <a:off x="2397212" y="1148396"/>
+              <a:ext cx="936104" cy="936104"/>
+            </a:xfrm>
+            <a:prstGeom prst="roundRect">
+              <a:avLst/>
+            </a:prstGeom>
+            <a:solidFill>
+              <a:schemeClr val="accent2"/>
+            </a:solidFill>
+            <a:ln w="31750">
+              <a:solidFill>
+                <a:srgbClr val="C00000"/>
+              </a:solidFill>
+            </a:ln>
+          </p:spPr>
+          <p:style>
+            <a:lnRef idx="2">
+              <a:schemeClr val="accent1">
+                <a:shade val="50000"/>
+              </a:schemeClr>
+            </a:lnRef>
+            <a:fillRef idx="1">
+              <a:schemeClr val="accent1"/>
+            </a:fillRef>
+            <a:effectRef idx="0">
+              <a:schemeClr val="accent1"/>
+            </a:effectRef>
+            <a:fontRef idx="minor">
+              <a:schemeClr val="lt1"/>
+            </a:fontRef>
+          </p:style>
+          <p:txBody>
+            <a:bodyPr lIns="0" tIns="0" rIns="0" bIns="36000" rtlCol="0" anchor="ctr"/>
+            <a:lstStyle>
+              <a:defPPr>
+                <a:defRPr lang="de-DE"/>
+              </a:defPPr>
+              <a:lvl1pPr marL="0" algn="l" defTabSz="914400" rtl="0" eaLnBrk="1" latinLnBrk="0" hangingPunct="1">
+                <a:defRPr sz="1800" kern="1200">
+                  <a:solidFill>
+                    <a:schemeClr val="lt1"/>
+                  </a:solidFill>
+                  <a:latin typeface="+mn-lt"/>
+                  <a:ea typeface="+mn-ea"/>
+                  <a:cs typeface="+mn-cs"/>
+                </a:defRPr>
+              </a:lvl1pPr>
+              <a:lvl2pPr marL="457200" algn="l" defTabSz="914400" rtl="0" eaLnBrk="1" latinLnBrk="0" hangingPunct="1">
+                <a:defRPr sz="1800" kern="1200">
+                  <a:solidFill>
+                    <a:schemeClr val="lt1"/>
+                  </a:solidFill>
+                  <a:latin typeface="+mn-lt"/>
+                  <a:ea typeface="+mn-ea"/>
+                  <a:cs typeface="+mn-cs"/>
+                </a:defRPr>
+              </a:lvl2pPr>
+              <a:lvl3pPr marL="914400" algn="l" defTabSz="914400" rtl="0" eaLnBrk="1" latinLnBrk="0" hangingPunct="1">
+                <a:defRPr sz="1800" kern="1200">
+                  <a:solidFill>
+                    <a:schemeClr val="lt1"/>
+                  </a:solidFill>
+                  <a:latin typeface="+mn-lt"/>
+                  <a:ea typeface="+mn-ea"/>
+                  <a:cs typeface="+mn-cs"/>
+                </a:defRPr>
+              </a:lvl3pPr>
+              <a:lvl4pPr marL="1371600" algn="l" defTabSz="914400" rtl="0" eaLnBrk="1" latinLnBrk="0" hangingPunct="1">
+                <a:defRPr sz="1800" kern="1200">
+                  <a:solidFill>
+                    <a:schemeClr val="lt1"/>
+                  </a:solidFill>
+                  <a:latin typeface="+mn-lt"/>
+                  <a:ea typeface="+mn-ea"/>
+                  <a:cs typeface="+mn-cs"/>
+                </a:defRPr>
+              </a:lvl4pPr>
+              <a:lvl5pPr marL="1828800" algn="l" defTabSz="914400" rtl="0" eaLnBrk="1" latinLnBrk="0" hangingPunct="1">
+                <a:defRPr sz="1800" kern="1200">
+                  <a:solidFill>
+                    <a:schemeClr val="lt1"/>
+                  </a:solidFill>
+                  <a:latin typeface="+mn-lt"/>
+                  <a:ea typeface="+mn-ea"/>
+                  <a:cs typeface="+mn-cs"/>
+                </a:defRPr>
+              </a:lvl5pPr>
+              <a:lvl6pPr marL="2286000" algn="l" defTabSz="914400" rtl="0" eaLnBrk="1" latinLnBrk="0" hangingPunct="1">
+                <a:defRPr sz="1800" kern="1200">
+                  <a:solidFill>
+                    <a:schemeClr val="lt1"/>
+                  </a:solidFill>
+                  <a:latin typeface="+mn-lt"/>
+                  <a:ea typeface="+mn-ea"/>
+                  <a:cs typeface="+mn-cs"/>
+                </a:defRPr>
+              </a:lvl6pPr>
+              <a:lvl7pPr marL="2743200" algn="l" defTabSz="914400" rtl="0" eaLnBrk="1" latinLnBrk="0" hangingPunct="1">
+                <a:defRPr sz="1800" kern="1200">
+                  <a:solidFill>
+                    <a:schemeClr val="lt1"/>
+                  </a:solidFill>
+                  <a:latin typeface="+mn-lt"/>
+                  <a:ea typeface="+mn-ea"/>
+                  <a:cs typeface="+mn-cs"/>
+                </a:defRPr>
+              </a:lvl7pPr>
+              <a:lvl8pPr marL="3200400" algn="l" defTabSz="914400" rtl="0" eaLnBrk="1" latinLnBrk="0" hangingPunct="1">
+                <a:defRPr sz="1800" kern="1200">
+                  <a:solidFill>
+                    <a:schemeClr val="lt1"/>
+                  </a:solidFill>
+                  <a:latin typeface="+mn-lt"/>
+                  <a:ea typeface="+mn-ea"/>
+                  <a:cs typeface="+mn-cs"/>
+                </a:defRPr>
+              </a:lvl8pPr>
+              <a:lvl9pPr marL="3657600" algn="l" defTabSz="914400" rtl="0" eaLnBrk="1" latinLnBrk="0" hangingPunct="1">
+                <a:defRPr sz="1800" kern="1200">
+                  <a:solidFill>
+                    <a:schemeClr val="lt1"/>
+                  </a:solidFill>
+                  <a:latin typeface="+mn-lt"/>
+                  <a:ea typeface="+mn-ea"/>
+                  <a:cs typeface="+mn-cs"/>
+                </a:defRPr>
+              </a:lvl9pPr>
+            </a:lstStyle>
+            <a:p>
+              <a:pPr algn="ctr"/>
+              <a:r>
+                <a:rPr lang="de-DE" sz="1000" b="1" dirty="0" smtClean="0">
+                  <a:solidFill>
+                    <a:schemeClr val="tx1"/>
+                  </a:solidFill>
+                  <a:latin typeface="Arial" panose="020B0604020202020204" pitchFamily="34" charset="0"/>
+                  <a:cs typeface="Arial" panose="020B0604020202020204" pitchFamily="34" charset="0"/>
+                </a:rPr>
+                <a:t>Shell</a:t>
+              </a:r>
+            </a:p>
+            <a:p>
+              <a:pPr algn="ctr"/>
+              <a:r>
+                <a:rPr lang="de-DE" sz="1000" b="1" dirty="0" smtClean="0">
+                  <a:solidFill>
+                    <a:schemeClr val="tx1"/>
+                  </a:solidFill>
+                  <a:latin typeface="Arial" panose="020B0604020202020204" pitchFamily="34" charset="0"/>
+                  <a:cs typeface="Arial" panose="020B0604020202020204" pitchFamily="34" charset="0"/>
+                </a:rPr>
+                <a:t>Service</a:t>
+              </a:r>
+            </a:p>
+            <a:p>
+              <a:pPr algn="ctr"/>
+              <a:r>
+                <a:rPr lang="de-DE" sz="1000" b="1" dirty="0" smtClean="0">
+                  <a:solidFill>
+                    <a:schemeClr val="tx1"/>
+                  </a:solidFill>
+                  <a:latin typeface="Arial" panose="020B0604020202020204" pitchFamily="34" charset="0"/>
+                  <a:cs typeface="Arial" panose="020B0604020202020204" pitchFamily="34" charset="0"/>
+                </a:rPr>
+                <a:t>Controller</a:t>
+              </a:r>
+              <a:endParaRPr lang="de-DE" sz="1000" b="1" dirty="0">
+                <a:solidFill>
+                  <a:schemeClr val="tx1"/>
+                </a:solidFill>
+                <a:latin typeface="Arial" panose="020B0604020202020204" pitchFamily="34" charset="0"/>
+                <a:cs typeface="Arial" panose="020B0604020202020204" pitchFamily="34" charset="0"/>
+              </a:endParaRPr>
+            </a:p>
+          </p:txBody>
+        </p:sp>
+        <p:sp>
+          <p:nvSpPr>
+            <p:cNvPr id="35" name="TextBox 19"/>
+            <p:cNvSpPr txBox="1"/>
+            <p:nvPr/>
+          </p:nvSpPr>
+          <p:spPr>
+            <a:xfrm>
+              <a:off x="1120552" y="2411760"/>
+              <a:ext cx="756084" cy="246221"/>
+            </a:xfrm>
+            <a:prstGeom prst="rect">
+              <a:avLst/>
+            </a:prstGeom>
+            <a:noFill/>
+          </p:spPr>
+          <p:txBody>
+            <a:bodyPr wrap="square" rtlCol="0">
+              <a:spAutoFit/>
+            </a:bodyPr>
+            <a:lstStyle>
+              <a:defPPr>
+                <a:defRPr lang="de-DE"/>
+              </a:defPPr>
+              <a:lvl1pPr marL="0" algn="l" defTabSz="914400" rtl="0" eaLnBrk="1" latinLnBrk="0" hangingPunct="1">
+                <a:defRPr sz="1800" kern="1200">
+                  <a:solidFill>
+                    <a:schemeClr val="tx1"/>
+                  </a:solidFill>
+                  <a:latin typeface="+mn-lt"/>
+                  <a:ea typeface="+mn-ea"/>
+                  <a:cs typeface="+mn-cs"/>
+                </a:defRPr>
+              </a:lvl1pPr>
+              <a:lvl2pPr marL="457200" algn="l" defTabSz="914400" rtl="0" eaLnBrk="1" latinLnBrk="0" hangingPunct="1">
+                <a:defRPr sz="1800" kern="1200">
+                  <a:solidFill>
+                    <a:schemeClr val="tx1"/>
+                  </a:solidFill>
+                  <a:latin typeface="+mn-lt"/>
+                  <a:ea typeface="+mn-ea"/>
+                  <a:cs typeface="+mn-cs"/>
+                </a:defRPr>
+              </a:lvl2pPr>
+              <a:lvl3pPr marL="914400" algn="l" defTabSz="914400" rtl="0" eaLnBrk="1" latinLnBrk="0" hangingPunct="1">
+                <a:defRPr sz="1800" kern="1200">
+                  <a:solidFill>
+                    <a:schemeClr val="tx1"/>
+                  </a:solidFill>
+                  <a:latin typeface="+mn-lt"/>
+                  <a:ea typeface="+mn-ea"/>
+                  <a:cs typeface="+mn-cs"/>
+                </a:defRPr>
+              </a:lvl3pPr>
+              <a:lvl4pPr marL="1371600" algn="l" defTabSz="914400" rtl="0" eaLnBrk="1" latinLnBrk="0" hangingPunct="1">
+                <a:defRPr sz="1800" kern="1200">
+                  <a:solidFill>
+                    <a:schemeClr val="tx1"/>
+                  </a:solidFill>
+                  <a:latin typeface="+mn-lt"/>
+                  <a:ea typeface="+mn-ea"/>
+                  <a:cs typeface="+mn-cs"/>
+                </a:defRPr>
+              </a:lvl4pPr>
+              <a:lvl5pPr marL="1828800" algn="l" defTabSz="914400" rtl="0" eaLnBrk="1" latinLnBrk="0" hangingPunct="1">
+                <a:defRPr sz="1800" kern="1200">
+                  <a:solidFill>
+                    <a:schemeClr val="tx1"/>
+                  </a:solidFill>
+                  <a:latin typeface="+mn-lt"/>
+                  <a:ea typeface="+mn-ea"/>
+                  <a:cs typeface="+mn-cs"/>
+                </a:defRPr>
+              </a:lvl5pPr>
+              <a:lvl6pPr marL="2286000" algn="l" defTabSz="914400" rtl="0" eaLnBrk="1" latinLnBrk="0" hangingPunct="1">
+                <a:defRPr sz="1800" kern="1200">
+                  <a:solidFill>
+                    <a:schemeClr val="tx1"/>
+                  </a:solidFill>
+                  <a:latin typeface="+mn-lt"/>
+                  <a:ea typeface="+mn-ea"/>
+                  <a:cs typeface="+mn-cs"/>
+                </a:defRPr>
+              </a:lvl6pPr>
+              <a:lvl7pPr marL="2743200" algn="l" defTabSz="914400" rtl="0" eaLnBrk="1" latinLnBrk="0" hangingPunct="1">
+                <a:defRPr sz="1800" kern="1200">
+                  <a:solidFill>
+                    <a:schemeClr val="tx1"/>
+                  </a:solidFill>
+                  <a:latin typeface="+mn-lt"/>
+                  <a:ea typeface="+mn-ea"/>
+                  <a:cs typeface="+mn-cs"/>
+                </a:defRPr>
+              </a:lvl7pPr>
+              <a:lvl8pPr marL="3200400" algn="l" defTabSz="914400" rtl="0" eaLnBrk="1" latinLnBrk="0" hangingPunct="1">
+                <a:defRPr sz="1800" kern="1200">
+                  <a:solidFill>
+                    <a:schemeClr val="tx1"/>
+                  </a:solidFill>
+                  <a:latin typeface="+mn-lt"/>
+                  <a:ea typeface="+mn-ea"/>
+                  <a:cs typeface="+mn-cs"/>
+                </a:defRPr>
+              </a:lvl8pPr>
+              <a:lvl9pPr marL="3657600" algn="l" defTabSz="914400" rtl="0" eaLnBrk="1" latinLnBrk="0" hangingPunct="1">
+                <a:defRPr sz="1800" kern="1200">
+                  <a:solidFill>
+                    <a:schemeClr val="tx1"/>
+                  </a:solidFill>
+                  <a:latin typeface="+mn-lt"/>
+                  <a:ea typeface="+mn-ea"/>
+                  <a:cs typeface="+mn-cs"/>
+                </a:defRPr>
+              </a:lvl9pPr>
+            </a:lstStyle>
+            <a:p>
+              <a:r>
+                <a:rPr lang="de-DE" sz="1000" b="1" dirty="0" smtClean="0">
+                  <a:latin typeface="Arial" panose="020B0604020202020204" pitchFamily="34" charset="0"/>
+                  <a:cs typeface="Arial" panose="020B0604020202020204" pitchFamily="34" charset="0"/>
+                </a:rPr>
+                <a:t>Platform</a:t>
+              </a:r>
+              <a:endParaRPr lang="de-DE" sz="1000" b="1" dirty="0">
+                <a:latin typeface="Arial" panose="020B0604020202020204" pitchFamily="34" charset="0"/>
+                <a:cs typeface="Arial" panose="020B0604020202020204" pitchFamily="34" charset="0"/>
+              </a:endParaRPr>
+            </a:p>
+          </p:txBody>
+        </p:sp>
+        <p:sp>
+          <p:nvSpPr>
+            <p:cNvPr id="36" name="TextBox 20"/>
+            <p:cNvSpPr txBox="1"/>
+            <p:nvPr/>
+          </p:nvSpPr>
+          <p:spPr>
+            <a:xfrm>
+              <a:off x="2236676" y="2123728"/>
+              <a:ext cx="1278272" cy="553998"/>
+            </a:xfrm>
+            <a:prstGeom prst="rect">
+              <a:avLst/>
+            </a:prstGeom>
+            <a:noFill/>
+          </p:spPr>
+          <p:txBody>
+            <a:bodyPr wrap="square" rtlCol="0">
+              <a:spAutoFit/>
+            </a:bodyPr>
+            <a:lstStyle>
+              <a:defPPr>
+                <a:defRPr lang="de-DE"/>
+              </a:defPPr>
+              <a:lvl1pPr marL="0" algn="l" defTabSz="914400" rtl="0" eaLnBrk="1" latinLnBrk="0" hangingPunct="1">
+                <a:defRPr sz="1800" kern="1200">
+                  <a:solidFill>
+                    <a:schemeClr val="tx1"/>
+                  </a:solidFill>
+                  <a:latin typeface="+mn-lt"/>
+                  <a:ea typeface="+mn-ea"/>
+                  <a:cs typeface="+mn-cs"/>
+                </a:defRPr>
+              </a:lvl1pPr>
+              <a:lvl2pPr marL="457200" algn="l" defTabSz="914400" rtl="0" eaLnBrk="1" latinLnBrk="0" hangingPunct="1">
+                <a:defRPr sz="1800" kern="1200">
+                  <a:solidFill>
+                    <a:schemeClr val="tx1"/>
+                  </a:solidFill>
+                  <a:latin typeface="+mn-lt"/>
+                  <a:ea typeface="+mn-ea"/>
+                  <a:cs typeface="+mn-cs"/>
+                </a:defRPr>
+              </a:lvl2pPr>
+              <a:lvl3pPr marL="914400" algn="l" defTabSz="914400" rtl="0" eaLnBrk="1" latinLnBrk="0" hangingPunct="1">
+                <a:defRPr sz="1800" kern="1200">
+                  <a:solidFill>
+                    <a:schemeClr val="tx1"/>
+                  </a:solidFill>
+                  <a:latin typeface="+mn-lt"/>
+                  <a:ea typeface="+mn-ea"/>
+                  <a:cs typeface="+mn-cs"/>
+                </a:defRPr>
+              </a:lvl3pPr>
+              <a:lvl4pPr marL="1371600" algn="l" defTabSz="914400" rtl="0" eaLnBrk="1" latinLnBrk="0" hangingPunct="1">
+                <a:defRPr sz="1800" kern="1200">
+                  <a:solidFill>
+                    <a:schemeClr val="tx1"/>
+                  </a:solidFill>
+                  <a:latin typeface="+mn-lt"/>
+                  <a:ea typeface="+mn-ea"/>
+                  <a:cs typeface="+mn-cs"/>
+                </a:defRPr>
+              </a:lvl4pPr>
+              <a:lvl5pPr marL="1828800" algn="l" defTabSz="914400" rtl="0" eaLnBrk="1" latinLnBrk="0" hangingPunct="1">
+                <a:defRPr sz="1800" kern="1200">
+                  <a:solidFill>
+                    <a:schemeClr val="tx1"/>
+                  </a:solidFill>
+                  <a:latin typeface="+mn-lt"/>
+                  <a:ea typeface="+mn-ea"/>
+                  <a:cs typeface="+mn-cs"/>
+                </a:defRPr>
+              </a:lvl5pPr>
+              <a:lvl6pPr marL="2286000" algn="l" defTabSz="914400" rtl="0" eaLnBrk="1" latinLnBrk="0" hangingPunct="1">
+                <a:defRPr sz="1800" kern="1200">
+                  <a:solidFill>
+                    <a:schemeClr val="tx1"/>
+                  </a:solidFill>
+                  <a:latin typeface="+mn-lt"/>
+                  <a:ea typeface="+mn-ea"/>
+                  <a:cs typeface="+mn-cs"/>
+                </a:defRPr>
+              </a:lvl6pPr>
+              <a:lvl7pPr marL="2743200" algn="l" defTabSz="914400" rtl="0" eaLnBrk="1" latinLnBrk="0" hangingPunct="1">
+                <a:defRPr sz="1800" kern="1200">
+                  <a:solidFill>
+                    <a:schemeClr val="tx1"/>
+                  </a:solidFill>
+                  <a:latin typeface="+mn-lt"/>
+                  <a:ea typeface="+mn-ea"/>
+                  <a:cs typeface="+mn-cs"/>
+                </a:defRPr>
+              </a:lvl7pPr>
+              <a:lvl8pPr marL="3200400" algn="l" defTabSz="914400" rtl="0" eaLnBrk="1" latinLnBrk="0" hangingPunct="1">
+                <a:defRPr sz="1800" kern="1200">
+                  <a:solidFill>
+                    <a:schemeClr val="tx1"/>
+                  </a:solidFill>
+                  <a:latin typeface="+mn-lt"/>
+                  <a:ea typeface="+mn-ea"/>
+                  <a:cs typeface="+mn-cs"/>
+                </a:defRPr>
+              </a:lvl8pPr>
+              <a:lvl9pPr marL="3657600" algn="l" defTabSz="914400" rtl="0" eaLnBrk="1" latinLnBrk="0" hangingPunct="1">
+                <a:defRPr sz="1800" kern="1200">
+                  <a:solidFill>
+                    <a:schemeClr val="tx1"/>
+                  </a:solidFill>
+                  <a:latin typeface="+mn-lt"/>
+                  <a:ea typeface="+mn-ea"/>
+                  <a:cs typeface="+mn-cs"/>
+                </a:defRPr>
+              </a:lvl9pPr>
+            </a:lstStyle>
+            <a:p>
+              <a:pPr algn="ctr"/>
+              <a:r>
+                <a:rPr lang="de-DE" sz="1000" b="1" dirty="0" smtClean="0">
+                  <a:latin typeface="Arial" panose="020B0604020202020204" pitchFamily="34" charset="0"/>
+                  <a:cs typeface="Arial" panose="020B0604020202020204" pitchFamily="34" charset="0"/>
+                </a:rPr>
+                <a:t>Asynchronous</a:t>
+              </a:r>
+            </a:p>
+            <a:p>
+              <a:pPr algn="ctr"/>
+              <a:r>
+                <a:rPr lang="de-DE" sz="1000" b="1" dirty="0" smtClean="0">
+                  <a:latin typeface="Arial" panose="020B0604020202020204" pitchFamily="34" charset="0"/>
+                  <a:cs typeface="Arial" panose="020B0604020202020204" pitchFamily="34" charset="0"/>
+                </a:rPr>
+                <a:t>Provisioning</a:t>
+              </a:r>
+            </a:p>
+            <a:p>
+              <a:pPr algn="ctr"/>
+              <a:r>
+                <a:rPr lang="de-DE" sz="1000" b="1" dirty="0" smtClean="0">
+                  <a:latin typeface="Arial" panose="020B0604020202020204" pitchFamily="34" charset="0"/>
+                  <a:cs typeface="Arial" panose="020B0604020202020204" pitchFamily="34" charset="0"/>
+                </a:rPr>
+                <a:t>Platform (APP)</a:t>
+              </a:r>
+              <a:endParaRPr lang="de-DE" sz="1000" b="1" dirty="0">
+                <a:latin typeface="Arial" panose="020B0604020202020204" pitchFamily="34" charset="0"/>
+                <a:cs typeface="Arial" panose="020B0604020202020204" pitchFamily="34" charset="0"/>
+              </a:endParaRPr>
+            </a:p>
+          </p:txBody>
+        </p:sp>
+        <p:cxnSp>
+          <p:nvCxnSpPr>
+            <p:cNvPr id="37" name="Straight Arrow Connector 36"/>
+            <p:cNvCxnSpPr>
+              <a:stCxn id="25" idx="3"/>
+              <a:endCxn id="34" idx="1"/>
+            </p:cNvCxnSpPr>
+            <p:nvPr/>
+          </p:nvCxnSpPr>
+          <p:spPr>
+            <a:xfrm>
+              <a:off x="1948644" y="1609068"/>
+              <a:ext cx="448568" cy="7380"/>
+            </a:xfrm>
+            <a:prstGeom prst="straightConnector1">
+              <a:avLst/>
+            </a:prstGeom>
+            <a:ln w="19050">
+              <a:solidFill>
+                <a:srgbClr val="C00000"/>
+              </a:solidFill>
+              <a:tailEnd type="arrow"/>
+            </a:ln>
+          </p:spPr>
+          <p:style>
+            <a:lnRef idx="1">
+              <a:schemeClr val="accent1"/>
+            </a:lnRef>
+            <a:fillRef idx="0">
+              <a:schemeClr val="accent1"/>
+            </a:fillRef>
+            <a:effectRef idx="0">
+              <a:schemeClr val="accent1"/>
+            </a:effectRef>
+            <a:fontRef idx="minor">
+              <a:schemeClr val="tx1"/>
+            </a:fontRef>
+          </p:style>
+        </p:cxnSp>
+        <p:cxnSp>
+          <p:nvCxnSpPr>
+            <p:cNvPr id="38" name="Straight Arrow Connector 37"/>
+            <p:cNvCxnSpPr/>
+            <p:nvPr/>
+          </p:nvCxnSpPr>
+          <p:spPr>
+            <a:xfrm flipH="1">
+              <a:off x="1707753" y="2423810"/>
+              <a:ext cx="689459" cy="0"/>
+            </a:xfrm>
+            <a:prstGeom prst="straightConnector1">
+              <a:avLst/>
+            </a:prstGeom>
+            <a:ln w="19050">
+              <a:solidFill>
+                <a:srgbClr val="C00000"/>
+              </a:solidFill>
+              <a:tailEnd type="arrow"/>
+            </a:ln>
+          </p:spPr>
+          <p:style>
+            <a:lnRef idx="1">
+              <a:schemeClr val="accent1"/>
+            </a:lnRef>
+            <a:fillRef idx="0">
+              <a:schemeClr val="accent1"/>
+            </a:fillRef>
+            <a:effectRef idx="0">
+              <a:schemeClr val="accent1"/>
+            </a:effectRef>
+            <a:fontRef idx="minor">
+              <a:schemeClr val="tx1"/>
+            </a:fontRef>
+          </p:style>
+        </p:cxnSp>
+        <p:cxnSp>
+          <p:nvCxnSpPr>
+            <p:cNvPr id="39" name="Straight Arrow Connector 38"/>
+            <p:cNvCxnSpPr>
+              <a:stCxn id="34" idx="3"/>
+            </p:cNvCxnSpPr>
+            <p:nvPr/>
+          </p:nvCxnSpPr>
+          <p:spPr>
+            <a:xfrm>
+              <a:off x="3333316" y="1616448"/>
+              <a:ext cx="491728" cy="10604"/>
+            </a:xfrm>
+            <a:prstGeom prst="straightConnector1">
+              <a:avLst/>
+            </a:prstGeom>
+            <a:ln w="19050">
+              <a:solidFill>
+                <a:srgbClr val="C00000"/>
+              </a:solidFill>
+              <a:tailEnd type="arrow"/>
+            </a:ln>
+          </p:spPr>
+          <p:style>
+            <a:lnRef idx="1">
+              <a:schemeClr val="accent1"/>
+            </a:lnRef>
+            <a:fillRef idx="0">
+              <a:schemeClr val="accent1"/>
+            </a:fillRef>
+            <a:effectRef idx="0">
+              <a:schemeClr val="accent1"/>
+            </a:effectRef>
+            <a:fontRef idx="minor">
+              <a:schemeClr val="tx1"/>
+            </a:fontRef>
+          </p:style>
+        </p:cxnSp>
+        <p:cxnSp>
+          <p:nvCxnSpPr>
+            <p:cNvPr id="40" name="Straight Arrow Connector 39"/>
+            <p:cNvCxnSpPr>
+              <a:stCxn id="19" idx="1"/>
+            </p:cNvCxnSpPr>
+            <p:nvPr/>
+          </p:nvCxnSpPr>
+          <p:spPr>
+            <a:xfrm flipH="1">
+              <a:off x="3333316" y="1758172"/>
+              <a:ext cx="491728" cy="0"/>
+            </a:xfrm>
+            <a:prstGeom prst="straightConnector1">
+              <a:avLst/>
+            </a:prstGeom>
+            <a:ln w="19050">
+              <a:solidFill>
+                <a:schemeClr val="tx2"/>
+              </a:solidFill>
+              <a:tailEnd type="arrow"/>
+            </a:ln>
+          </p:spPr>
+          <p:style>
+            <a:lnRef idx="1">
+              <a:schemeClr val="accent1"/>
+            </a:lnRef>
+            <a:fillRef idx="0">
+              <a:schemeClr val="accent1"/>
+            </a:fillRef>
+            <a:effectRef idx="0">
+              <a:schemeClr val="accent1"/>
+            </a:effectRef>
+            <a:fontRef idx="minor">
+              <a:schemeClr val="tx1"/>
+            </a:fontRef>
+          </p:style>
+        </p:cxnSp>
+      </p:grpSp>
+      <p:sp>
+        <p:nvSpPr>
+          <p:cNvPr id="31" name="Rounded Rectangle 30"/>
+          <p:cNvSpPr/>
+          <p:nvPr/>
+        </p:nvSpPr>
+        <p:spPr>
+          <a:xfrm>
+            <a:off x="4005064" y="1043608"/>
+            <a:ext cx="1890340" cy="1944216"/>
+          </a:xfrm>
+          <a:prstGeom prst="roundRect">
+            <a:avLst/>
+          </a:prstGeom>
+          <a:solidFill>
+            <a:schemeClr val="tx2">
+              <a:lumMod val="20000"/>
+              <a:lumOff val="80000"/>
+            </a:schemeClr>
+          </a:solidFill>
+          <a:ln w="31750"/>
+        </p:spPr>
+        <p:style>
+          <a:lnRef idx="2">
+            <a:schemeClr val="accent1">
+              <a:shade val="50000"/>
+            </a:schemeClr>
+          </a:lnRef>
+          <a:fillRef idx="1">
+            <a:schemeClr val="accent1"/>
+          </a:fillRef>
+          <a:effectRef idx="0">
+            <a:schemeClr val="accent1"/>
+          </a:effectRef>
+          <a:fontRef idx="minor">
+            <a:schemeClr val="lt1"/>
+          </a:fontRef>
+        </p:style>
+        <p:txBody>
+          <a:bodyPr rtlCol="0" anchor="ctr"/>
+          <a:lstStyle/>
+          <a:p>
+            <a:pPr algn="ctr"/>
+            <a:endParaRPr lang="de-DE" sz="1000" b="1" dirty="0">
+              <a:solidFill>
+                <a:schemeClr val="tx1"/>
+              </a:solidFill>
+              <a:latin typeface="Arial" panose="020B0604020202020204" pitchFamily="34" charset="0"/>
+              <a:cs typeface="Arial" panose="020B0604020202020204" pitchFamily="34" charset="0"/>
+            </a:endParaRPr>
+          </a:p>
+        </p:txBody>
+      </p:sp>
+      <p:sp>
+        <p:nvSpPr>
+          <p:cNvPr id="3" name="TextBox 2"/>
+          <p:cNvSpPr txBox="1"/>
+          <p:nvPr/>
+        </p:nvSpPr>
+        <p:spPr>
+          <a:xfrm>
+            <a:off x="4178349" y="1048832"/>
+            <a:ext cx="1484702" cy="1938992"/>
+          </a:xfrm>
+          <a:prstGeom prst="rect">
+            <a:avLst/>
+          </a:prstGeom>
+          <a:noFill/>
+        </p:spPr>
+        <p:txBody>
+          <a:bodyPr wrap="none" rtlCol="0">
+            <a:spAutoFit/>
+          </a:bodyPr>
+          <a:lstStyle/>
+          <a:p>
+            <a:pPr marL="285750" indent="-285750">
+              <a:buFont typeface="Arial" panose="020B0604020202020204" pitchFamily="34" charset="0"/>
+              <a:buChar char="•"/>
+            </a:pPr>
+            <a:r>
+              <a:rPr lang="de-DE" sz="1200" dirty="0" err="1" smtClean="0">
+                <a:latin typeface="Arial" panose="020B0604020202020204" pitchFamily="34" charset="0"/>
+                <a:cs typeface="Arial" panose="020B0604020202020204" pitchFamily="34" charset="0"/>
+              </a:rPr>
+              <a:t>Provisioning</a:t>
+            </a:r>
+            <a:endParaRPr lang="de-DE" sz="1200" dirty="0" smtClean="0">
+              <a:latin typeface="Arial" panose="020B0604020202020204" pitchFamily="34" charset="0"/>
+              <a:cs typeface="Arial" panose="020B0604020202020204" pitchFamily="34" charset="0"/>
+            </a:endParaRPr>
+          </a:p>
+          <a:p>
+            <a:pPr marL="285750" indent="-285750">
+              <a:buFont typeface="Arial" panose="020B0604020202020204" pitchFamily="34" charset="0"/>
+              <a:buChar char="•"/>
+            </a:pPr>
+            <a:r>
+              <a:rPr lang="de-DE" sz="1200" dirty="0" err="1" smtClean="0">
+                <a:latin typeface="Arial" panose="020B0604020202020204" pitchFamily="34" charset="0"/>
+                <a:cs typeface="Arial" panose="020B0604020202020204" pitchFamily="34" charset="0"/>
+              </a:rPr>
+              <a:t>Deprovisioning</a:t>
+            </a:r>
+            <a:endParaRPr lang="de-DE" sz="1200" dirty="0" smtClean="0">
+              <a:latin typeface="Arial" panose="020B0604020202020204" pitchFamily="34" charset="0"/>
+              <a:cs typeface="Arial" panose="020B0604020202020204" pitchFamily="34" charset="0"/>
+            </a:endParaRPr>
+          </a:p>
+          <a:p>
+            <a:pPr marL="285750" indent="-285750">
+              <a:buFont typeface="Arial" panose="020B0604020202020204" pitchFamily="34" charset="0"/>
+              <a:buChar char="•"/>
+            </a:pPr>
+            <a:r>
+              <a:rPr lang="de-DE" sz="1200" dirty="0" err="1" smtClean="0">
+                <a:latin typeface="Arial" panose="020B0604020202020204" pitchFamily="34" charset="0"/>
+                <a:cs typeface="Arial" panose="020B0604020202020204" pitchFamily="34" charset="0"/>
+              </a:rPr>
+              <a:t>Assign</a:t>
+            </a:r>
+            <a:r>
+              <a:rPr lang="de-DE" sz="1200" dirty="0" smtClean="0">
+                <a:latin typeface="Arial" panose="020B0604020202020204" pitchFamily="34" charset="0"/>
+                <a:cs typeface="Arial" panose="020B0604020202020204" pitchFamily="34" charset="0"/>
+              </a:rPr>
+              <a:t> User</a:t>
+            </a:r>
+          </a:p>
+          <a:p>
+            <a:pPr marL="285750" indent="-285750">
+              <a:buFont typeface="Arial" panose="020B0604020202020204" pitchFamily="34" charset="0"/>
+              <a:buChar char="•"/>
+            </a:pPr>
+            <a:r>
+              <a:rPr lang="de-DE" sz="1200" dirty="0" err="1" smtClean="0">
+                <a:latin typeface="Arial" panose="020B0604020202020204" pitchFamily="34" charset="0"/>
+                <a:cs typeface="Arial" panose="020B0604020202020204" pitchFamily="34" charset="0"/>
+              </a:rPr>
+              <a:t>Deassign</a:t>
+            </a:r>
+            <a:r>
+              <a:rPr lang="de-DE" sz="1200" dirty="0" smtClean="0">
+                <a:latin typeface="Arial" panose="020B0604020202020204" pitchFamily="34" charset="0"/>
+                <a:cs typeface="Arial" panose="020B0604020202020204" pitchFamily="34" charset="0"/>
+              </a:rPr>
+              <a:t> User</a:t>
+            </a:r>
+          </a:p>
+          <a:p>
+            <a:pPr marL="285750" indent="-285750">
+              <a:buFont typeface="Arial" panose="020B0604020202020204" pitchFamily="34" charset="0"/>
+              <a:buChar char="•"/>
+            </a:pPr>
+            <a:r>
+              <a:rPr lang="de-DE" sz="1200" dirty="0" err="1" smtClean="0">
+                <a:latin typeface="Arial" panose="020B0604020202020204" pitchFamily="34" charset="0"/>
+                <a:cs typeface="Arial" panose="020B0604020202020204" pitchFamily="34" charset="0"/>
+              </a:rPr>
+              <a:t>Modification</a:t>
+            </a:r>
+            <a:endParaRPr lang="de-DE" sz="1200" dirty="0" smtClean="0">
+              <a:latin typeface="Arial" panose="020B0604020202020204" pitchFamily="34" charset="0"/>
+              <a:cs typeface="Arial" panose="020B0604020202020204" pitchFamily="34" charset="0"/>
+            </a:endParaRPr>
+          </a:p>
+          <a:p>
+            <a:pPr marL="285750" indent="-285750">
+              <a:buFont typeface="Arial" panose="020B0604020202020204" pitchFamily="34" charset="0"/>
+              <a:buChar char="•"/>
+            </a:pPr>
+            <a:r>
+              <a:rPr lang="de-DE" sz="1200" dirty="0" smtClean="0">
+                <a:latin typeface="Arial" panose="020B0604020202020204" pitchFamily="34" charset="0"/>
+                <a:cs typeface="Arial" panose="020B0604020202020204" pitchFamily="34" charset="0"/>
+              </a:rPr>
+              <a:t>Check </a:t>
+            </a:r>
+            <a:r>
+              <a:rPr lang="de-DE" sz="1200" dirty="0" smtClean="0">
+                <a:latin typeface="Arial" panose="020B0604020202020204" pitchFamily="34" charset="0"/>
+                <a:cs typeface="Arial" panose="020B0604020202020204" pitchFamily="34" charset="0"/>
+              </a:rPr>
+              <a:t>Status</a:t>
+            </a:r>
+          </a:p>
+          <a:p>
+            <a:pPr marL="285750" indent="-285750">
+              <a:buFont typeface="Arial" panose="020B0604020202020204" pitchFamily="34" charset="0"/>
+              <a:buChar char="•"/>
+            </a:pPr>
+            <a:r>
+              <a:rPr lang="de-DE" sz="1200" dirty="0">
+                <a:latin typeface="Arial" panose="020B0604020202020204" pitchFamily="34" charset="0"/>
+                <a:cs typeface="Arial" panose="020B0604020202020204" pitchFamily="34" charset="0"/>
+              </a:rPr>
+              <a:t>Operation</a:t>
+            </a:r>
+          </a:p>
+          <a:p>
+            <a:pPr marL="285750" indent="-285750">
+              <a:buFont typeface="Arial" panose="020B0604020202020204" pitchFamily="34" charset="0"/>
+              <a:buChar char="•"/>
+            </a:pPr>
+            <a:r>
+              <a:rPr lang="de-DE" sz="1200" dirty="0" err="1" smtClean="0">
+                <a:latin typeface="Arial" panose="020B0604020202020204" pitchFamily="34" charset="0"/>
+                <a:cs typeface="Arial" panose="020B0604020202020204" pitchFamily="34" charset="0"/>
+              </a:rPr>
+              <a:t>Verification</a:t>
+            </a:r>
+            <a:endParaRPr lang="de-DE" sz="1200" dirty="0" smtClean="0">
+              <a:latin typeface="Arial" panose="020B0604020202020204" pitchFamily="34" charset="0"/>
+              <a:cs typeface="Arial" panose="020B0604020202020204" pitchFamily="34" charset="0"/>
+            </a:endParaRPr>
+          </a:p>
+          <a:p>
+            <a:pPr marL="285750" indent="-285750">
+              <a:buFont typeface="Arial" panose="020B0604020202020204" pitchFamily="34" charset="0"/>
+              <a:buChar char="•"/>
+            </a:pPr>
+            <a:r>
+              <a:rPr lang="de-DE" sz="1200" dirty="0" smtClean="0">
+                <a:latin typeface="Arial" panose="020B0604020202020204" pitchFamily="34" charset="0"/>
+                <a:cs typeface="Arial" panose="020B0604020202020204" pitchFamily="34" charset="0"/>
+              </a:rPr>
+              <a:t>Update User</a:t>
+            </a:r>
+          </a:p>
+          <a:p>
+            <a:pPr marL="285750" indent="-285750">
+              <a:buFont typeface="Arial" panose="020B0604020202020204" pitchFamily="34" charset="0"/>
+              <a:buChar char="•"/>
+            </a:pPr>
+            <a:r>
+              <a:rPr lang="de-DE" sz="1200" dirty="0" smtClean="0">
+                <a:latin typeface="Arial" panose="020B0604020202020204" pitchFamily="34" charset="0"/>
+                <a:cs typeface="Arial" panose="020B0604020202020204" pitchFamily="34" charset="0"/>
+              </a:rPr>
+              <a:t>Start</a:t>
+            </a:r>
+            <a:endParaRPr lang="de-DE" sz="1200" dirty="0">
+              <a:latin typeface="Arial" panose="020B0604020202020204" pitchFamily="34" charset="0"/>
+              <a:cs typeface="Arial" panose="020B0604020202020204" pitchFamily="34" charset="0"/>
+            </a:endParaRPr>
+          </a:p>
+        </p:txBody>
+      </p:sp>
+    </p:spTree>
+    <p:extLst>
+      <p:ext uri="{BB962C8B-B14F-4D97-AF65-F5344CB8AC3E}">
+        <p14:creationId xmlns:p14="http://schemas.microsoft.com/office/powerpoint/2010/main" val="2262136484"/>
+      </p:ext>
+    </p:extLst>
+  </p:cSld>
+  <p:clrMapOvr>
+    <a:masterClrMapping/>
+  </p:clrMapOvr>
+  <p:timing>
+    <p:tnLst>
+      <p:par>
+        <p:cTn id="1" dur="indefinite" restart="never" nodeType="tmRoot"/>
+      </p:par>
+    </p:tnLst>
+  </p:timing>
+</p:sld>
+</file>
+
+<file path=ppt/slides/slide2.xml><?xml version="1.0" encoding="utf-8"?>
+<p:sld xmlns:a="http://schemas.openxmlformats.org/drawingml/2006/main" xmlns:r="http://schemas.openxmlformats.org/officeDocument/2006/relationships" xmlns:p="http://schemas.openxmlformats.org/presentationml/2006/main">
+  <p:cSld>
+    <p:spTree>
+      <p:nvGrpSpPr>
+        <p:cNvPr id="1" name=""/>
+        <p:cNvGrpSpPr/>
+        <p:nvPr/>
+      </p:nvGrpSpPr>
+      <p:grpSpPr>
+        <a:xfrm>
+          <a:off x="0" y="0"/>
+          <a:ext cx="0" cy="0"/>
+          <a:chOff x="0" y="0"/>
+          <a:chExt cx="0" cy="0"/>
+        </a:xfrm>
+      </p:grpSpPr>
+      <p:grpSp>
+        <p:nvGrpSpPr>
+          <p:cNvPr id="2" name="Group 1"/>
+          <p:cNvGrpSpPr/>
+          <p:nvPr/>
+        </p:nvGrpSpPr>
+        <p:grpSpPr>
+          <a:xfrm>
+            <a:off x="728700" y="611560"/>
+            <a:ext cx="5400600" cy="2293223"/>
+            <a:chOff x="728700" y="611560"/>
+            <a:chExt cx="5400600" cy="2293223"/>
+          </a:xfrm>
+        </p:grpSpPr>
+        <p:sp>
+          <p:nvSpPr>
+            <p:cNvPr id="18" name="Rounded Rectangle 17"/>
+            <p:cNvSpPr/>
+            <p:nvPr/>
+          </p:nvSpPr>
+          <p:spPr>
+            <a:xfrm>
+              <a:off x="728700" y="611560"/>
+              <a:ext cx="2862448" cy="2293223"/>
+            </a:xfrm>
+            <a:prstGeom prst="roundRect">
+              <a:avLst/>
+            </a:prstGeom>
+            <a:noFill/>
+            <a:ln w="31750">
+              <a:solidFill>
+                <a:srgbClr val="C00000"/>
+              </a:solidFill>
+              <a:prstDash val="solid"/>
+            </a:ln>
+          </p:spPr>
+          <p:style>
+            <a:lnRef idx="2">
+              <a:schemeClr val="accent1">
+                <a:shade val="50000"/>
+              </a:schemeClr>
+            </a:lnRef>
+            <a:fillRef idx="1">
+              <a:schemeClr val="accent1"/>
+            </a:fillRef>
+            <a:effectRef idx="0">
+              <a:schemeClr val="accent1"/>
+            </a:effectRef>
+            <a:fontRef idx="minor">
+              <a:schemeClr val="lt1"/>
+            </a:fontRef>
+          </p:style>
+          <p:txBody>
+            <a:bodyPr rtlCol="0" anchor="ctr"/>
+            <a:lstStyle>
+              <a:defPPr>
+                <a:defRPr lang="de-DE"/>
+              </a:defPPr>
+              <a:lvl1pPr marL="0" algn="l" defTabSz="914400" rtl="0" eaLnBrk="1" latinLnBrk="0" hangingPunct="1">
+                <a:defRPr sz="1800" kern="1200">
+                  <a:solidFill>
+                    <a:schemeClr val="lt1"/>
+                  </a:solidFill>
+                  <a:latin typeface="+mn-lt"/>
+                  <a:ea typeface="+mn-ea"/>
+                  <a:cs typeface="+mn-cs"/>
+                </a:defRPr>
+              </a:lvl1pPr>
+              <a:lvl2pPr marL="457200" algn="l" defTabSz="914400" rtl="0" eaLnBrk="1" latinLnBrk="0" hangingPunct="1">
+                <a:defRPr sz="1800" kern="1200">
+                  <a:solidFill>
+                    <a:schemeClr val="lt1"/>
+                  </a:solidFill>
+                  <a:latin typeface="+mn-lt"/>
+                  <a:ea typeface="+mn-ea"/>
+                  <a:cs typeface="+mn-cs"/>
+                </a:defRPr>
+              </a:lvl2pPr>
+              <a:lvl3pPr marL="914400" algn="l" defTabSz="914400" rtl="0" eaLnBrk="1" latinLnBrk="0" hangingPunct="1">
+                <a:defRPr sz="1800" kern="1200">
+                  <a:solidFill>
+                    <a:schemeClr val="lt1"/>
+                  </a:solidFill>
+                  <a:latin typeface="+mn-lt"/>
+                  <a:ea typeface="+mn-ea"/>
+                  <a:cs typeface="+mn-cs"/>
+                </a:defRPr>
+              </a:lvl3pPr>
+              <a:lvl4pPr marL="1371600" algn="l" defTabSz="914400" rtl="0" eaLnBrk="1" latinLnBrk="0" hangingPunct="1">
+                <a:defRPr sz="1800" kern="1200">
+                  <a:solidFill>
+                    <a:schemeClr val="lt1"/>
+                  </a:solidFill>
+                  <a:latin typeface="+mn-lt"/>
+                  <a:ea typeface="+mn-ea"/>
+                  <a:cs typeface="+mn-cs"/>
+                </a:defRPr>
+              </a:lvl4pPr>
+              <a:lvl5pPr marL="1828800" algn="l" defTabSz="914400" rtl="0" eaLnBrk="1" latinLnBrk="0" hangingPunct="1">
+                <a:defRPr sz="1800" kern="1200">
+                  <a:solidFill>
+                    <a:schemeClr val="lt1"/>
+                  </a:solidFill>
+                  <a:latin typeface="+mn-lt"/>
+                  <a:ea typeface="+mn-ea"/>
+                  <a:cs typeface="+mn-cs"/>
+                </a:defRPr>
+              </a:lvl5pPr>
+              <a:lvl6pPr marL="2286000" algn="l" defTabSz="914400" rtl="0" eaLnBrk="1" latinLnBrk="0" hangingPunct="1">
+                <a:defRPr sz="1800" kern="1200">
+                  <a:solidFill>
+                    <a:schemeClr val="lt1"/>
+                  </a:solidFill>
+                  <a:latin typeface="+mn-lt"/>
+                  <a:ea typeface="+mn-ea"/>
+                  <a:cs typeface="+mn-cs"/>
+                </a:defRPr>
+              </a:lvl6pPr>
+              <a:lvl7pPr marL="2743200" algn="l" defTabSz="914400" rtl="0" eaLnBrk="1" latinLnBrk="0" hangingPunct="1">
+                <a:defRPr sz="1800" kern="1200">
+                  <a:solidFill>
+                    <a:schemeClr val="lt1"/>
+                  </a:solidFill>
+                  <a:latin typeface="+mn-lt"/>
+                  <a:ea typeface="+mn-ea"/>
+                  <a:cs typeface="+mn-cs"/>
+                </a:defRPr>
+              </a:lvl7pPr>
+              <a:lvl8pPr marL="3200400" algn="l" defTabSz="914400" rtl="0" eaLnBrk="1" latinLnBrk="0" hangingPunct="1">
+                <a:defRPr sz="1800" kern="1200">
+                  <a:solidFill>
+                    <a:schemeClr val="lt1"/>
+                  </a:solidFill>
+                  <a:latin typeface="+mn-lt"/>
+                  <a:ea typeface="+mn-ea"/>
+                  <a:cs typeface="+mn-cs"/>
+                </a:defRPr>
+              </a:lvl8pPr>
+              <a:lvl9pPr marL="3657600" algn="l" defTabSz="914400" rtl="0" eaLnBrk="1" latinLnBrk="0" hangingPunct="1">
+                <a:defRPr sz="1800" kern="1200">
+                  <a:solidFill>
+                    <a:schemeClr val="lt1"/>
+                  </a:solidFill>
+                  <a:latin typeface="+mn-lt"/>
+                  <a:ea typeface="+mn-ea"/>
+                  <a:cs typeface="+mn-cs"/>
+                </a:defRPr>
+              </a:lvl9pPr>
+            </a:lstStyle>
+            <a:p>
+              <a:pPr algn="ctr"/>
+              <a:endParaRPr lang="de-DE"/>
+            </a:p>
+          </p:txBody>
+        </p:sp>
+        <p:sp>
+          <p:nvSpPr>
+            <p:cNvPr id="19" name="Rounded Rectangle 18"/>
+            <p:cNvSpPr/>
+            <p:nvPr/>
+          </p:nvSpPr>
+          <p:spPr>
+            <a:xfrm>
+              <a:off x="3825044" y="611560"/>
+              <a:ext cx="2304256" cy="2293223"/>
+            </a:xfrm>
+            <a:prstGeom prst="roundRect">
+              <a:avLst/>
+            </a:prstGeom>
+            <a:noFill/>
+            <a:ln w="31750"/>
+          </p:spPr>
+          <p:style>
+            <a:lnRef idx="2">
+              <a:schemeClr val="accent1">
+                <a:shade val="50000"/>
+              </a:schemeClr>
+            </a:lnRef>
+            <a:fillRef idx="1">
+              <a:schemeClr val="accent1"/>
+            </a:fillRef>
+            <a:effectRef idx="0">
+              <a:schemeClr val="accent1"/>
+            </a:effectRef>
+            <a:fontRef idx="minor">
+              <a:schemeClr val="lt1"/>
+            </a:fontRef>
+          </p:style>
+          <p:txBody>
+            <a:bodyPr rtlCol="0" anchor="ctr"/>
+            <a:lstStyle>
+              <a:defPPr>
+                <a:defRPr lang="de-DE"/>
+              </a:defPPr>
+              <a:lvl1pPr marL="0" algn="l" defTabSz="914400" rtl="0" eaLnBrk="1" latinLnBrk="0" hangingPunct="1">
+                <a:defRPr sz="1800" kern="1200">
+                  <a:solidFill>
+                    <a:schemeClr val="lt1"/>
+                  </a:solidFill>
+                  <a:latin typeface="+mn-lt"/>
+                  <a:ea typeface="+mn-ea"/>
+                  <a:cs typeface="+mn-cs"/>
+                </a:defRPr>
+              </a:lvl1pPr>
+              <a:lvl2pPr marL="457200" algn="l" defTabSz="914400" rtl="0" eaLnBrk="1" latinLnBrk="0" hangingPunct="1">
+                <a:defRPr sz="1800" kern="1200">
+                  <a:solidFill>
+                    <a:schemeClr val="lt1"/>
+                  </a:solidFill>
+                  <a:latin typeface="+mn-lt"/>
+                  <a:ea typeface="+mn-ea"/>
+                  <a:cs typeface="+mn-cs"/>
+                </a:defRPr>
+              </a:lvl2pPr>
+              <a:lvl3pPr marL="914400" algn="l" defTabSz="914400" rtl="0" eaLnBrk="1" latinLnBrk="0" hangingPunct="1">
+                <a:defRPr sz="1800" kern="1200">
+                  <a:solidFill>
+                    <a:schemeClr val="lt1"/>
+                  </a:solidFill>
+                  <a:latin typeface="+mn-lt"/>
+                  <a:ea typeface="+mn-ea"/>
+                  <a:cs typeface="+mn-cs"/>
+                </a:defRPr>
+              </a:lvl3pPr>
+              <a:lvl4pPr marL="1371600" algn="l" defTabSz="914400" rtl="0" eaLnBrk="1" latinLnBrk="0" hangingPunct="1">
+                <a:defRPr sz="1800" kern="1200">
+                  <a:solidFill>
+                    <a:schemeClr val="lt1"/>
+                  </a:solidFill>
+                  <a:latin typeface="+mn-lt"/>
+                  <a:ea typeface="+mn-ea"/>
+                  <a:cs typeface="+mn-cs"/>
+                </a:defRPr>
+              </a:lvl4pPr>
+              <a:lvl5pPr marL="1828800" algn="l" defTabSz="914400" rtl="0" eaLnBrk="1" latinLnBrk="0" hangingPunct="1">
+                <a:defRPr sz="1800" kern="1200">
+                  <a:solidFill>
+                    <a:schemeClr val="lt1"/>
+                  </a:solidFill>
+                  <a:latin typeface="+mn-lt"/>
+                  <a:ea typeface="+mn-ea"/>
+                  <a:cs typeface="+mn-cs"/>
+                </a:defRPr>
+              </a:lvl5pPr>
+              <a:lvl6pPr marL="2286000" algn="l" defTabSz="914400" rtl="0" eaLnBrk="1" latinLnBrk="0" hangingPunct="1">
+                <a:defRPr sz="1800" kern="1200">
+                  <a:solidFill>
+                    <a:schemeClr val="lt1"/>
+                  </a:solidFill>
+                  <a:latin typeface="+mn-lt"/>
+                  <a:ea typeface="+mn-ea"/>
+                  <a:cs typeface="+mn-cs"/>
+                </a:defRPr>
+              </a:lvl6pPr>
+              <a:lvl7pPr marL="2743200" algn="l" defTabSz="914400" rtl="0" eaLnBrk="1" latinLnBrk="0" hangingPunct="1">
+                <a:defRPr sz="1800" kern="1200">
+                  <a:solidFill>
+                    <a:schemeClr val="lt1"/>
+                  </a:solidFill>
+                  <a:latin typeface="+mn-lt"/>
+                  <a:ea typeface="+mn-ea"/>
+                  <a:cs typeface="+mn-cs"/>
+                </a:defRPr>
+              </a:lvl7pPr>
+              <a:lvl8pPr marL="3200400" algn="l" defTabSz="914400" rtl="0" eaLnBrk="1" latinLnBrk="0" hangingPunct="1">
+                <a:defRPr sz="1800" kern="1200">
+                  <a:solidFill>
+                    <a:schemeClr val="lt1"/>
+                  </a:solidFill>
+                  <a:latin typeface="+mn-lt"/>
+                  <a:ea typeface="+mn-ea"/>
+                  <a:cs typeface="+mn-cs"/>
+                </a:defRPr>
+              </a:lvl8pPr>
+              <a:lvl9pPr marL="3657600" algn="l" defTabSz="914400" rtl="0" eaLnBrk="1" latinLnBrk="0" hangingPunct="1">
+                <a:defRPr sz="1800" kern="1200">
+                  <a:solidFill>
+                    <a:schemeClr val="lt1"/>
+                  </a:solidFill>
+                  <a:latin typeface="+mn-lt"/>
+                  <a:ea typeface="+mn-ea"/>
+                  <a:cs typeface="+mn-cs"/>
+                </a:defRPr>
+              </a:lvl9pPr>
+            </a:lstStyle>
+            <a:p>
+              <a:pPr algn="ctr"/>
+              <a:endParaRPr lang="de-DE"/>
+            </a:p>
+          </p:txBody>
+        </p:sp>
+        <p:sp>
+          <p:nvSpPr>
+            <p:cNvPr id="22" name="Rounded Rectangle 21"/>
+            <p:cNvSpPr/>
+            <p:nvPr/>
+          </p:nvSpPr>
+          <p:spPr>
+            <a:xfrm>
+              <a:off x="868524" y="971600"/>
+              <a:ext cx="1224136" cy="1800200"/>
+            </a:xfrm>
+            <a:prstGeom prst="roundRect">
+              <a:avLst/>
+            </a:prstGeom>
+            <a:solidFill>
+              <a:schemeClr val="accent2">
+                <a:lumMod val="20000"/>
+                <a:lumOff val="80000"/>
+              </a:schemeClr>
+            </a:solidFill>
+            <a:ln w="31750">
+              <a:solidFill>
+                <a:srgbClr val="C00000"/>
+              </a:solidFill>
+            </a:ln>
+          </p:spPr>
+          <p:style>
+            <a:lnRef idx="2">
+              <a:schemeClr val="accent1">
+                <a:shade val="50000"/>
+              </a:schemeClr>
+            </a:lnRef>
+            <a:fillRef idx="1">
+              <a:schemeClr val="accent1"/>
+            </a:fillRef>
+            <a:effectRef idx="0">
+              <a:schemeClr val="accent1"/>
+            </a:effectRef>
+            <a:fontRef idx="minor">
+              <a:schemeClr val="lt1"/>
+            </a:fontRef>
+          </p:style>
+          <p:txBody>
+            <a:bodyPr rtlCol="0" anchor="ctr"/>
+            <a:lstStyle>
+              <a:defPPr>
+                <a:defRPr lang="de-DE"/>
+              </a:defPPr>
+              <a:lvl1pPr marL="0" algn="l" defTabSz="914400" rtl="0" eaLnBrk="1" latinLnBrk="0" hangingPunct="1">
+                <a:defRPr sz="1800" kern="1200">
+                  <a:solidFill>
+                    <a:schemeClr val="lt1"/>
+                  </a:solidFill>
+                  <a:latin typeface="+mn-lt"/>
+                  <a:ea typeface="+mn-ea"/>
+                  <a:cs typeface="+mn-cs"/>
+                </a:defRPr>
+              </a:lvl1pPr>
+              <a:lvl2pPr marL="457200" algn="l" defTabSz="914400" rtl="0" eaLnBrk="1" latinLnBrk="0" hangingPunct="1">
+                <a:defRPr sz="1800" kern="1200">
+                  <a:solidFill>
+                    <a:schemeClr val="lt1"/>
+                  </a:solidFill>
+                  <a:latin typeface="+mn-lt"/>
+                  <a:ea typeface="+mn-ea"/>
+                  <a:cs typeface="+mn-cs"/>
+                </a:defRPr>
+              </a:lvl2pPr>
+              <a:lvl3pPr marL="914400" algn="l" defTabSz="914400" rtl="0" eaLnBrk="1" latinLnBrk="0" hangingPunct="1">
+                <a:defRPr sz="1800" kern="1200">
+                  <a:solidFill>
+                    <a:schemeClr val="lt1"/>
+                  </a:solidFill>
+                  <a:latin typeface="+mn-lt"/>
+                  <a:ea typeface="+mn-ea"/>
+                  <a:cs typeface="+mn-cs"/>
+                </a:defRPr>
+              </a:lvl3pPr>
+              <a:lvl4pPr marL="1371600" algn="l" defTabSz="914400" rtl="0" eaLnBrk="1" latinLnBrk="0" hangingPunct="1">
+                <a:defRPr sz="1800" kern="1200">
+                  <a:solidFill>
+                    <a:schemeClr val="lt1"/>
+                  </a:solidFill>
+                  <a:latin typeface="+mn-lt"/>
+                  <a:ea typeface="+mn-ea"/>
+                  <a:cs typeface="+mn-cs"/>
+                </a:defRPr>
+              </a:lvl4pPr>
+              <a:lvl5pPr marL="1828800" algn="l" defTabSz="914400" rtl="0" eaLnBrk="1" latinLnBrk="0" hangingPunct="1">
+                <a:defRPr sz="1800" kern="1200">
+                  <a:solidFill>
+                    <a:schemeClr val="lt1"/>
+                  </a:solidFill>
+                  <a:latin typeface="+mn-lt"/>
+                  <a:ea typeface="+mn-ea"/>
+                  <a:cs typeface="+mn-cs"/>
+                </a:defRPr>
+              </a:lvl5pPr>
+              <a:lvl6pPr marL="2286000" algn="l" defTabSz="914400" rtl="0" eaLnBrk="1" latinLnBrk="0" hangingPunct="1">
+                <a:defRPr sz="1800" kern="1200">
+                  <a:solidFill>
+                    <a:schemeClr val="lt1"/>
+                  </a:solidFill>
+                  <a:latin typeface="+mn-lt"/>
+                  <a:ea typeface="+mn-ea"/>
+                  <a:cs typeface="+mn-cs"/>
+                </a:defRPr>
+              </a:lvl6pPr>
+              <a:lvl7pPr marL="2743200" algn="l" defTabSz="914400" rtl="0" eaLnBrk="1" latinLnBrk="0" hangingPunct="1">
+                <a:defRPr sz="1800" kern="1200">
+                  <a:solidFill>
+                    <a:schemeClr val="lt1"/>
+                  </a:solidFill>
+                  <a:latin typeface="+mn-lt"/>
+                  <a:ea typeface="+mn-ea"/>
+                  <a:cs typeface="+mn-cs"/>
+                </a:defRPr>
+              </a:lvl7pPr>
+              <a:lvl8pPr marL="3200400" algn="l" defTabSz="914400" rtl="0" eaLnBrk="1" latinLnBrk="0" hangingPunct="1">
+                <a:defRPr sz="1800" kern="1200">
+                  <a:solidFill>
+                    <a:schemeClr val="lt1"/>
+                  </a:solidFill>
+                  <a:latin typeface="+mn-lt"/>
+                  <a:ea typeface="+mn-ea"/>
+                  <a:cs typeface="+mn-cs"/>
+                </a:defRPr>
+              </a:lvl8pPr>
+              <a:lvl9pPr marL="3657600" algn="l" defTabSz="914400" rtl="0" eaLnBrk="1" latinLnBrk="0" hangingPunct="1">
+                <a:defRPr sz="1800" kern="1200">
+                  <a:solidFill>
+                    <a:schemeClr val="lt1"/>
+                  </a:solidFill>
+                  <a:latin typeface="+mn-lt"/>
+                  <a:ea typeface="+mn-ea"/>
+                  <a:cs typeface="+mn-cs"/>
+                </a:defRPr>
+              </a:lvl9pPr>
+            </a:lstStyle>
+            <a:p>
+              <a:pPr algn="ctr"/>
+              <a:endParaRPr lang="de-DE" sz="1000" b="1" dirty="0"/>
+            </a:p>
+          </p:txBody>
+        </p:sp>
+        <p:sp>
+          <p:nvSpPr>
+            <p:cNvPr id="24" name="Rounded Rectangle 23"/>
+            <p:cNvSpPr/>
+            <p:nvPr/>
+          </p:nvSpPr>
+          <p:spPr>
+            <a:xfrm>
+              <a:off x="2254548" y="961604"/>
+              <a:ext cx="1224136" cy="1800200"/>
+            </a:xfrm>
+            <a:prstGeom prst="roundRect">
+              <a:avLst/>
+            </a:prstGeom>
+            <a:solidFill>
+              <a:schemeClr val="accent2">
+                <a:lumMod val="20000"/>
+                <a:lumOff val="80000"/>
+              </a:schemeClr>
+            </a:solidFill>
+            <a:ln w="31750">
+              <a:solidFill>
+                <a:srgbClr val="C00000"/>
+              </a:solidFill>
+            </a:ln>
+          </p:spPr>
+          <p:style>
+            <a:lnRef idx="2">
+              <a:schemeClr val="accent1">
+                <a:shade val="50000"/>
+              </a:schemeClr>
+            </a:lnRef>
+            <a:fillRef idx="1">
+              <a:schemeClr val="accent1"/>
+            </a:fillRef>
+            <a:effectRef idx="0">
+              <a:schemeClr val="accent1"/>
+            </a:effectRef>
+            <a:fontRef idx="minor">
+              <a:schemeClr val="lt1"/>
+            </a:fontRef>
+          </p:style>
+          <p:txBody>
+            <a:bodyPr rtlCol="0" anchor="ctr"/>
+            <a:lstStyle>
+              <a:defPPr>
+                <a:defRPr lang="de-DE"/>
+              </a:defPPr>
+              <a:lvl1pPr marL="0" algn="l" defTabSz="914400" rtl="0" eaLnBrk="1" latinLnBrk="0" hangingPunct="1">
+                <a:defRPr sz="1800" kern="1200">
+                  <a:solidFill>
+                    <a:schemeClr val="lt1"/>
+                  </a:solidFill>
+                  <a:latin typeface="+mn-lt"/>
+                  <a:ea typeface="+mn-ea"/>
+                  <a:cs typeface="+mn-cs"/>
+                </a:defRPr>
+              </a:lvl1pPr>
+              <a:lvl2pPr marL="457200" algn="l" defTabSz="914400" rtl="0" eaLnBrk="1" latinLnBrk="0" hangingPunct="1">
+                <a:defRPr sz="1800" kern="1200">
+                  <a:solidFill>
+                    <a:schemeClr val="lt1"/>
+                  </a:solidFill>
+                  <a:latin typeface="+mn-lt"/>
+                  <a:ea typeface="+mn-ea"/>
+                  <a:cs typeface="+mn-cs"/>
+                </a:defRPr>
+              </a:lvl2pPr>
+              <a:lvl3pPr marL="914400" algn="l" defTabSz="914400" rtl="0" eaLnBrk="1" latinLnBrk="0" hangingPunct="1">
+                <a:defRPr sz="1800" kern="1200">
+                  <a:solidFill>
+                    <a:schemeClr val="lt1"/>
+                  </a:solidFill>
+                  <a:latin typeface="+mn-lt"/>
+                  <a:ea typeface="+mn-ea"/>
+                  <a:cs typeface="+mn-cs"/>
+                </a:defRPr>
+              </a:lvl3pPr>
+              <a:lvl4pPr marL="1371600" algn="l" defTabSz="914400" rtl="0" eaLnBrk="1" latinLnBrk="0" hangingPunct="1">
+                <a:defRPr sz="1800" kern="1200">
+                  <a:solidFill>
+                    <a:schemeClr val="lt1"/>
+                  </a:solidFill>
+                  <a:latin typeface="+mn-lt"/>
+                  <a:ea typeface="+mn-ea"/>
+                  <a:cs typeface="+mn-cs"/>
+                </a:defRPr>
+              </a:lvl4pPr>
+              <a:lvl5pPr marL="1828800" algn="l" defTabSz="914400" rtl="0" eaLnBrk="1" latinLnBrk="0" hangingPunct="1">
+                <a:defRPr sz="1800" kern="1200">
+                  <a:solidFill>
+                    <a:schemeClr val="lt1"/>
+                  </a:solidFill>
+                  <a:latin typeface="+mn-lt"/>
+                  <a:ea typeface="+mn-ea"/>
+                  <a:cs typeface="+mn-cs"/>
+                </a:defRPr>
+              </a:lvl5pPr>
+              <a:lvl6pPr marL="2286000" algn="l" defTabSz="914400" rtl="0" eaLnBrk="1" latinLnBrk="0" hangingPunct="1">
+                <a:defRPr sz="1800" kern="1200">
+                  <a:solidFill>
+                    <a:schemeClr val="lt1"/>
+                  </a:solidFill>
+                  <a:latin typeface="+mn-lt"/>
+                  <a:ea typeface="+mn-ea"/>
+                  <a:cs typeface="+mn-cs"/>
+                </a:defRPr>
+              </a:lvl6pPr>
+              <a:lvl7pPr marL="2743200" algn="l" defTabSz="914400" rtl="0" eaLnBrk="1" latinLnBrk="0" hangingPunct="1">
+                <a:defRPr sz="1800" kern="1200">
+                  <a:solidFill>
+                    <a:schemeClr val="lt1"/>
+                  </a:solidFill>
+                  <a:latin typeface="+mn-lt"/>
+                  <a:ea typeface="+mn-ea"/>
+                  <a:cs typeface="+mn-cs"/>
+                </a:defRPr>
+              </a:lvl7pPr>
+              <a:lvl8pPr marL="3200400" algn="l" defTabSz="914400" rtl="0" eaLnBrk="1" latinLnBrk="0" hangingPunct="1">
+                <a:defRPr sz="1800" kern="1200">
+                  <a:solidFill>
+                    <a:schemeClr val="lt1"/>
+                  </a:solidFill>
+                  <a:latin typeface="+mn-lt"/>
+                  <a:ea typeface="+mn-ea"/>
+                  <a:cs typeface="+mn-cs"/>
+                </a:defRPr>
+              </a:lvl8pPr>
+              <a:lvl9pPr marL="3657600" algn="l" defTabSz="914400" rtl="0" eaLnBrk="1" latinLnBrk="0" hangingPunct="1">
+                <a:defRPr sz="1800" kern="1200">
+                  <a:solidFill>
+                    <a:schemeClr val="lt1"/>
+                  </a:solidFill>
+                  <a:latin typeface="+mn-lt"/>
+                  <a:ea typeface="+mn-ea"/>
+                  <a:cs typeface="+mn-cs"/>
+                </a:defRPr>
+              </a:lvl9pPr>
+            </a:lstStyle>
+            <a:p>
+              <a:pPr algn="ctr"/>
+              <a:endParaRPr lang="de-DE" sz="1000" b="1"/>
+            </a:p>
+          </p:txBody>
+        </p:sp>
+        <p:sp>
+          <p:nvSpPr>
+            <p:cNvPr id="25" name="Rounded Rectangle 24"/>
+            <p:cNvSpPr/>
+            <p:nvPr/>
+          </p:nvSpPr>
+          <p:spPr>
+            <a:xfrm>
+              <a:off x="1012540" y="1141016"/>
+              <a:ext cx="936104" cy="936104"/>
+            </a:xfrm>
+            <a:prstGeom prst="roundRect">
+              <a:avLst/>
+            </a:prstGeom>
+            <a:solidFill>
+              <a:schemeClr val="accent2"/>
+            </a:solidFill>
+            <a:ln w="31750">
+              <a:solidFill>
+                <a:srgbClr val="C00000"/>
+              </a:solidFill>
+            </a:ln>
+          </p:spPr>
+          <p:style>
+            <a:lnRef idx="2">
+              <a:schemeClr val="accent1">
+                <a:shade val="50000"/>
+              </a:schemeClr>
+            </a:lnRef>
+            <a:fillRef idx="1">
+              <a:schemeClr val="accent1"/>
+            </a:fillRef>
+            <a:effectRef idx="0">
+              <a:schemeClr val="accent1"/>
+            </a:effectRef>
+            <a:fontRef idx="minor">
+              <a:schemeClr val="lt1"/>
+            </a:fontRef>
+          </p:style>
+          <p:txBody>
+            <a:bodyPr lIns="0" tIns="0" rIns="36000" bIns="36000" rtlCol="0" anchor="ctr"/>
+            <a:lstStyle>
+              <a:defPPr>
+                <a:defRPr lang="de-DE"/>
+              </a:defPPr>
+              <a:lvl1pPr marL="0" algn="l" defTabSz="914400" rtl="0" eaLnBrk="1" latinLnBrk="0" hangingPunct="1">
+                <a:defRPr sz="1800" kern="1200">
+                  <a:solidFill>
+                    <a:schemeClr val="lt1"/>
+                  </a:solidFill>
+                  <a:latin typeface="+mn-lt"/>
+                  <a:ea typeface="+mn-ea"/>
+                  <a:cs typeface="+mn-cs"/>
+                </a:defRPr>
+              </a:lvl1pPr>
+              <a:lvl2pPr marL="457200" algn="l" defTabSz="914400" rtl="0" eaLnBrk="1" latinLnBrk="0" hangingPunct="1">
+                <a:defRPr sz="1800" kern="1200">
+                  <a:solidFill>
+                    <a:schemeClr val="lt1"/>
+                  </a:solidFill>
+                  <a:latin typeface="+mn-lt"/>
+                  <a:ea typeface="+mn-ea"/>
+                  <a:cs typeface="+mn-cs"/>
+                </a:defRPr>
+              </a:lvl2pPr>
+              <a:lvl3pPr marL="914400" algn="l" defTabSz="914400" rtl="0" eaLnBrk="1" latinLnBrk="0" hangingPunct="1">
+                <a:defRPr sz="1800" kern="1200">
+                  <a:solidFill>
+                    <a:schemeClr val="lt1"/>
+                  </a:solidFill>
+                  <a:latin typeface="+mn-lt"/>
+                  <a:ea typeface="+mn-ea"/>
+                  <a:cs typeface="+mn-cs"/>
+                </a:defRPr>
+              </a:lvl3pPr>
+              <a:lvl4pPr marL="1371600" algn="l" defTabSz="914400" rtl="0" eaLnBrk="1" latinLnBrk="0" hangingPunct="1">
+                <a:defRPr sz="1800" kern="1200">
+                  <a:solidFill>
+                    <a:schemeClr val="lt1"/>
+                  </a:solidFill>
+                  <a:latin typeface="+mn-lt"/>
+                  <a:ea typeface="+mn-ea"/>
+                  <a:cs typeface="+mn-cs"/>
+                </a:defRPr>
+              </a:lvl4pPr>
+              <a:lvl5pPr marL="1828800" algn="l" defTabSz="914400" rtl="0" eaLnBrk="1" latinLnBrk="0" hangingPunct="1">
+                <a:defRPr sz="1800" kern="1200">
+                  <a:solidFill>
+                    <a:schemeClr val="lt1"/>
+                  </a:solidFill>
+                  <a:latin typeface="+mn-lt"/>
+                  <a:ea typeface="+mn-ea"/>
+                  <a:cs typeface="+mn-cs"/>
+                </a:defRPr>
+              </a:lvl5pPr>
+              <a:lvl6pPr marL="2286000" algn="l" defTabSz="914400" rtl="0" eaLnBrk="1" latinLnBrk="0" hangingPunct="1">
+                <a:defRPr sz="1800" kern="1200">
+                  <a:solidFill>
+                    <a:schemeClr val="lt1"/>
+                  </a:solidFill>
+                  <a:latin typeface="+mn-lt"/>
+                  <a:ea typeface="+mn-ea"/>
+                  <a:cs typeface="+mn-cs"/>
+                </a:defRPr>
+              </a:lvl6pPr>
+              <a:lvl7pPr marL="2743200" algn="l" defTabSz="914400" rtl="0" eaLnBrk="1" latinLnBrk="0" hangingPunct="1">
+                <a:defRPr sz="1800" kern="1200">
+                  <a:solidFill>
+                    <a:schemeClr val="lt1"/>
+                  </a:solidFill>
+                  <a:latin typeface="+mn-lt"/>
+                  <a:ea typeface="+mn-ea"/>
+                  <a:cs typeface="+mn-cs"/>
+                </a:defRPr>
+              </a:lvl7pPr>
+              <a:lvl8pPr marL="3200400" algn="l" defTabSz="914400" rtl="0" eaLnBrk="1" latinLnBrk="0" hangingPunct="1">
+                <a:defRPr sz="1800" kern="1200">
+                  <a:solidFill>
+                    <a:schemeClr val="lt1"/>
+                  </a:solidFill>
+                  <a:latin typeface="+mn-lt"/>
+                  <a:ea typeface="+mn-ea"/>
+                  <a:cs typeface="+mn-cs"/>
+                </a:defRPr>
+              </a:lvl8pPr>
+              <a:lvl9pPr marL="3657600" algn="l" defTabSz="914400" rtl="0" eaLnBrk="1" latinLnBrk="0" hangingPunct="1">
+                <a:defRPr sz="1800" kern="1200">
+                  <a:solidFill>
+                    <a:schemeClr val="lt1"/>
+                  </a:solidFill>
+                  <a:latin typeface="+mn-lt"/>
+                  <a:ea typeface="+mn-ea"/>
+                  <a:cs typeface="+mn-cs"/>
+                </a:defRPr>
+              </a:lvl9pPr>
+            </a:lstStyle>
+            <a:p>
+              <a:pPr algn="ctr"/>
+              <a:r>
+                <a:rPr lang="de-DE" sz="1000" b="1" dirty="0" smtClean="0">
+                  <a:solidFill>
+                    <a:schemeClr val="tx1"/>
+                  </a:solidFill>
+                  <a:latin typeface="Arial" panose="020B0604020202020204" pitchFamily="34" charset="0"/>
+                  <a:cs typeface="Arial" panose="020B0604020202020204" pitchFamily="34" charset="0"/>
+                </a:rPr>
+                <a:t>Subscription Service</a:t>
+              </a:r>
+              <a:endParaRPr lang="de-DE" sz="1000" b="1" dirty="0">
+                <a:solidFill>
+                  <a:schemeClr val="tx1"/>
+                </a:solidFill>
+                <a:latin typeface="Arial" panose="020B0604020202020204" pitchFamily="34" charset="0"/>
+                <a:cs typeface="Arial" panose="020B0604020202020204" pitchFamily="34" charset="0"/>
+              </a:endParaRPr>
+            </a:p>
+          </p:txBody>
+        </p:sp>
+        <p:sp>
+          <p:nvSpPr>
+            <p:cNvPr id="27" name="TextBox 11"/>
+            <p:cNvSpPr txBox="1"/>
+            <p:nvPr/>
+          </p:nvSpPr>
+          <p:spPr>
+            <a:xfrm>
+              <a:off x="872716" y="694601"/>
+              <a:ext cx="2124236" cy="276999"/>
+            </a:xfrm>
+            <a:prstGeom prst="rect">
+              <a:avLst/>
+            </a:prstGeom>
+            <a:noFill/>
+          </p:spPr>
+          <p:txBody>
+            <a:bodyPr wrap="square" rtlCol="0">
+              <a:spAutoFit/>
+            </a:bodyPr>
+            <a:lstStyle>
+              <a:defPPr>
+                <a:defRPr lang="de-DE"/>
+              </a:defPPr>
+              <a:lvl1pPr marL="0" algn="l" defTabSz="914400" rtl="0" eaLnBrk="1" latinLnBrk="0" hangingPunct="1">
+                <a:defRPr sz="1800" kern="1200">
+                  <a:solidFill>
+                    <a:schemeClr val="tx1"/>
+                  </a:solidFill>
+                  <a:latin typeface="+mn-lt"/>
+                  <a:ea typeface="+mn-ea"/>
+                  <a:cs typeface="+mn-cs"/>
+                </a:defRPr>
+              </a:lvl1pPr>
+              <a:lvl2pPr marL="457200" algn="l" defTabSz="914400" rtl="0" eaLnBrk="1" latinLnBrk="0" hangingPunct="1">
+                <a:defRPr sz="1800" kern="1200">
+                  <a:solidFill>
+                    <a:schemeClr val="tx1"/>
+                  </a:solidFill>
+                  <a:latin typeface="+mn-lt"/>
+                  <a:ea typeface="+mn-ea"/>
+                  <a:cs typeface="+mn-cs"/>
+                </a:defRPr>
+              </a:lvl2pPr>
+              <a:lvl3pPr marL="914400" algn="l" defTabSz="914400" rtl="0" eaLnBrk="1" latinLnBrk="0" hangingPunct="1">
+                <a:defRPr sz="1800" kern="1200">
+                  <a:solidFill>
+                    <a:schemeClr val="tx1"/>
+                  </a:solidFill>
+                  <a:latin typeface="+mn-lt"/>
+                  <a:ea typeface="+mn-ea"/>
+                  <a:cs typeface="+mn-cs"/>
+                </a:defRPr>
+              </a:lvl3pPr>
+              <a:lvl4pPr marL="1371600" algn="l" defTabSz="914400" rtl="0" eaLnBrk="1" latinLnBrk="0" hangingPunct="1">
+                <a:defRPr sz="1800" kern="1200">
+                  <a:solidFill>
+                    <a:schemeClr val="tx1"/>
+                  </a:solidFill>
+                  <a:latin typeface="+mn-lt"/>
+                  <a:ea typeface="+mn-ea"/>
+                  <a:cs typeface="+mn-cs"/>
+                </a:defRPr>
+              </a:lvl4pPr>
+              <a:lvl5pPr marL="1828800" algn="l" defTabSz="914400" rtl="0" eaLnBrk="1" latinLnBrk="0" hangingPunct="1">
+                <a:defRPr sz="1800" kern="1200">
+                  <a:solidFill>
+                    <a:schemeClr val="tx1"/>
+                  </a:solidFill>
+                  <a:latin typeface="+mn-lt"/>
+                  <a:ea typeface="+mn-ea"/>
+                  <a:cs typeface="+mn-cs"/>
+                </a:defRPr>
+              </a:lvl5pPr>
+              <a:lvl6pPr marL="2286000" algn="l" defTabSz="914400" rtl="0" eaLnBrk="1" latinLnBrk="0" hangingPunct="1">
+                <a:defRPr sz="1800" kern="1200">
+                  <a:solidFill>
+                    <a:schemeClr val="tx1"/>
+                  </a:solidFill>
+                  <a:latin typeface="+mn-lt"/>
+                  <a:ea typeface="+mn-ea"/>
+                  <a:cs typeface="+mn-cs"/>
+                </a:defRPr>
+              </a:lvl6pPr>
+              <a:lvl7pPr marL="2743200" algn="l" defTabSz="914400" rtl="0" eaLnBrk="1" latinLnBrk="0" hangingPunct="1">
+                <a:defRPr sz="1800" kern="1200">
+                  <a:solidFill>
+                    <a:schemeClr val="tx1"/>
+                  </a:solidFill>
+                  <a:latin typeface="+mn-lt"/>
+                  <a:ea typeface="+mn-ea"/>
+                  <a:cs typeface="+mn-cs"/>
+                </a:defRPr>
+              </a:lvl7pPr>
+              <a:lvl8pPr marL="3200400" algn="l" defTabSz="914400" rtl="0" eaLnBrk="1" latinLnBrk="0" hangingPunct="1">
+                <a:defRPr sz="1800" kern="1200">
+                  <a:solidFill>
+                    <a:schemeClr val="tx1"/>
+                  </a:solidFill>
+                  <a:latin typeface="+mn-lt"/>
+                  <a:ea typeface="+mn-ea"/>
+                  <a:cs typeface="+mn-cs"/>
+                </a:defRPr>
+              </a:lvl8pPr>
+              <a:lvl9pPr marL="3657600" algn="l" defTabSz="914400" rtl="0" eaLnBrk="1" latinLnBrk="0" hangingPunct="1">
+                <a:defRPr sz="1800" kern="1200">
+                  <a:solidFill>
+                    <a:schemeClr val="tx1"/>
+                  </a:solidFill>
+                  <a:latin typeface="+mn-lt"/>
+                  <a:ea typeface="+mn-ea"/>
+                  <a:cs typeface="+mn-cs"/>
+                </a:defRPr>
+              </a:lvl9pPr>
+            </a:lstStyle>
+            <a:p>
+              <a:r>
+                <a:rPr lang="de-DE" sz="1200" b="1" dirty="0">
+                  <a:latin typeface="Arial" panose="020B0604020202020204" pitchFamily="34" charset="0"/>
+                  <a:cs typeface="Arial" panose="020B0604020202020204" pitchFamily="34" charset="0"/>
+                </a:rPr>
+                <a:t>O</a:t>
+              </a:r>
+              <a:r>
+                <a:rPr lang="de-DE" sz="1200" b="1" dirty="0" smtClean="0">
+                  <a:latin typeface="Arial" panose="020B0604020202020204" pitchFamily="34" charset="0"/>
+                  <a:cs typeface="Arial" panose="020B0604020202020204" pitchFamily="34" charset="0"/>
+                </a:rPr>
+                <a:t>SCM</a:t>
               </a:r>
               <a:endParaRPr lang="de-DE" sz="1200" b="1" dirty="0">
                 <a:latin typeface="Arial" panose="020B0604020202020204" pitchFamily="34" charset="0"/>
@@ -4942,1876 +6849,6 @@
     </p:spTree>
     <p:extLst>
       <p:ext uri="{BB962C8B-B14F-4D97-AF65-F5344CB8AC3E}">
-        <p14:creationId xmlns:p14="http://schemas.microsoft.com/office/powerpoint/2010/main" val="2262136484"/>
-      </p:ext>
-    </p:extLst>
-  </p:cSld>
-  <p:clrMapOvr>
-    <a:masterClrMapping/>
-  </p:clrMapOvr>
-  <p:timing>
-    <p:tnLst>
-      <p:par>
-        <p:cTn id="1" dur="indefinite" restart="never" nodeType="tmRoot"/>
-      </p:par>
-    </p:tnLst>
-  </p:timing>
-</p:sld>
-</file>
-
-<file path=ppt/slides/slide2.xml><?xml version="1.0" encoding="utf-8"?>
-<p:sld xmlns:a="http://schemas.openxmlformats.org/drawingml/2006/main" xmlns:r="http://schemas.openxmlformats.org/officeDocument/2006/relationships" xmlns:p="http://schemas.openxmlformats.org/presentationml/2006/main">
-  <p:cSld>
-    <p:spTree>
-      <p:nvGrpSpPr>
-        <p:cNvPr id="1" name=""/>
-        <p:cNvGrpSpPr/>
-        <p:nvPr/>
-      </p:nvGrpSpPr>
-      <p:grpSpPr>
-        <a:xfrm>
-          <a:off x="0" y="0"/>
-          <a:ext cx="0" cy="0"/>
-          <a:chOff x="0" y="0"/>
-          <a:chExt cx="0" cy="0"/>
-        </a:xfrm>
-      </p:grpSpPr>
-      <p:grpSp>
-        <p:nvGrpSpPr>
-          <p:cNvPr id="2" name="Group 1"/>
-          <p:cNvGrpSpPr/>
-          <p:nvPr/>
-        </p:nvGrpSpPr>
-        <p:grpSpPr>
-          <a:xfrm>
-            <a:off x="728700" y="611560"/>
-            <a:ext cx="5400600" cy="2293223"/>
-            <a:chOff x="728700" y="611560"/>
-            <a:chExt cx="5400600" cy="2293223"/>
-          </a:xfrm>
-        </p:grpSpPr>
-        <p:sp>
-          <p:nvSpPr>
-            <p:cNvPr id="18" name="Rounded Rectangle 17"/>
-            <p:cNvSpPr/>
-            <p:nvPr/>
-          </p:nvSpPr>
-          <p:spPr>
-            <a:xfrm>
-              <a:off x="728700" y="611560"/>
-              <a:ext cx="2862448" cy="2293223"/>
-            </a:xfrm>
-            <a:prstGeom prst="roundRect">
-              <a:avLst/>
-            </a:prstGeom>
-            <a:noFill/>
-            <a:ln w="31750">
-              <a:solidFill>
-                <a:srgbClr val="C00000"/>
-              </a:solidFill>
-              <a:prstDash val="solid"/>
-            </a:ln>
-          </p:spPr>
-          <p:style>
-            <a:lnRef idx="2">
-              <a:schemeClr val="accent1">
-                <a:shade val="50000"/>
-              </a:schemeClr>
-            </a:lnRef>
-            <a:fillRef idx="1">
-              <a:schemeClr val="accent1"/>
-            </a:fillRef>
-            <a:effectRef idx="0">
-              <a:schemeClr val="accent1"/>
-            </a:effectRef>
-            <a:fontRef idx="minor">
-              <a:schemeClr val="lt1"/>
-            </a:fontRef>
-          </p:style>
-          <p:txBody>
-            <a:bodyPr rtlCol="0" anchor="ctr"/>
-            <a:lstStyle>
-              <a:defPPr>
-                <a:defRPr lang="de-DE"/>
-              </a:defPPr>
-              <a:lvl1pPr marL="0" algn="l" defTabSz="914400" rtl="0" eaLnBrk="1" latinLnBrk="0" hangingPunct="1">
-                <a:defRPr sz="1800" kern="1200">
-                  <a:solidFill>
-                    <a:schemeClr val="lt1"/>
-                  </a:solidFill>
-                  <a:latin typeface="+mn-lt"/>
-                  <a:ea typeface="+mn-ea"/>
-                  <a:cs typeface="+mn-cs"/>
-                </a:defRPr>
-              </a:lvl1pPr>
-              <a:lvl2pPr marL="457200" algn="l" defTabSz="914400" rtl="0" eaLnBrk="1" latinLnBrk="0" hangingPunct="1">
-                <a:defRPr sz="1800" kern="1200">
-                  <a:solidFill>
-                    <a:schemeClr val="lt1"/>
-                  </a:solidFill>
-                  <a:latin typeface="+mn-lt"/>
-                  <a:ea typeface="+mn-ea"/>
-                  <a:cs typeface="+mn-cs"/>
-                </a:defRPr>
-              </a:lvl2pPr>
-              <a:lvl3pPr marL="914400" algn="l" defTabSz="914400" rtl="0" eaLnBrk="1" latinLnBrk="0" hangingPunct="1">
-                <a:defRPr sz="1800" kern="1200">
-                  <a:solidFill>
-                    <a:schemeClr val="lt1"/>
-                  </a:solidFill>
-                  <a:latin typeface="+mn-lt"/>
-                  <a:ea typeface="+mn-ea"/>
-                  <a:cs typeface="+mn-cs"/>
-                </a:defRPr>
-              </a:lvl3pPr>
-              <a:lvl4pPr marL="1371600" algn="l" defTabSz="914400" rtl="0" eaLnBrk="1" latinLnBrk="0" hangingPunct="1">
-                <a:defRPr sz="1800" kern="1200">
-                  <a:solidFill>
-                    <a:schemeClr val="lt1"/>
-                  </a:solidFill>
-                  <a:latin typeface="+mn-lt"/>
-                  <a:ea typeface="+mn-ea"/>
-                  <a:cs typeface="+mn-cs"/>
-                </a:defRPr>
-              </a:lvl4pPr>
-              <a:lvl5pPr marL="1828800" algn="l" defTabSz="914400" rtl="0" eaLnBrk="1" latinLnBrk="0" hangingPunct="1">
-                <a:defRPr sz="1800" kern="1200">
-                  <a:solidFill>
-                    <a:schemeClr val="lt1"/>
-                  </a:solidFill>
-                  <a:latin typeface="+mn-lt"/>
-                  <a:ea typeface="+mn-ea"/>
-                  <a:cs typeface="+mn-cs"/>
-                </a:defRPr>
-              </a:lvl5pPr>
-              <a:lvl6pPr marL="2286000" algn="l" defTabSz="914400" rtl="0" eaLnBrk="1" latinLnBrk="0" hangingPunct="1">
-                <a:defRPr sz="1800" kern="1200">
-                  <a:solidFill>
-                    <a:schemeClr val="lt1"/>
-                  </a:solidFill>
-                  <a:latin typeface="+mn-lt"/>
-                  <a:ea typeface="+mn-ea"/>
-                  <a:cs typeface="+mn-cs"/>
-                </a:defRPr>
-              </a:lvl6pPr>
-              <a:lvl7pPr marL="2743200" algn="l" defTabSz="914400" rtl="0" eaLnBrk="1" latinLnBrk="0" hangingPunct="1">
-                <a:defRPr sz="1800" kern="1200">
-                  <a:solidFill>
-                    <a:schemeClr val="lt1"/>
-                  </a:solidFill>
-                  <a:latin typeface="+mn-lt"/>
-                  <a:ea typeface="+mn-ea"/>
-                  <a:cs typeface="+mn-cs"/>
-                </a:defRPr>
-              </a:lvl7pPr>
-              <a:lvl8pPr marL="3200400" algn="l" defTabSz="914400" rtl="0" eaLnBrk="1" latinLnBrk="0" hangingPunct="1">
-                <a:defRPr sz="1800" kern="1200">
-                  <a:solidFill>
-                    <a:schemeClr val="lt1"/>
-                  </a:solidFill>
-                  <a:latin typeface="+mn-lt"/>
-                  <a:ea typeface="+mn-ea"/>
-                  <a:cs typeface="+mn-cs"/>
-                </a:defRPr>
-              </a:lvl8pPr>
-              <a:lvl9pPr marL="3657600" algn="l" defTabSz="914400" rtl="0" eaLnBrk="1" latinLnBrk="0" hangingPunct="1">
-                <a:defRPr sz="1800" kern="1200">
-                  <a:solidFill>
-                    <a:schemeClr val="lt1"/>
-                  </a:solidFill>
-                  <a:latin typeface="+mn-lt"/>
-                  <a:ea typeface="+mn-ea"/>
-                  <a:cs typeface="+mn-cs"/>
-                </a:defRPr>
-              </a:lvl9pPr>
-            </a:lstStyle>
-            <a:p>
-              <a:pPr algn="ctr"/>
-              <a:endParaRPr lang="de-DE"/>
-            </a:p>
-          </p:txBody>
-        </p:sp>
-        <p:sp>
-          <p:nvSpPr>
-            <p:cNvPr id="19" name="Rounded Rectangle 18"/>
-            <p:cNvSpPr/>
-            <p:nvPr/>
-          </p:nvSpPr>
-          <p:spPr>
-            <a:xfrm>
-              <a:off x="3825044" y="611560"/>
-              <a:ext cx="2304256" cy="2293223"/>
-            </a:xfrm>
-            <a:prstGeom prst="roundRect">
-              <a:avLst/>
-            </a:prstGeom>
-            <a:noFill/>
-            <a:ln w="31750"/>
-          </p:spPr>
-          <p:style>
-            <a:lnRef idx="2">
-              <a:schemeClr val="accent1">
-                <a:shade val="50000"/>
-              </a:schemeClr>
-            </a:lnRef>
-            <a:fillRef idx="1">
-              <a:schemeClr val="accent1"/>
-            </a:fillRef>
-            <a:effectRef idx="0">
-              <a:schemeClr val="accent1"/>
-            </a:effectRef>
-            <a:fontRef idx="minor">
-              <a:schemeClr val="lt1"/>
-            </a:fontRef>
-          </p:style>
-          <p:txBody>
-            <a:bodyPr rtlCol="0" anchor="ctr"/>
-            <a:lstStyle>
-              <a:defPPr>
-                <a:defRPr lang="de-DE"/>
-              </a:defPPr>
-              <a:lvl1pPr marL="0" algn="l" defTabSz="914400" rtl="0" eaLnBrk="1" latinLnBrk="0" hangingPunct="1">
-                <a:defRPr sz="1800" kern="1200">
-                  <a:solidFill>
-                    <a:schemeClr val="lt1"/>
-                  </a:solidFill>
-                  <a:latin typeface="+mn-lt"/>
-                  <a:ea typeface="+mn-ea"/>
-                  <a:cs typeface="+mn-cs"/>
-                </a:defRPr>
-              </a:lvl1pPr>
-              <a:lvl2pPr marL="457200" algn="l" defTabSz="914400" rtl="0" eaLnBrk="1" latinLnBrk="0" hangingPunct="1">
-                <a:defRPr sz="1800" kern="1200">
-                  <a:solidFill>
-                    <a:schemeClr val="lt1"/>
-                  </a:solidFill>
-                  <a:latin typeface="+mn-lt"/>
-                  <a:ea typeface="+mn-ea"/>
-                  <a:cs typeface="+mn-cs"/>
-                </a:defRPr>
-              </a:lvl2pPr>
-              <a:lvl3pPr marL="914400" algn="l" defTabSz="914400" rtl="0" eaLnBrk="1" latinLnBrk="0" hangingPunct="1">
-                <a:defRPr sz="1800" kern="1200">
-                  <a:solidFill>
-                    <a:schemeClr val="lt1"/>
-                  </a:solidFill>
-                  <a:latin typeface="+mn-lt"/>
-                  <a:ea typeface="+mn-ea"/>
-                  <a:cs typeface="+mn-cs"/>
-                </a:defRPr>
-              </a:lvl3pPr>
-              <a:lvl4pPr marL="1371600" algn="l" defTabSz="914400" rtl="0" eaLnBrk="1" latinLnBrk="0" hangingPunct="1">
-                <a:defRPr sz="1800" kern="1200">
-                  <a:solidFill>
-                    <a:schemeClr val="lt1"/>
-                  </a:solidFill>
-                  <a:latin typeface="+mn-lt"/>
-                  <a:ea typeface="+mn-ea"/>
-                  <a:cs typeface="+mn-cs"/>
-                </a:defRPr>
-              </a:lvl4pPr>
-              <a:lvl5pPr marL="1828800" algn="l" defTabSz="914400" rtl="0" eaLnBrk="1" latinLnBrk="0" hangingPunct="1">
-                <a:defRPr sz="1800" kern="1200">
-                  <a:solidFill>
-                    <a:schemeClr val="lt1"/>
-                  </a:solidFill>
-                  <a:latin typeface="+mn-lt"/>
-                  <a:ea typeface="+mn-ea"/>
-                  <a:cs typeface="+mn-cs"/>
-                </a:defRPr>
-              </a:lvl5pPr>
-              <a:lvl6pPr marL="2286000" algn="l" defTabSz="914400" rtl="0" eaLnBrk="1" latinLnBrk="0" hangingPunct="1">
-                <a:defRPr sz="1800" kern="1200">
-                  <a:solidFill>
-                    <a:schemeClr val="lt1"/>
-                  </a:solidFill>
-                  <a:latin typeface="+mn-lt"/>
-                  <a:ea typeface="+mn-ea"/>
-                  <a:cs typeface="+mn-cs"/>
-                </a:defRPr>
-              </a:lvl6pPr>
-              <a:lvl7pPr marL="2743200" algn="l" defTabSz="914400" rtl="0" eaLnBrk="1" latinLnBrk="0" hangingPunct="1">
-                <a:defRPr sz="1800" kern="1200">
-                  <a:solidFill>
-                    <a:schemeClr val="lt1"/>
-                  </a:solidFill>
-                  <a:latin typeface="+mn-lt"/>
-                  <a:ea typeface="+mn-ea"/>
-                  <a:cs typeface="+mn-cs"/>
-                </a:defRPr>
-              </a:lvl7pPr>
-              <a:lvl8pPr marL="3200400" algn="l" defTabSz="914400" rtl="0" eaLnBrk="1" latinLnBrk="0" hangingPunct="1">
-                <a:defRPr sz="1800" kern="1200">
-                  <a:solidFill>
-                    <a:schemeClr val="lt1"/>
-                  </a:solidFill>
-                  <a:latin typeface="+mn-lt"/>
-                  <a:ea typeface="+mn-ea"/>
-                  <a:cs typeface="+mn-cs"/>
-                </a:defRPr>
-              </a:lvl8pPr>
-              <a:lvl9pPr marL="3657600" algn="l" defTabSz="914400" rtl="0" eaLnBrk="1" latinLnBrk="0" hangingPunct="1">
-                <a:defRPr sz="1800" kern="1200">
-                  <a:solidFill>
-                    <a:schemeClr val="lt1"/>
-                  </a:solidFill>
-                  <a:latin typeface="+mn-lt"/>
-                  <a:ea typeface="+mn-ea"/>
-                  <a:cs typeface="+mn-cs"/>
-                </a:defRPr>
-              </a:lvl9pPr>
-            </a:lstStyle>
-            <a:p>
-              <a:pPr algn="ctr"/>
-              <a:endParaRPr lang="de-DE"/>
-            </a:p>
-          </p:txBody>
-        </p:sp>
-        <p:sp>
-          <p:nvSpPr>
-            <p:cNvPr id="22" name="Rounded Rectangle 21"/>
-            <p:cNvSpPr/>
-            <p:nvPr/>
-          </p:nvSpPr>
-          <p:spPr>
-            <a:xfrm>
-              <a:off x="868524" y="971600"/>
-              <a:ext cx="1224136" cy="1800200"/>
-            </a:xfrm>
-            <a:prstGeom prst="roundRect">
-              <a:avLst/>
-            </a:prstGeom>
-            <a:solidFill>
-              <a:schemeClr val="accent2">
-                <a:lumMod val="20000"/>
-                <a:lumOff val="80000"/>
-              </a:schemeClr>
-            </a:solidFill>
-            <a:ln w="31750">
-              <a:solidFill>
-                <a:srgbClr val="C00000"/>
-              </a:solidFill>
-            </a:ln>
-          </p:spPr>
-          <p:style>
-            <a:lnRef idx="2">
-              <a:schemeClr val="accent1">
-                <a:shade val="50000"/>
-              </a:schemeClr>
-            </a:lnRef>
-            <a:fillRef idx="1">
-              <a:schemeClr val="accent1"/>
-            </a:fillRef>
-            <a:effectRef idx="0">
-              <a:schemeClr val="accent1"/>
-            </a:effectRef>
-            <a:fontRef idx="minor">
-              <a:schemeClr val="lt1"/>
-            </a:fontRef>
-          </p:style>
-          <p:txBody>
-            <a:bodyPr rtlCol="0" anchor="ctr"/>
-            <a:lstStyle>
-              <a:defPPr>
-                <a:defRPr lang="de-DE"/>
-              </a:defPPr>
-              <a:lvl1pPr marL="0" algn="l" defTabSz="914400" rtl="0" eaLnBrk="1" latinLnBrk="0" hangingPunct="1">
-                <a:defRPr sz="1800" kern="1200">
-                  <a:solidFill>
-                    <a:schemeClr val="lt1"/>
-                  </a:solidFill>
-                  <a:latin typeface="+mn-lt"/>
-                  <a:ea typeface="+mn-ea"/>
-                  <a:cs typeface="+mn-cs"/>
-                </a:defRPr>
-              </a:lvl1pPr>
-              <a:lvl2pPr marL="457200" algn="l" defTabSz="914400" rtl="0" eaLnBrk="1" latinLnBrk="0" hangingPunct="1">
-                <a:defRPr sz="1800" kern="1200">
-                  <a:solidFill>
-                    <a:schemeClr val="lt1"/>
-                  </a:solidFill>
-                  <a:latin typeface="+mn-lt"/>
-                  <a:ea typeface="+mn-ea"/>
-                  <a:cs typeface="+mn-cs"/>
-                </a:defRPr>
-              </a:lvl2pPr>
-              <a:lvl3pPr marL="914400" algn="l" defTabSz="914400" rtl="0" eaLnBrk="1" latinLnBrk="0" hangingPunct="1">
-                <a:defRPr sz="1800" kern="1200">
-                  <a:solidFill>
-                    <a:schemeClr val="lt1"/>
-                  </a:solidFill>
-                  <a:latin typeface="+mn-lt"/>
-                  <a:ea typeface="+mn-ea"/>
-                  <a:cs typeface="+mn-cs"/>
-                </a:defRPr>
-              </a:lvl3pPr>
-              <a:lvl4pPr marL="1371600" algn="l" defTabSz="914400" rtl="0" eaLnBrk="1" latinLnBrk="0" hangingPunct="1">
-                <a:defRPr sz="1800" kern="1200">
-                  <a:solidFill>
-                    <a:schemeClr val="lt1"/>
-                  </a:solidFill>
-                  <a:latin typeface="+mn-lt"/>
-                  <a:ea typeface="+mn-ea"/>
-                  <a:cs typeface="+mn-cs"/>
-                </a:defRPr>
-              </a:lvl4pPr>
-              <a:lvl5pPr marL="1828800" algn="l" defTabSz="914400" rtl="0" eaLnBrk="1" latinLnBrk="0" hangingPunct="1">
-                <a:defRPr sz="1800" kern="1200">
-                  <a:solidFill>
-                    <a:schemeClr val="lt1"/>
-                  </a:solidFill>
-                  <a:latin typeface="+mn-lt"/>
-                  <a:ea typeface="+mn-ea"/>
-                  <a:cs typeface="+mn-cs"/>
-                </a:defRPr>
-              </a:lvl5pPr>
-              <a:lvl6pPr marL="2286000" algn="l" defTabSz="914400" rtl="0" eaLnBrk="1" latinLnBrk="0" hangingPunct="1">
-                <a:defRPr sz="1800" kern="1200">
-                  <a:solidFill>
-                    <a:schemeClr val="lt1"/>
-                  </a:solidFill>
-                  <a:latin typeface="+mn-lt"/>
-                  <a:ea typeface="+mn-ea"/>
-                  <a:cs typeface="+mn-cs"/>
-                </a:defRPr>
-              </a:lvl6pPr>
-              <a:lvl7pPr marL="2743200" algn="l" defTabSz="914400" rtl="0" eaLnBrk="1" latinLnBrk="0" hangingPunct="1">
-                <a:defRPr sz="1800" kern="1200">
-                  <a:solidFill>
-                    <a:schemeClr val="lt1"/>
-                  </a:solidFill>
-                  <a:latin typeface="+mn-lt"/>
-                  <a:ea typeface="+mn-ea"/>
-                  <a:cs typeface="+mn-cs"/>
-                </a:defRPr>
-              </a:lvl7pPr>
-              <a:lvl8pPr marL="3200400" algn="l" defTabSz="914400" rtl="0" eaLnBrk="1" latinLnBrk="0" hangingPunct="1">
-                <a:defRPr sz="1800" kern="1200">
-                  <a:solidFill>
-                    <a:schemeClr val="lt1"/>
-                  </a:solidFill>
-                  <a:latin typeface="+mn-lt"/>
-                  <a:ea typeface="+mn-ea"/>
-                  <a:cs typeface="+mn-cs"/>
-                </a:defRPr>
-              </a:lvl8pPr>
-              <a:lvl9pPr marL="3657600" algn="l" defTabSz="914400" rtl="0" eaLnBrk="1" latinLnBrk="0" hangingPunct="1">
-                <a:defRPr sz="1800" kern="1200">
-                  <a:solidFill>
-                    <a:schemeClr val="lt1"/>
-                  </a:solidFill>
-                  <a:latin typeface="+mn-lt"/>
-                  <a:ea typeface="+mn-ea"/>
-                  <a:cs typeface="+mn-cs"/>
-                </a:defRPr>
-              </a:lvl9pPr>
-            </a:lstStyle>
-            <a:p>
-              <a:pPr algn="ctr"/>
-              <a:endParaRPr lang="de-DE" sz="1000" b="1" dirty="0"/>
-            </a:p>
-          </p:txBody>
-        </p:sp>
-        <p:sp>
-          <p:nvSpPr>
-            <p:cNvPr id="24" name="Rounded Rectangle 23"/>
-            <p:cNvSpPr/>
-            <p:nvPr/>
-          </p:nvSpPr>
-          <p:spPr>
-            <a:xfrm>
-              <a:off x="2254548" y="961604"/>
-              <a:ext cx="1224136" cy="1800200"/>
-            </a:xfrm>
-            <a:prstGeom prst="roundRect">
-              <a:avLst/>
-            </a:prstGeom>
-            <a:solidFill>
-              <a:schemeClr val="accent2">
-                <a:lumMod val="20000"/>
-                <a:lumOff val="80000"/>
-              </a:schemeClr>
-            </a:solidFill>
-            <a:ln w="31750">
-              <a:solidFill>
-                <a:srgbClr val="C00000"/>
-              </a:solidFill>
-            </a:ln>
-          </p:spPr>
-          <p:style>
-            <a:lnRef idx="2">
-              <a:schemeClr val="accent1">
-                <a:shade val="50000"/>
-              </a:schemeClr>
-            </a:lnRef>
-            <a:fillRef idx="1">
-              <a:schemeClr val="accent1"/>
-            </a:fillRef>
-            <a:effectRef idx="0">
-              <a:schemeClr val="accent1"/>
-            </a:effectRef>
-            <a:fontRef idx="minor">
-              <a:schemeClr val="lt1"/>
-            </a:fontRef>
-          </p:style>
-          <p:txBody>
-            <a:bodyPr rtlCol="0" anchor="ctr"/>
-            <a:lstStyle>
-              <a:defPPr>
-                <a:defRPr lang="de-DE"/>
-              </a:defPPr>
-              <a:lvl1pPr marL="0" algn="l" defTabSz="914400" rtl="0" eaLnBrk="1" latinLnBrk="0" hangingPunct="1">
-                <a:defRPr sz="1800" kern="1200">
-                  <a:solidFill>
-                    <a:schemeClr val="lt1"/>
-                  </a:solidFill>
-                  <a:latin typeface="+mn-lt"/>
-                  <a:ea typeface="+mn-ea"/>
-                  <a:cs typeface="+mn-cs"/>
-                </a:defRPr>
-              </a:lvl1pPr>
-              <a:lvl2pPr marL="457200" algn="l" defTabSz="914400" rtl="0" eaLnBrk="1" latinLnBrk="0" hangingPunct="1">
-                <a:defRPr sz="1800" kern="1200">
-                  <a:solidFill>
-                    <a:schemeClr val="lt1"/>
-                  </a:solidFill>
-                  <a:latin typeface="+mn-lt"/>
-                  <a:ea typeface="+mn-ea"/>
-                  <a:cs typeface="+mn-cs"/>
-                </a:defRPr>
-              </a:lvl2pPr>
-              <a:lvl3pPr marL="914400" algn="l" defTabSz="914400" rtl="0" eaLnBrk="1" latinLnBrk="0" hangingPunct="1">
-                <a:defRPr sz="1800" kern="1200">
-                  <a:solidFill>
-                    <a:schemeClr val="lt1"/>
-                  </a:solidFill>
-                  <a:latin typeface="+mn-lt"/>
-                  <a:ea typeface="+mn-ea"/>
-                  <a:cs typeface="+mn-cs"/>
-                </a:defRPr>
-              </a:lvl3pPr>
-              <a:lvl4pPr marL="1371600" algn="l" defTabSz="914400" rtl="0" eaLnBrk="1" latinLnBrk="0" hangingPunct="1">
-                <a:defRPr sz="1800" kern="1200">
-                  <a:solidFill>
-                    <a:schemeClr val="lt1"/>
-                  </a:solidFill>
-                  <a:latin typeface="+mn-lt"/>
-                  <a:ea typeface="+mn-ea"/>
-                  <a:cs typeface="+mn-cs"/>
-                </a:defRPr>
-              </a:lvl4pPr>
-              <a:lvl5pPr marL="1828800" algn="l" defTabSz="914400" rtl="0" eaLnBrk="1" latinLnBrk="0" hangingPunct="1">
-                <a:defRPr sz="1800" kern="1200">
-                  <a:solidFill>
-                    <a:schemeClr val="lt1"/>
-                  </a:solidFill>
-                  <a:latin typeface="+mn-lt"/>
-                  <a:ea typeface="+mn-ea"/>
-                  <a:cs typeface="+mn-cs"/>
-                </a:defRPr>
-              </a:lvl5pPr>
-              <a:lvl6pPr marL="2286000" algn="l" defTabSz="914400" rtl="0" eaLnBrk="1" latinLnBrk="0" hangingPunct="1">
-                <a:defRPr sz="1800" kern="1200">
-                  <a:solidFill>
-                    <a:schemeClr val="lt1"/>
-                  </a:solidFill>
-                  <a:latin typeface="+mn-lt"/>
-                  <a:ea typeface="+mn-ea"/>
-                  <a:cs typeface="+mn-cs"/>
-                </a:defRPr>
-              </a:lvl6pPr>
-              <a:lvl7pPr marL="2743200" algn="l" defTabSz="914400" rtl="0" eaLnBrk="1" latinLnBrk="0" hangingPunct="1">
-                <a:defRPr sz="1800" kern="1200">
-                  <a:solidFill>
-                    <a:schemeClr val="lt1"/>
-                  </a:solidFill>
-                  <a:latin typeface="+mn-lt"/>
-                  <a:ea typeface="+mn-ea"/>
-                  <a:cs typeface="+mn-cs"/>
-                </a:defRPr>
-              </a:lvl7pPr>
-              <a:lvl8pPr marL="3200400" algn="l" defTabSz="914400" rtl="0" eaLnBrk="1" latinLnBrk="0" hangingPunct="1">
-                <a:defRPr sz="1800" kern="1200">
-                  <a:solidFill>
-                    <a:schemeClr val="lt1"/>
-                  </a:solidFill>
-                  <a:latin typeface="+mn-lt"/>
-                  <a:ea typeface="+mn-ea"/>
-                  <a:cs typeface="+mn-cs"/>
-                </a:defRPr>
-              </a:lvl8pPr>
-              <a:lvl9pPr marL="3657600" algn="l" defTabSz="914400" rtl="0" eaLnBrk="1" latinLnBrk="0" hangingPunct="1">
-                <a:defRPr sz="1800" kern="1200">
-                  <a:solidFill>
-                    <a:schemeClr val="lt1"/>
-                  </a:solidFill>
-                  <a:latin typeface="+mn-lt"/>
-                  <a:ea typeface="+mn-ea"/>
-                  <a:cs typeface="+mn-cs"/>
-                </a:defRPr>
-              </a:lvl9pPr>
-            </a:lstStyle>
-            <a:p>
-              <a:pPr algn="ctr"/>
-              <a:endParaRPr lang="de-DE" sz="1000" b="1"/>
-            </a:p>
-          </p:txBody>
-        </p:sp>
-        <p:sp>
-          <p:nvSpPr>
-            <p:cNvPr id="25" name="Rounded Rectangle 24"/>
-            <p:cNvSpPr/>
-            <p:nvPr/>
-          </p:nvSpPr>
-          <p:spPr>
-            <a:xfrm>
-              <a:off x="1012540" y="1141016"/>
-              <a:ext cx="936104" cy="936104"/>
-            </a:xfrm>
-            <a:prstGeom prst="roundRect">
-              <a:avLst/>
-            </a:prstGeom>
-            <a:solidFill>
-              <a:schemeClr val="accent2"/>
-            </a:solidFill>
-            <a:ln w="31750">
-              <a:solidFill>
-                <a:srgbClr val="C00000"/>
-              </a:solidFill>
-            </a:ln>
-          </p:spPr>
-          <p:style>
-            <a:lnRef idx="2">
-              <a:schemeClr val="accent1">
-                <a:shade val="50000"/>
-              </a:schemeClr>
-            </a:lnRef>
-            <a:fillRef idx="1">
-              <a:schemeClr val="accent1"/>
-            </a:fillRef>
-            <a:effectRef idx="0">
-              <a:schemeClr val="accent1"/>
-            </a:effectRef>
-            <a:fontRef idx="minor">
-              <a:schemeClr val="lt1"/>
-            </a:fontRef>
-          </p:style>
-          <p:txBody>
-            <a:bodyPr lIns="0" tIns="0" rIns="36000" bIns="36000" rtlCol="0" anchor="ctr"/>
-            <a:lstStyle>
-              <a:defPPr>
-                <a:defRPr lang="de-DE"/>
-              </a:defPPr>
-              <a:lvl1pPr marL="0" algn="l" defTabSz="914400" rtl="0" eaLnBrk="1" latinLnBrk="0" hangingPunct="1">
-                <a:defRPr sz="1800" kern="1200">
-                  <a:solidFill>
-                    <a:schemeClr val="lt1"/>
-                  </a:solidFill>
-                  <a:latin typeface="+mn-lt"/>
-                  <a:ea typeface="+mn-ea"/>
-                  <a:cs typeface="+mn-cs"/>
-                </a:defRPr>
-              </a:lvl1pPr>
-              <a:lvl2pPr marL="457200" algn="l" defTabSz="914400" rtl="0" eaLnBrk="1" latinLnBrk="0" hangingPunct="1">
-                <a:defRPr sz="1800" kern="1200">
-                  <a:solidFill>
-                    <a:schemeClr val="lt1"/>
-                  </a:solidFill>
-                  <a:latin typeface="+mn-lt"/>
-                  <a:ea typeface="+mn-ea"/>
-                  <a:cs typeface="+mn-cs"/>
-                </a:defRPr>
-              </a:lvl2pPr>
-              <a:lvl3pPr marL="914400" algn="l" defTabSz="914400" rtl="0" eaLnBrk="1" latinLnBrk="0" hangingPunct="1">
-                <a:defRPr sz="1800" kern="1200">
-                  <a:solidFill>
-                    <a:schemeClr val="lt1"/>
-                  </a:solidFill>
-                  <a:latin typeface="+mn-lt"/>
-                  <a:ea typeface="+mn-ea"/>
-                  <a:cs typeface="+mn-cs"/>
-                </a:defRPr>
-              </a:lvl3pPr>
-              <a:lvl4pPr marL="1371600" algn="l" defTabSz="914400" rtl="0" eaLnBrk="1" latinLnBrk="0" hangingPunct="1">
-                <a:defRPr sz="1800" kern="1200">
-                  <a:solidFill>
-                    <a:schemeClr val="lt1"/>
-                  </a:solidFill>
-                  <a:latin typeface="+mn-lt"/>
-                  <a:ea typeface="+mn-ea"/>
-                  <a:cs typeface="+mn-cs"/>
-                </a:defRPr>
-              </a:lvl4pPr>
-              <a:lvl5pPr marL="1828800" algn="l" defTabSz="914400" rtl="0" eaLnBrk="1" latinLnBrk="0" hangingPunct="1">
-                <a:defRPr sz="1800" kern="1200">
-                  <a:solidFill>
-                    <a:schemeClr val="lt1"/>
-                  </a:solidFill>
-                  <a:latin typeface="+mn-lt"/>
-                  <a:ea typeface="+mn-ea"/>
-                  <a:cs typeface="+mn-cs"/>
-                </a:defRPr>
-              </a:lvl5pPr>
-              <a:lvl6pPr marL="2286000" algn="l" defTabSz="914400" rtl="0" eaLnBrk="1" latinLnBrk="0" hangingPunct="1">
-                <a:defRPr sz="1800" kern="1200">
-                  <a:solidFill>
-                    <a:schemeClr val="lt1"/>
-                  </a:solidFill>
-                  <a:latin typeface="+mn-lt"/>
-                  <a:ea typeface="+mn-ea"/>
-                  <a:cs typeface="+mn-cs"/>
-                </a:defRPr>
-              </a:lvl6pPr>
-              <a:lvl7pPr marL="2743200" algn="l" defTabSz="914400" rtl="0" eaLnBrk="1" latinLnBrk="0" hangingPunct="1">
-                <a:defRPr sz="1800" kern="1200">
-                  <a:solidFill>
-                    <a:schemeClr val="lt1"/>
-                  </a:solidFill>
-                  <a:latin typeface="+mn-lt"/>
-                  <a:ea typeface="+mn-ea"/>
-                  <a:cs typeface="+mn-cs"/>
-                </a:defRPr>
-              </a:lvl7pPr>
-              <a:lvl8pPr marL="3200400" algn="l" defTabSz="914400" rtl="0" eaLnBrk="1" latinLnBrk="0" hangingPunct="1">
-                <a:defRPr sz="1800" kern="1200">
-                  <a:solidFill>
-                    <a:schemeClr val="lt1"/>
-                  </a:solidFill>
-                  <a:latin typeface="+mn-lt"/>
-                  <a:ea typeface="+mn-ea"/>
-                  <a:cs typeface="+mn-cs"/>
-                </a:defRPr>
-              </a:lvl8pPr>
-              <a:lvl9pPr marL="3657600" algn="l" defTabSz="914400" rtl="0" eaLnBrk="1" latinLnBrk="0" hangingPunct="1">
-                <a:defRPr sz="1800" kern="1200">
-                  <a:solidFill>
-                    <a:schemeClr val="lt1"/>
-                  </a:solidFill>
-                  <a:latin typeface="+mn-lt"/>
-                  <a:ea typeface="+mn-ea"/>
-                  <a:cs typeface="+mn-cs"/>
-                </a:defRPr>
-              </a:lvl9pPr>
-            </a:lstStyle>
-            <a:p>
-              <a:pPr algn="ctr"/>
-              <a:r>
-                <a:rPr lang="de-DE" sz="1000" b="1" dirty="0" smtClean="0">
-                  <a:solidFill>
-                    <a:schemeClr val="tx1"/>
-                  </a:solidFill>
-                  <a:latin typeface="Arial" panose="020B0604020202020204" pitchFamily="34" charset="0"/>
-                  <a:cs typeface="Arial" panose="020B0604020202020204" pitchFamily="34" charset="0"/>
-                </a:rPr>
-                <a:t>Subscription Service</a:t>
-              </a:r>
-              <a:endParaRPr lang="de-DE" sz="1000" b="1" dirty="0">
-                <a:solidFill>
-                  <a:schemeClr val="tx1"/>
-                </a:solidFill>
-                <a:latin typeface="Arial" panose="020B0604020202020204" pitchFamily="34" charset="0"/>
-                <a:cs typeface="Arial" panose="020B0604020202020204" pitchFamily="34" charset="0"/>
-              </a:endParaRPr>
-            </a:p>
-          </p:txBody>
-        </p:sp>
-        <p:sp>
-          <p:nvSpPr>
-            <p:cNvPr id="27" name="TextBox 11"/>
-            <p:cNvSpPr txBox="1"/>
-            <p:nvPr/>
-          </p:nvSpPr>
-          <p:spPr>
-            <a:xfrm>
-              <a:off x="872716" y="694601"/>
-              <a:ext cx="2124236" cy="276999"/>
-            </a:xfrm>
-            <a:prstGeom prst="rect">
-              <a:avLst/>
-            </a:prstGeom>
-            <a:noFill/>
-          </p:spPr>
-          <p:txBody>
-            <a:bodyPr wrap="square" rtlCol="0">
-              <a:spAutoFit/>
-            </a:bodyPr>
-            <a:lstStyle>
-              <a:defPPr>
-                <a:defRPr lang="de-DE"/>
-              </a:defPPr>
-              <a:lvl1pPr marL="0" algn="l" defTabSz="914400" rtl="0" eaLnBrk="1" latinLnBrk="0" hangingPunct="1">
-                <a:defRPr sz="1800" kern="1200">
-                  <a:solidFill>
-                    <a:schemeClr val="tx1"/>
-                  </a:solidFill>
-                  <a:latin typeface="+mn-lt"/>
-                  <a:ea typeface="+mn-ea"/>
-                  <a:cs typeface="+mn-cs"/>
-                </a:defRPr>
-              </a:lvl1pPr>
-              <a:lvl2pPr marL="457200" algn="l" defTabSz="914400" rtl="0" eaLnBrk="1" latinLnBrk="0" hangingPunct="1">
-                <a:defRPr sz="1800" kern="1200">
-                  <a:solidFill>
-                    <a:schemeClr val="tx1"/>
-                  </a:solidFill>
-                  <a:latin typeface="+mn-lt"/>
-                  <a:ea typeface="+mn-ea"/>
-                  <a:cs typeface="+mn-cs"/>
-                </a:defRPr>
-              </a:lvl2pPr>
-              <a:lvl3pPr marL="914400" algn="l" defTabSz="914400" rtl="0" eaLnBrk="1" latinLnBrk="0" hangingPunct="1">
-                <a:defRPr sz="1800" kern="1200">
-                  <a:solidFill>
-                    <a:schemeClr val="tx1"/>
-                  </a:solidFill>
-                  <a:latin typeface="+mn-lt"/>
-                  <a:ea typeface="+mn-ea"/>
-                  <a:cs typeface="+mn-cs"/>
-                </a:defRPr>
-              </a:lvl3pPr>
-              <a:lvl4pPr marL="1371600" algn="l" defTabSz="914400" rtl="0" eaLnBrk="1" latinLnBrk="0" hangingPunct="1">
-                <a:defRPr sz="1800" kern="1200">
-                  <a:solidFill>
-                    <a:schemeClr val="tx1"/>
-                  </a:solidFill>
-                  <a:latin typeface="+mn-lt"/>
-                  <a:ea typeface="+mn-ea"/>
-                  <a:cs typeface="+mn-cs"/>
-                </a:defRPr>
-              </a:lvl4pPr>
-              <a:lvl5pPr marL="1828800" algn="l" defTabSz="914400" rtl="0" eaLnBrk="1" latinLnBrk="0" hangingPunct="1">
-                <a:defRPr sz="1800" kern="1200">
-                  <a:solidFill>
-                    <a:schemeClr val="tx1"/>
-                  </a:solidFill>
-                  <a:latin typeface="+mn-lt"/>
-                  <a:ea typeface="+mn-ea"/>
-                  <a:cs typeface="+mn-cs"/>
-                </a:defRPr>
-              </a:lvl5pPr>
-              <a:lvl6pPr marL="2286000" algn="l" defTabSz="914400" rtl="0" eaLnBrk="1" latinLnBrk="0" hangingPunct="1">
-                <a:defRPr sz="1800" kern="1200">
-                  <a:solidFill>
-                    <a:schemeClr val="tx1"/>
-                  </a:solidFill>
-                  <a:latin typeface="+mn-lt"/>
-                  <a:ea typeface="+mn-ea"/>
-                  <a:cs typeface="+mn-cs"/>
-                </a:defRPr>
-              </a:lvl6pPr>
-              <a:lvl7pPr marL="2743200" algn="l" defTabSz="914400" rtl="0" eaLnBrk="1" latinLnBrk="0" hangingPunct="1">
-                <a:defRPr sz="1800" kern="1200">
-                  <a:solidFill>
-                    <a:schemeClr val="tx1"/>
-                  </a:solidFill>
-                  <a:latin typeface="+mn-lt"/>
-                  <a:ea typeface="+mn-ea"/>
-                  <a:cs typeface="+mn-cs"/>
-                </a:defRPr>
-              </a:lvl7pPr>
-              <a:lvl8pPr marL="3200400" algn="l" defTabSz="914400" rtl="0" eaLnBrk="1" latinLnBrk="0" hangingPunct="1">
-                <a:defRPr sz="1800" kern="1200">
-                  <a:solidFill>
-                    <a:schemeClr val="tx1"/>
-                  </a:solidFill>
-                  <a:latin typeface="+mn-lt"/>
-                  <a:ea typeface="+mn-ea"/>
-                  <a:cs typeface="+mn-cs"/>
-                </a:defRPr>
-              </a:lvl8pPr>
-              <a:lvl9pPr marL="3657600" algn="l" defTabSz="914400" rtl="0" eaLnBrk="1" latinLnBrk="0" hangingPunct="1">
-                <a:defRPr sz="1800" kern="1200">
-                  <a:solidFill>
-                    <a:schemeClr val="tx1"/>
-                  </a:solidFill>
-                  <a:latin typeface="+mn-lt"/>
-                  <a:ea typeface="+mn-ea"/>
-                  <a:cs typeface="+mn-cs"/>
-                </a:defRPr>
-              </a:lvl9pPr>
-            </a:lstStyle>
-            <a:p>
-              <a:r>
-                <a:rPr lang="de-DE" sz="1200" b="1" dirty="0">
-                  <a:latin typeface="Arial" panose="020B0604020202020204" pitchFamily="34" charset="0"/>
-                  <a:cs typeface="Arial" panose="020B0604020202020204" pitchFamily="34" charset="0"/>
-                </a:rPr>
-                <a:t>O</a:t>
-              </a:r>
-              <a:r>
-                <a:rPr lang="de-DE" sz="1200" b="1" dirty="0" smtClean="0">
-                  <a:latin typeface="Arial" panose="020B0604020202020204" pitchFamily="34" charset="0"/>
-                  <a:cs typeface="Arial" panose="020B0604020202020204" pitchFamily="34" charset="0"/>
-                </a:rPr>
-                <a:t>SCM</a:t>
-              </a:r>
-              <a:endParaRPr lang="de-DE" sz="1200" b="1" dirty="0">
-                <a:latin typeface="Arial" panose="020B0604020202020204" pitchFamily="34" charset="0"/>
-                <a:cs typeface="Arial" panose="020B0604020202020204" pitchFamily="34" charset="0"/>
-              </a:endParaRPr>
-            </a:p>
-          </p:txBody>
-        </p:sp>
-        <p:sp>
-          <p:nvSpPr>
-            <p:cNvPr id="28" name="TextBox 12"/>
-            <p:cNvSpPr txBox="1"/>
-            <p:nvPr/>
-          </p:nvSpPr>
-          <p:spPr>
-            <a:xfrm>
-              <a:off x="3926111" y="694601"/>
-              <a:ext cx="1117614" cy="276999"/>
-            </a:xfrm>
-            <a:prstGeom prst="rect">
-              <a:avLst/>
-            </a:prstGeom>
-            <a:noFill/>
-          </p:spPr>
-          <p:txBody>
-            <a:bodyPr wrap="none" rtlCol="0">
-              <a:spAutoFit/>
-            </a:bodyPr>
-            <a:lstStyle>
-              <a:defPPr>
-                <a:defRPr lang="de-DE"/>
-              </a:defPPr>
-              <a:lvl1pPr marL="0" algn="l" defTabSz="914400" rtl="0" eaLnBrk="1" latinLnBrk="0" hangingPunct="1">
-                <a:defRPr sz="1800" kern="1200">
-                  <a:solidFill>
-                    <a:schemeClr val="tx1"/>
-                  </a:solidFill>
-                  <a:latin typeface="+mn-lt"/>
-                  <a:ea typeface="+mn-ea"/>
-                  <a:cs typeface="+mn-cs"/>
-                </a:defRPr>
-              </a:lvl1pPr>
-              <a:lvl2pPr marL="457200" algn="l" defTabSz="914400" rtl="0" eaLnBrk="1" latinLnBrk="0" hangingPunct="1">
-                <a:defRPr sz="1800" kern="1200">
-                  <a:solidFill>
-                    <a:schemeClr val="tx1"/>
-                  </a:solidFill>
-                  <a:latin typeface="+mn-lt"/>
-                  <a:ea typeface="+mn-ea"/>
-                  <a:cs typeface="+mn-cs"/>
-                </a:defRPr>
-              </a:lvl2pPr>
-              <a:lvl3pPr marL="914400" algn="l" defTabSz="914400" rtl="0" eaLnBrk="1" latinLnBrk="0" hangingPunct="1">
-                <a:defRPr sz="1800" kern="1200">
-                  <a:solidFill>
-                    <a:schemeClr val="tx1"/>
-                  </a:solidFill>
-                  <a:latin typeface="+mn-lt"/>
-                  <a:ea typeface="+mn-ea"/>
-                  <a:cs typeface="+mn-cs"/>
-                </a:defRPr>
-              </a:lvl3pPr>
-              <a:lvl4pPr marL="1371600" algn="l" defTabSz="914400" rtl="0" eaLnBrk="1" latinLnBrk="0" hangingPunct="1">
-                <a:defRPr sz="1800" kern="1200">
-                  <a:solidFill>
-                    <a:schemeClr val="tx1"/>
-                  </a:solidFill>
-                  <a:latin typeface="+mn-lt"/>
-                  <a:ea typeface="+mn-ea"/>
-                  <a:cs typeface="+mn-cs"/>
-                </a:defRPr>
-              </a:lvl4pPr>
-              <a:lvl5pPr marL="1828800" algn="l" defTabSz="914400" rtl="0" eaLnBrk="1" latinLnBrk="0" hangingPunct="1">
-                <a:defRPr sz="1800" kern="1200">
-                  <a:solidFill>
-                    <a:schemeClr val="tx1"/>
-                  </a:solidFill>
-                  <a:latin typeface="+mn-lt"/>
-                  <a:ea typeface="+mn-ea"/>
-                  <a:cs typeface="+mn-cs"/>
-                </a:defRPr>
-              </a:lvl5pPr>
-              <a:lvl6pPr marL="2286000" algn="l" defTabSz="914400" rtl="0" eaLnBrk="1" latinLnBrk="0" hangingPunct="1">
-                <a:defRPr sz="1800" kern="1200">
-                  <a:solidFill>
-                    <a:schemeClr val="tx1"/>
-                  </a:solidFill>
-                  <a:latin typeface="+mn-lt"/>
-                  <a:ea typeface="+mn-ea"/>
-                  <a:cs typeface="+mn-cs"/>
-                </a:defRPr>
-              </a:lvl6pPr>
-              <a:lvl7pPr marL="2743200" algn="l" defTabSz="914400" rtl="0" eaLnBrk="1" latinLnBrk="0" hangingPunct="1">
-                <a:defRPr sz="1800" kern="1200">
-                  <a:solidFill>
-                    <a:schemeClr val="tx1"/>
-                  </a:solidFill>
-                  <a:latin typeface="+mn-lt"/>
-                  <a:ea typeface="+mn-ea"/>
-                  <a:cs typeface="+mn-cs"/>
-                </a:defRPr>
-              </a:lvl7pPr>
-              <a:lvl8pPr marL="3200400" algn="l" defTabSz="914400" rtl="0" eaLnBrk="1" latinLnBrk="0" hangingPunct="1">
-                <a:defRPr sz="1800" kern="1200">
-                  <a:solidFill>
-                    <a:schemeClr val="tx1"/>
-                  </a:solidFill>
-                  <a:latin typeface="+mn-lt"/>
-                  <a:ea typeface="+mn-ea"/>
-                  <a:cs typeface="+mn-cs"/>
-                </a:defRPr>
-              </a:lvl8pPr>
-              <a:lvl9pPr marL="3657600" algn="l" defTabSz="914400" rtl="0" eaLnBrk="1" latinLnBrk="0" hangingPunct="1">
-                <a:defRPr sz="1800" kern="1200">
-                  <a:solidFill>
-                    <a:schemeClr val="tx1"/>
-                  </a:solidFill>
-                  <a:latin typeface="+mn-lt"/>
-                  <a:ea typeface="+mn-ea"/>
-                  <a:cs typeface="+mn-cs"/>
-                </a:defRPr>
-              </a:lvl9pPr>
-            </a:lstStyle>
-            <a:p>
-              <a:r>
-                <a:rPr lang="de-DE" sz="1200" b="1" dirty="0" smtClean="0">
-                  <a:latin typeface="Arial" panose="020B0604020202020204" pitchFamily="34" charset="0"/>
-                  <a:cs typeface="Arial" panose="020B0604020202020204" pitchFamily="34" charset="0"/>
-                </a:rPr>
-                <a:t>Shell Scripts</a:t>
-              </a:r>
-              <a:endParaRPr lang="de-DE" sz="1200" b="1" dirty="0">
-                <a:latin typeface="Arial" panose="020B0604020202020204" pitchFamily="34" charset="0"/>
-                <a:cs typeface="Arial" panose="020B0604020202020204" pitchFamily="34" charset="0"/>
-              </a:endParaRPr>
-            </a:p>
-          </p:txBody>
-        </p:sp>
-        <p:sp>
-          <p:nvSpPr>
-            <p:cNvPr id="34" name="Rounded Rectangle 33"/>
-            <p:cNvSpPr/>
-            <p:nvPr/>
-          </p:nvSpPr>
-          <p:spPr>
-            <a:xfrm>
-              <a:off x="2397212" y="1148396"/>
-              <a:ext cx="936104" cy="936104"/>
-            </a:xfrm>
-            <a:prstGeom prst="roundRect">
-              <a:avLst/>
-            </a:prstGeom>
-            <a:solidFill>
-              <a:schemeClr val="accent2"/>
-            </a:solidFill>
-            <a:ln w="31750">
-              <a:solidFill>
-                <a:srgbClr val="C00000"/>
-              </a:solidFill>
-            </a:ln>
-          </p:spPr>
-          <p:style>
-            <a:lnRef idx="2">
-              <a:schemeClr val="accent1">
-                <a:shade val="50000"/>
-              </a:schemeClr>
-            </a:lnRef>
-            <a:fillRef idx="1">
-              <a:schemeClr val="accent1"/>
-            </a:fillRef>
-            <a:effectRef idx="0">
-              <a:schemeClr val="accent1"/>
-            </a:effectRef>
-            <a:fontRef idx="minor">
-              <a:schemeClr val="lt1"/>
-            </a:fontRef>
-          </p:style>
-          <p:txBody>
-            <a:bodyPr lIns="0" tIns="0" rIns="0" bIns="36000" rtlCol="0" anchor="ctr"/>
-            <a:lstStyle>
-              <a:defPPr>
-                <a:defRPr lang="de-DE"/>
-              </a:defPPr>
-              <a:lvl1pPr marL="0" algn="l" defTabSz="914400" rtl="0" eaLnBrk="1" latinLnBrk="0" hangingPunct="1">
-                <a:defRPr sz="1800" kern="1200">
-                  <a:solidFill>
-                    <a:schemeClr val="lt1"/>
-                  </a:solidFill>
-                  <a:latin typeface="+mn-lt"/>
-                  <a:ea typeface="+mn-ea"/>
-                  <a:cs typeface="+mn-cs"/>
-                </a:defRPr>
-              </a:lvl1pPr>
-              <a:lvl2pPr marL="457200" algn="l" defTabSz="914400" rtl="0" eaLnBrk="1" latinLnBrk="0" hangingPunct="1">
-                <a:defRPr sz="1800" kern="1200">
-                  <a:solidFill>
-                    <a:schemeClr val="lt1"/>
-                  </a:solidFill>
-                  <a:latin typeface="+mn-lt"/>
-                  <a:ea typeface="+mn-ea"/>
-                  <a:cs typeface="+mn-cs"/>
-                </a:defRPr>
-              </a:lvl2pPr>
-              <a:lvl3pPr marL="914400" algn="l" defTabSz="914400" rtl="0" eaLnBrk="1" latinLnBrk="0" hangingPunct="1">
-                <a:defRPr sz="1800" kern="1200">
-                  <a:solidFill>
-                    <a:schemeClr val="lt1"/>
-                  </a:solidFill>
-                  <a:latin typeface="+mn-lt"/>
-                  <a:ea typeface="+mn-ea"/>
-                  <a:cs typeface="+mn-cs"/>
-                </a:defRPr>
-              </a:lvl3pPr>
-              <a:lvl4pPr marL="1371600" algn="l" defTabSz="914400" rtl="0" eaLnBrk="1" latinLnBrk="0" hangingPunct="1">
-                <a:defRPr sz="1800" kern="1200">
-                  <a:solidFill>
-                    <a:schemeClr val="lt1"/>
-                  </a:solidFill>
-                  <a:latin typeface="+mn-lt"/>
-                  <a:ea typeface="+mn-ea"/>
-                  <a:cs typeface="+mn-cs"/>
-                </a:defRPr>
-              </a:lvl4pPr>
-              <a:lvl5pPr marL="1828800" algn="l" defTabSz="914400" rtl="0" eaLnBrk="1" latinLnBrk="0" hangingPunct="1">
-                <a:defRPr sz="1800" kern="1200">
-                  <a:solidFill>
-                    <a:schemeClr val="lt1"/>
-                  </a:solidFill>
-                  <a:latin typeface="+mn-lt"/>
-                  <a:ea typeface="+mn-ea"/>
-                  <a:cs typeface="+mn-cs"/>
-                </a:defRPr>
-              </a:lvl5pPr>
-              <a:lvl6pPr marL="2286000" algn="l" defTabSz="914400" rtl="0" eaLnBrk="1" latinLnBrk="0" hangingPunct="1">
-                <a:defRPr sz="1800" kern="1200">
-                  <a:solidFill>
-                    <a:schemeClr val="lt1"/>
-                  </a:solidFill>
-                  <a:latin typeface="+mn-lt"/>
-                  <a:ea typeface="+mn-ea"/>
-                  <a:cs typeface="+mn-cs"/>
-                </a:defRPr>
-              </a:lvl6pPr>
-              <a:lvl7pPr marL="2743200" algn="l" defTabSz="914400" rtl="0" eaLnBrk="1" latinLnBrk="0" hangingPunct="1">
-                <a:defRPr sz="1800" kern="1200">
-                  <a:solidFill>
-                    <a:schemeClr val="lt1"/>
-                  </a:solidFill>
-                  <a:latin typeface="+mn-lt"/>
-                  <a:ea typeface="+mn-ea"/>
-                  <a:cs typeface="+mn-cs"/>
-                </a:defRPr>
-              </a:lvl7pPr>
-              <a:lvl8pPr marL="3200400" algn="l" defTabSz="914400" rtl="0" eaLnBrk="1" latinLnBrk="0" hangingPunct="1">
-                <a:defRPr sz="1800" kern="1200">
-                  <a:solidFill>
-                    <a:schemeClr val="lt1"/>
-                  </a:solidFill>
-                  <a:latin typeface="+mn-lt"/>
-                  <a:ea typeface="+mn-ea"/>
-                  <a:cs typeface="+mn-cs"/>
-                </a:defRPr>
-              </a:lvl8pPr>
-              <a:lvl9pPr marL="3657600" algn="l" defTabSz="914400" rtl="0" eaLnBrk="1" latinLnBrk="0" hangingPunct="1">
-                <a:defRPr sz="1800" kern="1200">
-                  <a:solidFill>
-                    <a:schemeClr val="lt1"/>
-                  </a:solidFill>
-                  <a:latin typeface="+mn-lt"/>
-                  <a:ea typeface="+mn-ea"/>
-                  <a:cs typeface="+mn-cs"/>
-                </a:defRPr>
-              </a:lvl9pPr>
-            </a:lstStyle>
-            <a:p>
-              <a:pPr algn="ctr"/>
-              <a:r>
-                <a:rPr lang="de-DE" sz="1000" b="1" dirty="0" smtClean="0">
-                  <a:solidFill>
-                    <a:schemeClr val="tx1"/>
-                  </a:solidFill>
-                  <a:latin typeface="Arial" panose="020B0604020202020204" pitchFamily="34" charset="0"/>
-                  <a:cs typeface="Arial" panose="020B0604020202020204" pitchFamily="34" charset="0"/>
-                </a:rPr>
-                <a:t>Shell</a:t>
-              </a:r>
-            </a:p>
-            <a:p>
-              <a:pPr algn="ctr"/>
-              <a:r>
-                <a:rPr lang="de-DE" sz="1000" b="1" dirty="0" smtClean="0">
-                  <a:solidFill>
-                    <a:schemeClr val="tx1"/>
-                  </a:solidFill>
-                  <a:latin typeface="Arial" panose="020B0604020202020204" pitchFamily="34" charset="0"/>
-                  <a:cs typeface="Arial" panose="020B0604020202020204" pitchFamily="34" charset="0"/>
-                </a:rPr>
-                <a:t>Service</a:t>
-              </a:r>
-            </a:p>
-            <a:p>
-              <a:pPr algn="ctr"/>
-              <a:r>
-                <a:rPr lang="de-DE" sz="1000" b="1" dirty="0" smtClean="0">
-                  <a:solidFill>
-                    <a:schemeClr val="tx1"/>
-                  </a:solidFill>
-                  <a:latin typeface="Arial" panose="020B0604020202020204" pitchFamily="34" charset="0"/>
-                  <a:cs typeface="Arial" panose="020B0604020202020204" pitchFamily="34" charset="0"/>
-                </a:rPr>
-                <a:t>Controller</a:t>
-              </a:r>
-              <a:endParaRPr lang="de-DE" sz="1000" b="1" dirty="0">
-                <a:solidFill>
-                  <a:schemeClr val="tx1"/>
-                </a:solidFill>
-                <a:latin typeface="Arial" panose="020B0604020202020204" pitchFamily="34" charset="0"/>
-                <a:cs typeface="Arial" panose="020B0604020202020204" pitchFamily="34" charset="0"/>
-              </a:endParaRPr>
-            </a:p>
-          </p:txBody>
-        </p:sp>
-        <p:sp>
-          <p:nvSpPr>
-            <p:cNvPr id="35" name="TextBox 19"/>
-            <p:cNvSpPr txBox="1"/>
-            <p:nvPr/>
-          </p:nvSpPr>
-          <p:spPr>
-            <a:xfrm>
-              <a:off x="1120552" y="2411760"/>
-              <a:ext cx="756084" cy="246221"/>
-            </a:xfrm>
-            <a:prstGeom prst="rect">
-              <a:avLst/>
-            </a:prstGeom>
-            <a:noFill/>
-          </p:spPr>
-          <p:txBody>
-            <a:bodyPr wrap="square" rtlCol="0">
-              <a:spAutoFit/>
-            </a:bodyPr>
-            <a:lstStyle>
-              <a:defPPr>
-                <a:defRPr lang="de-DE"/>
-              </a:defPPr>
-              <a:lvl1pPr marL="0" algn="l" defTabSz="914400" rtl="0" eaLnBrk="1" latinLnBrk="0" hangingPunct="1">
-                <a:defRPr sz="1800" kern="1200">
-                  <a:solidFill>
-                    <a:schemeClr val="tx1"/>
-                  </a:solidFill>
-                  <a:latin typeface="+mn-lt"/>
-                  <a:ea typeface="+mn-ea"/>
-                  <a:cs typeface="+mn-cs"/>
-                </a:defRPr>
-              </a:lvl1pPr>
-              <a:lvl2pPr marL="457200" algn="l" defTabSz="914400" rtl="0" eaLnBrk="1" latinLnBrk="0" hangingPunct="1">
-                <a:defRPr sz="1800" kern="1200">
-                  <a:solidFill>
-                    <a:schemeClr val="tx1"/>
-                  </a:solidFill>
-                  <a:latin typeface="+mn-lt"/>
-                  <a:ea typeface="+mn-ea"/>
-                  <a:cs typeface="+mn-cs"/>
-                </a:defRPr>
-              </a:lvl2pPr>
-              <a:lvl3pPr marL="914400" algn="l" defTabSz="914400" rtl="0" eaLnBrk="1" latinLnBrk="0" hangingPunct="1">
-                <a:defRPr sz="1800" kern="1200">
-                  <a:solidFill>
-                    <a:schemeClr val="tx1"/>
-                  </a:solidFill>
-                  <a:latin typeface="+mn-lt"/>
-                  <a:ea typeface="+mn-ea"/>
-                  <a:cs typeface="+mn-cs"/>
-                </a:defRPr>
-              </a:lvl3pPr>
-              <a:lvl4pPr marL="1371600" algn="l" defTabSz="914400" rtl="0" eaLnBrk="1" latinLnBrk="0" hangingPunct="1">
-                <a:defRPr sz="1800" kern="1200">
-                  <a:solidFill>
-                    <a:schemeClr val="tx1"/>
-                  </a:solidFill>
-                  <a:latin typeface="+mn-lt"/>
-                  <a:ea typeface="+mn-ea"/>
-                  <a:cs typeface="+mn-cs"/>
-                </a:defRPr>
-              </a:lvl4pPr>
-              <a:lvl5pPr marL="1828800" algn="l" defTabSz="914400" rtl="0" eaLnBrk="1" latinLnBrk="0" hangingPunct="1">
-                <a:defRPr sz="1800" kern="1200">
-                  <a:solidFill>
-                    <a:schemeClr val="tx1"/>
-                  </a:solidFill>
-                  <a:latin typeface="+mn-lt"/>
-                  <a:ea typeface="+mn-ea"/>
-                  <a:cs typeface="+mn-cs"/>
-                </a:defRPr>
-              </a:lvl5pPr>
-              <a:lvl6pPr marL="2286000" algn="l" defTabSz="914400" rtl="0" eaLnBrk="1" latinLnBrk="0" hangingPunct="1">
-                <a:defRPr sz="1800" kern="1200">
-                  <a:solidFill>
-                    <a:schemeClr val="tx1"/>
-                  </a:solidFill>
-                  <a:latin typeface="+mn-lt"/>
-                  <a:ea typeface="+mn-ea"/>
-                  <a:cs typeface="+mn-cs"/>
-                </a:defRPr>
-              </a:lvl6pPr>
-              <a:lvl7pPr marL="2743200" algn="l" defTabSz="914400" rtl="0" eaLnBrk="1" latinLnBrk="0" hangingPunct="1">
-                <a:defRPr sz="1800" kern="1200">
-                  <a:solidFill>
-                    <a:schemeClr val="tx1"/>
-                  </a:solidFill>
-                  <a:latin typeface="+mn-lt"/>
-                  <a:ea typeface="+mn-ea"/>
-                  <a:cs typeface="+mn-cs"/>
-                </a:defRPr>
-              </a:lvl7pPr>
-              <a:lvl8pPr marL="3200400" algn="l" defTabSz="914400" rtl="0" eaLnBrk="1" latinLnBrk="0" hangingPunct="1">
-                <a:defRPr sz="1800" kern="1200">
-                  <a:solidFill>
-                    <a:schemeClr val="tx1"/>
-                  </a:solidFill>
-                  <a:latin typeface="+mn-lt"/>
-                  <a:ea typeface="+mn-ea"/>
-                  <a:cs typeface="+mn-cs"/>
-                </a:defRPr>
-              </a:lvl8pPr>
-              <a:lvl9pPr marL="3657600" algn="l" defTabSz="914400" rtl="0" eaLnBrk="1" latinLnBrk="0" hangingPunct="1">
-                <a:defRPr sz="1800" kern="1200">
-                  <a:solidFill>
-                    <a:schemeClr val="tx1"/>
-                  </a:solidFill>
-                  <a:latin typeface="+mn-lt"/>
-                  <a:ea typeface="+mn-ea"/>
-                  <a:cs typeface="+mn-cs"/>
-                </a:defRPr>
-              </a:lvl9pPr>
-            </a:lstStyle>
-            <a:p>
-              <a:r>
-                <a:rPr lang="de-DE" sz="1000" b="1" dirty="0" smtClean="0">
-                  <a:latin typeface="Arial" panose="020B0604020202020204" pitchFamily="34" charset="0"/>
-                  <a:cs typeface="Arial" panose="020B0604020202020204" pitchFamily="34" charset="0"/>
-                </a:rPr>
-                <a:t>Platform</a:t>
-              </a:r>
-              <a:endParaRPr lang="de-DE" sz="1000" b="1" dirty="0">
-                <a:latin typeface="Arial" panose="020B0604020202020204" pitchFamily="34" charset="0"/>
-                <a:cs typeface="Arial" panose="020B0604020202020204" pitchFamily="34" charset="0"/>
-              </a:endParaRPr>
-            </a:p>
-          </p:txBody>
-        </p:sp>
-        <p:sp>
-          <p:nvSpPr>
-            <p:cNvPr id="36" name="TextBox 20"/>
-            <p:cNvSpPr txBox="1"/>
-            <p:nvPr/>
-          </p:nvSpPr>
-          <p:spPr>
-            <a:xfrm>
-              <a:off x="2236676" y="2123728"/>
-              <a:ext cx="1278272" cy="553998"/>
-            </a:xfrm>
-            <a:prstGeom prst="rect">
-              <a:avLst/>
-            </a:prstGeom>
-            <a:noFill/>
-          </p:spPr>
-          <p:txBody>
-            <a:bodyPr wrap="square" rtlCol="0">
-              <a:spAutoFit/>
-            </a:bodyPr>
-            <a:lstStyle>
-              <a:defPPr>
-                <a:defRPr lang="de-DE"/>
-              </a:defPPr>
-              <a:lvl1pPr marL="0" algn="l" defTabSz="914400" rtl="0" eaLnBrk="1" latinLnBrk="0" hangingPunct="1">
-                <a:defRPr sz="1800" kern="1200">
-                  <a:solidFill>
-                    <a:schemeClr val="tx1"/>
-                  </a:solidFill>
-                  <a:latin typeface="+mn-lt"/>
-                  <a:ea typeface="+mn-ea"/>
-                  <a:cs typeface="+mn-cs"/>
-                </a:defRPr>
-              </a:lvl1pPr>
-              <a:lvl2pPr marL="457200" algn="l" defTabSz="914400" rtl="0" eaLnBrk="1" latinLnBrk="0" hangingPunct="1">
-                <a:defRPr sz="1800" kern="1200">
-                  <a:solidFill>
-                    <a:schemeClr val="tx1"/>
-                  </a:solidFill>
-                  <a:latin typeface="+mn-lt"/>
-                  <a:ea typeface="+mn-ea"/>
-                  <a:cs typeface="+mn-cs"/>
-                </a:defRPr>
-              </a:lvl2pPr>
-              <a:lvl3pPr marL="914400" algn="l" defTabSz="914400" rtl="0" eaLnBrk="1" latinLnBrk="0" hangingPunct="1">
-                <a:defRPr sz="1800" kern="1200">
-                  <a:solidFill>
-                    <a:schemeClr val="tx1"/>
-                  </a:solidFill>
-                  <a:latin typeface="+mn-lt"/>
-                  <a:ea typeface="+mn-ea"/>
-                  <a:cs typeface="+mn-cs"/>
-                </a:defRPr>
-              </a:lvl3pPr>
-              <a:lvl4pPr marL="1371600" algn="l" defTabSz="914400" rtl="0" eaLnBrk="1" latinLnBrk="0" hangingPunct="1">
-                <a:defRPr sz="1800" kern="1200">
-                  <a:solidFill>
-                    <a:schemeClr val="tx1"/>
-                  </a:solidFill>
-                  <a:latin typeface="+mn-lt"/>
-                  <a:ea typeface="+mn-ea"/>
-                  <a:cs typeface="+mn-cs"/>
-                </a:defRPr>
-              </a:lvl4pPr>
-              <a:lvl5pPr marL="1828800" algn="l" defTabSz="914400" rtl="0" eaLnBrk="1" latinLnBrk="0" hangingPunct="1">
-                <a:defRPr sz="1800" kern="1200">
-                  <a:solidFill>
-                    <a:schemeClr val="tx1"/>
-                  </a:solidFill>
-                  <a:latin typeface="+mn-lt"/>
-                  <a:ea typeface="+mn-ea"/>
-                  <a:cs typeface="+mn-cs"/>
-                </a:defRPr>
-              </a:lvl5pPr>
-              <a:lvl6pPr marL="2286000" algn="l" defTabSz="914400" rtl="0" eaLnBrk="1" latinLnBrk="0" hangingPunct="1">
-                <a:defRPr sz="1800" kern="1200">
-                  <a:solidFill>
-                    <a:schemeClr val="tx1"/>
-                  </a:solidFill>
-                  <a:latin typeface="+mn-lt"/>
-                  <a:ea typeface="+mn-ea"/>
-                  <a:cs typeface="+mn-cs"/>
-                </a:defRPr>
-              </a:lvl6pPr>
-              <a:lvl7pPr marL="2743200" algn="l" defTabSz="914400" rtl="0" eaLnBrk="1" latinLnBrk="0" hangingPunct="1">
-                <a:defRPr sz="1800" kern="1200">
-                  <a:solidFill>
-                    <a:schemeClr val="tx1"/>
-                  </a:solidFill>
-                  <a:latin typeface="+mn-lt"/>
-                  <a:ea typeface="+mn-ea"/>
-                  <a:cs typeface="+mn-cs"/>
-                </a:defRPr>
-              </a:lvl7pPr>
-              <a:lvl8pPr marL="3200400" algn="l" defTabSz="914400" rtl="0" eaLnBrk="1" latinLnBrk="0" hangingPunct="1">
-                <a:defRPr sz="1800" kern="1200">
-                  <a:solidFill>
-                    <a:schemeClr val="tx1"/>
-                  </a:solidFill>
-                  <a:latin typeface="+mn-lt"/>
-                  <a:ea typeface="+mn-ea"/>
-                  <a:cs typeface="+mn-cs"/>
-                </a:defRPr>
-              </a:lvl8pPr>
-              <a:lvl9pPr marL="3657600" algn="l" defTabSz="914400" rtl="0" eaLnBrk="1" latinLnBrk="0" hangingPunct="1">
-                <a:defRPr sz="1800" kern="1200">
-                  <a:solidFill>
-                    <a:schemeClr val="tx1"/>
-                  </a:solidFill>
-                  <a:latin typeface="+mn-lt"/>
-                  <a:ea typeface="+mn-ea"/>
-                  <a:cs typeface="+mn-cs"/>
-                </a:defRPr>
-              </a:lvl9pPr>
-            </a:lstStyle>
-            <a:p>
-              <a:pPr algn="ctr"/>
-              <a:r>
-                <a:rPr lang="de-DE" sz="1000" b="1" dirty="0" smtClean="0">
-                  <a:latin typeface="Arial" panose="020B0604020202020204" pitchFamily="34" charset="0"/>
-                  <a:cs typeface="Arial" panose="020B0604020202020204" pitchFamily="34" charset="0"/>
-                </a:rPr>
-                <a:t>Asynchronous</a:t>
-              </a:r>
-            </a:p>
-            <a:p>
-              <a:pPr algn="ctr"/>
-              <a:r>
-                <a:rPr lang="de-DE" sz="1000" b="1" dirty="0" smtClean="0">
-                  <a:latin typeface="Arial" panose="020B0604020202020204" pitchFamily="34" charset="0"/>
-                  <a:cs typeface="Arial" panose="020B0604020202020204" pitchFamily="34" charset="0"/>
-                </a:rPr>
-                <a:t>Provisioning</a:t>
-              </a:r>
-            </a:p>
-            <a:p>
-              <a:pPr algn="ctr"/>
-              <a:r>
-                <a:rPr lang="de-DE" sz="1000" b="1" dirty="0" smtClean="0">
-                  <a:latin typeface="Arial" panose="020B0604020202020204" pitchFamily="34" charset="0"/>
-                  <a:cs typeface="Arial" panose="020B0604020202020204" pitchFamily="34" charset="0"/>
-                </a:rPr>
-                <a:t>Platform (APP)</a:t>
-              </a:r>
-              <a:endParaRPr lang="de-DE" sz="1000" b="1" dirty="0">
-                <a:latin typeface="Arial" panose="020B0604020202020204" pitchFamily="34" charset="0"/>
-                <a:cs typeface="Arial" panose="020B0604020202020204" pitchFamily="34" charset="0"/>
-              </a:endParaRPr>
-            </a:p>
-          </p:txBody>
-        </p:sp>
-        <p:cxnSp>
-          <p:nvCxnSpPr>
-            <p:cNvPr id="37" name="Straight Arrow Connector 36"/>
-            <p:cNvCxnSpPr>
-              <a:stCxn id="25" idx="3"/>
-              <a:endCxn id="34" idx="1"/>
-            </p:cNvCxnSpPr>
-            <p:nvPr/>
-          </p:nvCxnSpPr>
-          <p:spPr>
-            <a:xfrm>
-              <a:off x="1948644" y="1609068"/>
-              <a:ext cx="448568" cy="7380"/>
-            </a:xfrm>
-            <a:prstGeom prst="straightConnector1">
-              <a:avLst/>
-            </a:prstGeom>
-            <a:ln w="19050">
-              <a:solidFill>
-                <a:srgbClr val="C00000"/>
-              </a:solidFill>
-              <a:tailEnd type="arrow"/>
-            </a:ln>
-          </p:spPr>
-          <p:style>
-            <a:lnRef idx="1">
-              <a:schemeClr val="accent1"/>
-            </a:lnRef>
-            <a:fillRef idx="0">
-              <a:schemeClr val="accent1"/>
-            </a:fillRef>
-            <a:effectRef idx="0">
-              <a:schemeClr val="accent1"/>
-            </a:effectRef>
-            <a:fontRef idx="minor">
-              <a:schemeClr val="tx1"/>
-            </a:fontRef>
-          </p:style>
-        </p:cxnSp>
-        <p:cxnSp>
-          <p:nvCxnSpPr>
-            <p:cNvPr id="38" name="Straight Arrow Connector 37"/>
-            <p:cNvCxnSpPr/>
-            <p:nvPr/>
-          </p:nvCxnSpPr>
-          <p:spPr>
-            <a:xfrm flipH="1">
-              <a:off x="1707753" y="2423810"/>
-              <a:ext cx="689459" cy="0"/>
-            </a:xfrm>
-            <a:prstGeom prst="straightConnector1">
-              <a:avLst/>
-            </a:prstGeom>
-            <a:ln w="19050">
-              <a:solidFill>
-                <a:srgbClr val="C00000"/>
-              </a:solidFill>
-              <a:tailEnd type="arrow"/>
-            </a:ln>
-          </p:spPr>
-          <p:style>
-            <a:lnRef idx="1">
-              <a:schemeClr val="accent1"/>
-            </a:lnRef>
-            <a:fillRef idx="0">
-              <a:schemeClr val="accent1"/>
-            </a:fillRef>
-            <a:effectRef idx="0">
-              <a:schemeClr val="accent1"/>
-            </a:effectRef>
-            <a:fontRef idx="minor">
-              <a:schemeClr val="tx1"/>
-            </a:fontRef>
-          </p:style>
-        </p:cxnSp>
-        <p:cxnSp>
-          <p:nvCxnSpPr>
-            <p:cNvPr id="39" name="Straight Arrow Connector 38"/>
-            <p:cNvCxnSpPr>
-              <a:stCxn id="34" idx="3"/>
-            </p:cNvCxnSpPr>
-            <p:nvPr/>
-          </p:nvCxnSpPr>
-          <p:spPr>
-            <a:xfrm>
-              <a:off x="3333316" y="1616448"/>
-              <a:ext cx="491728" cy="10604"/>
-            </a:xfrm>
-            <a:prstGeom prst="straightConnector1">
-              <a:avLst/>
-            </a:prstGeom>
-            <a:ln w="19050">
-              <a:solidFill>
-                <a:srgbClr val="C00000"/>
-              </a:solidFill>
-              <a:tailEnd type="arrow"/>
-            </a:ln>
-          </p:spPr>
-          <p:style>
-            <a:lnRef idx="1">
-              <a:schemeClr val="accent1"/>
-            </a:lnRef>
-            <a:fillRef idx="0">
-              <a:schemeClr val="accent1"/>
-            </a:fillRef>
-            <a:effectRef idx="0">
-              <a:schemeClr val="accent1"/>
-            </a:effectRef>
-            <a:fontRef idx="minor">
-              <a:schemeClr val="tx1"/>
-            </a:fontRef>
-          </p:style>
-        </p:cxnSp>
-        <p:cxnSp>
-          <p:nvCxnSpPr>
-            <p:cNvPr id="40" name="Straight Arrow Connector 39"/>
-            <p:cNvCxnSpPr>
-              <a:stCxn id="19" idx="1"/>
-            </p:cNvCxnSpPr>
-            <p:nvPr/>
-          </p:nvCxnSpPr>
-          <p:spPr>
-            <a:xfrm flipH="1">
-              <a:off x="3333316" y="1758172"/>
-              <a:ext cx="491728" cy="0"/>
-            </a:xfrm>
-            <a:prstGeom prst="straightConnector1">
-              <a:avLst/>
-            </a:prstGeom>
-            <a:ln w="19050">
-              <a:solidFill>
-                <a:schemeClr val="tx2"/>
-              </a:solidFill>
-              <a:tailEnd type="arrow"/>
-            </a:ln>
-          </p:spPr>
-          <p:style>
-            <a:lnRef idx="1">
-              <a:schemeClr val="accent1"/>
-            </a:lnRef>
-            <a:fillRef idx="0">
-              <a:schemeClr val="accent1"/>
-            </a:fillRef>
-            <a:effectRef idx="0">
-              <a:schemeClr val="accent1"/>
-            </a:effectRef>
-            <a:fontRef idx="minor">
-              <a:schemeClr val="tx1"/>
-            </a:fontRef>
-          </p:style>
-        </p:cxnSp>
-      </p:grpSp>
-      <p:sp>
-        <p:nvSpPr>
-          <p:cNvPr id="31" name="Rounded Rectangle 30"/>
-          <p:cNvSpPr/>
-          <p:nvPr/>
-        </p:nvSpPr>
-        <p:spPr>
-          <a:xfrm>
-            <a:off x="4005064" y="1043608"/>
-            <a:ext cx="1890340" cy="1718196"/>
-          </a:xfrm>
-          <a:prstGeom prst="roundRect">
-            <a:avLst/>
-          </a:prstGeom>
-          <a:solidFill>
-            <a:schemeClr val="tx2">
-              <a:lumMod val="20000"/>
-              <a:lumOff val="80000"/>
-            </a:schemeClr>
-          </a:solidFill>
-          <a:ln w="31750"/>
-        </p:spPr>
-        <p:style>
-          <a:lnRef idx="2">
-            <a:schemeClr val="accent1">
-              <a:shade val="50000"/>
-            </a:schemeClr>
-          </a:lnRef>
-          <a:fillRef idx="1">
-            <a:schemeClr val="accent1"/>
-          </a:fillRef>
-          <a:effectRef idx="0">
-            <a:schemeClr val="accent1"/>
-          </a:effectRef>
-          <a:fontRef idx="minor">
-            <a:schemeClr val="lt1"/>
-          </a:fontRef>
-        </p:style>
-        <p:txBody>
-          <a:bodyPr rtlCol="0" anchor="ctr"/>
-          <a:lstStyle/>
-          <a:p>
-            <a:pPr algn="ctr"/>
-            <a:endParaRPr lang="de-DE" sz="1000" b="1" dirty="0">
-              <a:solidFill>
-                <a:schemeClr val="tx1"/>
-              </a:solidFill>
-              <a:latin typeface="Arial" panose="020B0604020202020204" pitchFamily="34" charset="0"/>
-              <a:cs typeface="Arial" panose="020B0604020202020204" pitchFamily="34" charset="0"/>
-            </a:endParaRPr>
-          </a:p>
-        </p:txBody>
-      </p:sp>
-      <p:sp>
-        <p:nvSpPr>
-          <p:cNvPr id="3" name="TextBox 2"/>
-          <p:cNvSpPr txBox="1"/>
-          <p:nvPr/>
-        </p:nvSpPr>
-        <p:spPr>
-          <a:xfrm>
-            <a:off x="4178349" y="1148396"/>
-            <a:ext cx="1484702" cy="1569660"/>
-          </a:xfrm>
-          <a:prstGeom prst="rect">
-            <a:avLst/>
-          </a:prstGeom>
-          <a:noFill/>
-        </p:spPr>
-        <p:txBody>
-          <a:bodyPr wrap="none" rtlCol="0">
-            <a:spAutoFit/>
-          </a:bodyPr>
-          <a:lstStyle/>
-          <a:p>
-            <a:pPr marL="285750" indent="-285750">
-              <a:buFont typeface="Arial" panose="020B0604020202020204" pitchFamily="34" charset="0"/>
-              <a:buChar char="•"/>
-            </a:pPr>
-            <a:r>
-              <a:rPr lang="de-DE" sz="1200" dirty="0" err="1" smtClean="0">
-                <a:latin typeface="Arial" panose="020B0604020202020204" pitchFamily="34" charset="0"/>
-                <a:cs typeface="Arial" panose="020B0604020202020204" pitchFamily="34" charset="0"/>
-              </a:rPr>
-              <a:t>Provisioning</a:t>
-            </a:r>
-            <a:endParaRPr lang="de-DE" sz="1200" dirty="0" smtClean="0">
-              <a:latin typeface="Arial" panose="020B0604020202020204" pitchFamily="34" charset="0"/>
-              <a:cs typeface="Arial" panose="020B0604020202020204" pitchFamily="34" charset="0"/>
-            </a:endParaRPr>
-          </a:p>
-          <a:p>
-            <a:pPr marL="285750" indent="-285750">
-              <a:buFont typeface="Arial" panose="020B0604020202020204" pitchFamily="34" charset="0"/>
-              <a:buChar char="•"/>
-            </a:pPr>
-            <a:r>
-              <a:rPr lang="de-DE" sz="1200" dirty="0" err="1" smtClean="0">
-                <a:latin typeface="Arial" panose="020B0604020202020204" pitchFamily="34" charset="0"/>
-                <a:cs typeface="Arial" panose="020B0604020202020204" pitchFamily="34" charset="0"/>
-              </a:rPr>
-              <a:t>Deprovisioning</a:t>
-            </a:r>
-            <a:endParaRPr lang="de-DE" sz="1200" dirty="0" smtClean="0">
-              <a:latin typeface="Arial" panose="020B0604020202020204" pitchFamily="34" charset="0"/>
-              <a:cs typeface="Arial" panose="020B0604020202020204" pitchFamily="34" charset="0"/>
-            </a:endParaRPr>
-          </a:p>
-          <a:p>
-            <a:pPr marL="285750" indent="-285750">
-              <a:buFont typeface="Arial" panose="020B0604020202020204" pitchFamily="34" charset="0"/>
-              <a:buChar char="•"/>
-            </a:pPr>
-            <a:r>
-              <a:rPr lang="de-DE" sz="1200" dirty="0" err="1" smtClean="0">
-                <a:latin typeface="Arial" panose="020B0604020202020204" pitchFamily="34" charset="0"/>
-                <a:cs typeface="Arial" panose="020B0604020202020204" pitchFamily="34" charset="0"/>
-              </a:rPr>
-              <a:t>Assign</a:t>
-            </a:r>
-            <a:r>
-              <a:rPr lang="de-DE" sz="1200" dirty="0" smtClean="0">
-                <a:latin typeface="Arial" panose="020B0604020202020204" pitchFamily="34" charset="0"/>
-                <a:cs typeface="Arial" panose="020B0604020202020204" pitchFamily="34" charset="0"/>
-              </a:rPr>
-              <a:t> User</a:t>
-            </a:r>
-          </a:p>
-          <a:p>
-            <a:pPr marL="285750" indent="-285750">
-              <a:buFont typeface="Arial" panose="020B0604020202020204" pitchFamily="34" charset="0"/>
-              <a:buChar char="•"/>
-            </a:pPr>
-            <a:r>
-              <a:rPr lang="de-DE" sz="1200" dirty="0" err="1" smtClean="0">
-                <a:latin typeface="Arial" panose="020B0604020202020204" pitchFamily="34" charset="0"/>
-                <a:cs typeface="Arial" panose="020B0604020202020204" pitchFamily="34" charset="0"/>
-              </a:rPr>
-              <a:t>Deassign</a:t>
-            </a:r>
-            <a:r>
-              <a:rPr lang="de-DE" sz="1200" dirty="0" smtClean="0">
-                <a:latin typeface="Arial" panose="020B0604020202020204" pitchFamily="34" charset="0"/>
-                <a:cs typeface="Arial" panose="020B0604020202020204" pitchFamily="34" charset="0"/>
-              </a:rPr>
-              <a:t> User</a:t>
-            </a:r>
-          </a:p>
-          <a:p>
-            <a:pPr marL="285750" indent="-285750">
-              <a:buFont typeface="Arial" panose="020B0604020202020204" pitchFamily="34" charset="0"/>
-              <a:buChar char="•"/>
-            </a:pPr>
-            <a:r>
-              <a:rPr lang="de-DE" sz="1200" dirty="0" err="1" smtClean="0">
-                <a:latin typeface="Arial" panose="020B0604020202020204" pitchFamily="34" charset="0"/>
-                <a:cs typeface="Arial" panose="020B0604020202020204" pitchFamily="34" charset="0"/>
-              </a:rPr>
-              <a:t>Modification</a:t>
-            </a:r>
-            <a:endParaRPr lang="de-DE" sz="1200" dirty="0" smtClean="0">
-              <a:latin typeface="Arial" panose="020B0604020202020204" pitchFamily="34" charset="0"/>
-              <a:cs typeface="Arial" panose="020B0604020202020204" pitchFamily="34" charset="0"/>
-            </a:endParaRPr>
-          </a:p>
-          <a:p>
-            <a:pPr marL="285750" indent="-285750">
-              <a:buFont typeface="Arial" panose="020B0604020202020204" pitchFamily="34" charset="0"/>
-              <a:buChar char="•"/>
-            </a:pPr>
-            <a:r>
-              <a:rPr lang="de-DE" sz="1200" dirty="0" smtClean="0">
-                <a:latin typeface="Arial" panose="020B0604020202020204" pitchFamily="34" charset="0"/>
-                <a:cs typeface="Arial" panose="020B0604020202020204" pitchFamily="34" charset="0"/>
-              </a:rPr>
-              <a:t>Operation</a:t>
-            </a:r>
-          </a:p>
-          <a:p>
-            <a:pPr marL="285750" indent="-285750">
-              <a:buFont typeface="Arial" panose="020B0604020202020204" pitchFamily="34" charset="0"/>
-              <a:buChar char="•"/>
-            </a:pPr>
-            <a:r>
-              <a:rPr lang="de-DE" sz="1200" dirty="0" smtClean="0">
-                <a:latin typeface="Arial" panose="020B0604020202020204" pitchFamily="34" charset="0"/>
-                <a:cs typeface="Arial" panose="020B0604020202020204" pitchFamily="34" charset="0"/>
-              </a:rPr>
-              <a:t>Check Status</a:t>
-            </a:r>
-          </a:p>
-          <a:p>
-            <a:pPr marL="285750" indent="-285750">
-              <a:buFont typeface="Arial" panose="020B0604020202020204" pitchFamily="34" charset="0"/>
-              <a:buChar char="•"/>
-            </a:pPr>
-            <a:r>
-              <a:rPr lang="de-DE" sz="1200" dirty="0" err="1" smtClean="0">
-                <a:latin typeface="Arial" panose="020B0604020202020204" pitchFamily="34" charset="0"/>
-                <a:cs typeface="Arial" panose="020B0604020202020204" pitchFamily="34" charset="0"/>
-              </a:rPr>
-              <a:t>Verification</a:t>
-            </a:r>
-            <a:endParaRPr lang="de-DE" sz="1200" dirty="0">
-              <a:latin typeface="Arial" panose="020B0604020202020204" pitchFamily="34" charset="0"/>
-              <a:cs typeface="Arial" panose="020B0604020202020204" pitchFamily="34" charset="0"/>
-            </a:endParaRPr>
-          </a:p>
-        </p:txBody>
-      </p:sp>
-    </p:spTree>
-    <p:extLst>
-      <p:ext uri="{BB962C8B-B14F-4D97-AF65-F5344CB8AC3E}">
         <p14:creationId xmlns:p14="http://schemas.microsoft.com/office/powerpoint/2010/main" val="2501095706"/>
       </p:ext>
     </p:extLst>
@@ -8072,13 +8109,6 @@
               </a:rPr>
               <a:t>Controller</a:t>
             </a:r>
-            <a:endParaRPr lang="de-DE" sz="1000" b="1" dirty="0">
-              <a:solidFill>
-                <a:schemeClr val="tx1"/>
-              </a:solidFill>
-              <a:latin typeface="Arial" panose="020B0604020202020204" pitchFamily="34" charset="0"/>
-              <a:cs typeface="Arial" panose="020B0604020202020204" pitchFamily="34" charset="0"/>
-            </a:endParaRPr>
           </a:p>
         </p:txBody>
       </p:sp>

</xml_diff>